<commit_message>
assigned roles for powerpoint presentation
</commit_message>
<xml_diff>
--- a/Documents/Project Presentation/Battleship Project Presentation.pptx
+++ b/Documents/Project Presentation/Battleship Project Presentation.pptx
@@ -4,6 +4,9 @@
   <p:sldMasterIdLst>
     <p:sldMasterId id="2147483660" r:id="rId1"/>
   </p:sldMasterIdLst>
+  <p:notesMasterIdLst>
+    <p:notesMasterId r:id="rId10"/>
+  </p:notesMasterIdLst>
   <p:sldIdLst>
     <p:sldId id="256" r:id="rId2"/>
     <p:sldId id="258" r:id="rId3"/>
@@ -114,6 +117,972 @@
 </p:presentation>
 </file>
 
+<file path=ppt/notesMasters/notesMaster1.xml><?xml version="1.0" encoding="utf-8"?>
+<p:notesMaster xmlns:a="http://schemas.openxmlformats.org/drawingml/2006/main" xmlns:r="http://schemas.openxmlformats.org/officeDocument/2006/relationships" xmlns:p="http://schemas.openxmlformats.org/presentationml/2006/main">
+  <p:cSld>
+    <p:bg>
+      <p:bgRef idx="1001">
+        <a:schemeClr val="bg1"/>
+      </p:bgRef>
+    </p:bg>
+    <p:spTree>
+      <p:nvGrpSpPr>
+        <p:cNvPr id="1" name=""/>
+        <p:cNvGrpSpPr/>
+        <p:nvPr/>
+      </p:nvGrpSpPr>
+      <p:grpSpPr>
+        <a:xfrm>
+          <a:off x="0" y="0"/>
+          <a:ext cx="0" cy="0"/>
+          <a:chOff x="0" y="0"/>
+          <a:chExt cx="0" cy="0"/>
+        </a:xfrm>
+      </p:grpSpPr>
+      <p:sp>
+        <p:nvSpPr>
+          <p:cNvPr id="2" name="Header Placeholder 1"/>
+          <p:cNvSpPr>
+            <a:spLocks noGrp="1"/>
+          </p:cNvSpPr>
+          <p:nvPr>
+            <p:ph type="hdr" sz="quarter"/>
+          </p:nvPr>
+        </p:nvSpPr>
+        <p:spPr>
+          <a:xfrm>
+            <a:off x="0" y="0"/>
+            <a:ext cx="2971800" cy="457200"/>
+          </a:xfrm>
+          <a:prstGeom prst="rect">
+            <a:avLst/>
+          </a:prstGeom>
+        </p:spPr>
+        <p:txBody>
+          <a:bodyPr vert="horz" lIns="91440" tIns="45720" rIns="91440" bIns="45720" rtlCol="0"/>
+          <a:lstStyle>
+            <a:lvl1pPr algn="l">
+              <a:defRPr sz="1200"/>
+            </a:lvl1pPr>
+          </a:lstStyle>
+          <a:p>
+            <a:endParaRPr lang="en-US" dirty="0"/>
+          </a:p>
+        </p:txBody>
+      </p:sp>
+      <p:sp>
+        <p:nvSpPr>
+          <p:cNvPr id="3" name="Date Placeholder 2"/>
+          <p:cNvSpPr>
+            <a:spLocks noGrp="1"/>
+          </p:cNvSpPr>
+          <p:nvPr>
+            <p:ph type="dt" idx="1"/>
+          </p:nvPr>
+        </p:nvSpPr>
+        <p:spPr>
+          <a:xfrm>
+            <a:off x="3884613" y="0"/>
+            <a:ext cx="2971800" cy="457200"/>
+          </a:xfrm>
+          <a:prstGeom prst="rect">
+            <a:avLst/>
+          </a:prstGeom>
+        </p:spPr>
+        <p:txBody>
+          <a:bodyPr vert="horz" lIns="91440" tIns="45720" rIns="91440" bIns="45720" rtlCol="0"/>
+          <a:lstStyle>
+            <a:lvl1pPr algn="r">
+              <a:defRPr sz="1200"/>
+            </a:lvl1pPr>
+          </a:lstStyle>
+          <a:p>
+            <a:fld id="{9044870C-384B-4EC1-B838-2204F18DC063}" type="datetimeFigureOut">
+              <a:rPr lang="en-US" smtClean="0"/>
+              <a:t>5/16/2012</a:t>
+            </a:fld>
+            <a:endParaRPr lang="en-US" dirty="0"/>
+          </a:p>
+        </p:txBody>
+      </p:sp>
+      <p:sp>
+        <p:nvSpPr>
+          <p:cNvPr id="4" name="Slide Image Placeholder 3"/>
+          <p:cNvSpPr>
+            <a:spLocks noGrp="1" noRot="1" noChangeAspect="1"/>
+          </p:cNvSpPr>
+          <p:nvPr>
+            <p:ph type="sldImg" idx="2"/>
+          </p:nvPr>
+        </p:nvSpPr>
+        <p:spPr>
+          <a:xfrm>
+            <a:off x="1143000" y="685800"/>
+            <a:ext cx="4572000" cy="3429000"/>
+          </a:xfrm>
+          <a:prstGeom prst="rect">
+            <a:avLst/>
+          </a:prstGeom>
+          <a:noFill/>
+          <a:ln w="12700">
+            <a:solidFill>
+              <a:prstClr val="black"/>
+            </a:solidFill>
+          </a:ln>
+        </p:spPr>
+        <p:txBody>
+          <a:bodyPr vert="horz" lIns="91440" tIns="45720" rIns="91440" bIns="45720" rtlCol="0" anchor="ctr"/>
+          <a:lstStyle/>
+          <a:p>
+            <a:endParaRPr lang="en-US" dirty="0"/>
+          </a:p>
+        </p:txBody>
+      </p:sp>
+      <p:sp>
+        <p:nvSpPr>
+          <p:cNvPr id="5" name="Notes Placeholder 4"/>
+          <p:cNvSpPr>
+            <a:spLocks noGrp="1"/>
+          </p:cNvSpPr>
+          <p:nvPr>
+            <p:ph type="body" sz="quarter" idx="3"/>
+          </p:nvPr>
+        </p:nvSpPr>
+        <p:spPr>
+          <a:xfrm>
+            <a:off x="685800" y="4343400"/>
+            <a:ext cx="5486400" cy="4114800"/>
+          </a:xfrm>
+          <a:prstGeom prst="rect">
+            <a:avLst/>
+          </a:prstGeom>
+        </p:spPr>
+        <p:txBody>
+          <a:bodyPr vert="horz" lIns="91440" tIns="45720" rIns="91440" bIns="45720" rtlCol="0"/>
+          <a:lstStyle/>
+          <a:p>
+            <a:pPr lvl="0"/>
+            <a:r>
+              <a:rPr lang="en-US" smtClean="0"/>
+              <a:t>Click to edit Master text styles</a:t>
+            </a:r>
+          </a:p>
+          <a:p>
+            <a:pPr lvl="1"/>
+            <a:r>
+              <a:rPr lang="en-US" smtClean="0"/>
+              <a:t>Second level</a:t>
+            </a:r>
+          </a:p>
+          <a:p>
+            <a:pPr lvl="2"/>
+            <a:r>
+              <a:rPr lang="en-US" smtClean="0"/>
+              <a:t>Third level</a:t>
+            </a:r>
+          </a:p>
+          <a:p>
+            <a:pPr lvl="3"/>
+            <a:r>
+              <a:rPr lang="en-US" smtClean="0"/>
+              <a:t>Fourth level</a:t>
+            </a:r>
+          </a:p>
+          <a:p>
+            <a:pPr lvl="4"/>
+            <a:r>
+              <a:rPr lang="en-US" smtClean="0"/>
+              <a:t>Fifth level</a:t>
+            </a:r>
+            <a:endParaRPr lang="en-US"/>
+          </a:p>
+        </p:txBody>
+      </p:sp>
+      <p:sp>
+        <p:nvSpPr>
+          <p:cNvPr id="6" name="Footer Placeholder 5"/>
+          <p:cNvSpPr>
+            <a:spLocks noGrp="1"/>
+          </p:cNvSpPr>
+          <p:nvPr>
+            <p:ph type="ftr" sz="quarter" idx="4"/>
+          </p:nvPr>
+        </p:nvSpPr>
+        <p:spPr>
+          <a:xfrm>
+            <a:off x="0" y="8685213"/>
+            <a:ext cx="2971800" cy="457200"/>
+          </a:xfrm>
+          <a:prstGeom prst="rect">
+            <a:avLst/>
+          </a:prstGeom>
+        </p:spPr>
+        <p:txBody>
+          <a:bodyPr vert="horz" lIns="91440" tIns="45720" rIns="91440" bIns="45720" rtlCol="0" anchor="b"/>
+          <a:lstStyle>
+            <a:lvl1pPr algn="l">
+              <a:defRPr sz="1200"/>
+            </a:lvl1pPr>
+          </a:lstStyle>
+          <a:p>
+            <a:endParaRPr lang="en-US" dirty="0"/>
+          </a:p>
+        </p:txBody>
+      </p:sp>
+      <p:sp>
+        <p:nvSpPr>
+          <p:cNvPr id="7" name="Slide Number Placeholder 6"/>
+          <p:cNvSpPr>
+            <a:spLocks noGrp="1"/>
+          </p:cNvSpPr>
+          <p:nvPr>
+            <p:ph type="sldNum" sz="quarter" idx="5"/>
+          </p:nvPr>
+        </p:nvSpPr>
+        <p:spPr>
+          <a:xfrm>
+            <a:off x="3884613" y="8685213"/>
+            <a:ext cx="2971800" cy="457200"/>
+          </a:xfrm>
+          <a:prstGeom prst="rect">
+            <a:avLst/>
+          </a:prstGeom>
+        </p:spPr>
+        <p:txBody>
+          <a:bodyPr vert="horz" lIns="91440" tIns="45720" rIns="91440" bIns="45720" rtlCol="0" anchor="b"/>
+          <a:lstStyle>
+            <a:lvl1pPr algn="r">
+              <a:defRPr sz="1200"/>
+            </a:lvl1pPr>
+          </a:lstStyle>
+          <a:p>
+            <a:fld id="{BEDFE9A2-8C49-4AD2-A34F-E00FA8CC961E}" type="slidenum">
+              <a:rPr lang="en-US" smtClean="0"/>
+              <a:t>‹#›</a:t>
+            </a:fld>
+            <a:endParaRPr lang="en-US" dirty="0"/>
+          </a:p>
+        </p:txBody>
+      </p:sp>
+    </p:spTree>
+    <p:extLst>
+      <p:ext uri="{BB962C8B-B14F-4D97-AF65-F5344CB8AC3E}">
+        <p14:creationId xmlns:p14="http://schemas.microsoft.com/office/powerpoint/2010/main" val="1569370324"/>
+      </p:ext>
+    </p:extLst>
+  </p:cSld>
+  <p:clrMap bg1="lt1" tx1="dk1" bg2="lt2" tx2="dk2" accent1="accent1" accent2="accent2" accent3="accent3" accent4="accent4" accent5="accent5" accent6="accent6" hlink="hlink" folHlink="folHlink"/>
+  <p:notesStyle>
+    <a:lvl1pPr marL="0" algn="l" defTabSz="914400" rtl="0" eaLnBrk="1" latinLnBrk="0" hangingPunct="1">
+      <a:defRPr sz="1200" kern="1200">
+        <a:solidFill>
+          <a:schemeClr val="tx1"/>
+        </a:solidFill>
+        <a:latin typeface="+mn-lt"/>
+        <a:ea typeface="+mn-ea"/>
+        <a:cs typeface="+mn-cs"/>
+      </a:defRPr>
+    </a:lvl1pPr>
+    <a:lvl2pPr marL="457200" algn="l" defTabSz="914400" rtl="0" eaLnBrk="1" latinLnBrk="0" hangingPunct="1">
+      <a:defRPr sz="1200" kern="1200">
+        <a:solidFill>
+          <a:schemeClr val="tx1"/>
+        </a:solidFill>
+        <a:latin typeface="+mn-lt"/>
+        <a:ea typeface="+mn-ea"/>
+        <a:cs typeface="+mn-cs"/>
+      </a:defRPr>
+    </a:lvl2pPr>
+    <a:lvl3pPr marL="914400" algn="l" defTabSz="914400" rtl="0" eaLnBrk="1" latinLnBrk="0" hangingPunct="1">
+      <a:defRPr sz="1200" kern="1200">
+        <a:solidFill>
+          <a:schemeClr val="tx1"/>
+        </a:solidFill>
+        <a:latin typeface="+mn-lt"/>
+        <a:ea typeface="+mn-ea"/>
+        <a:cs typeface="+mn-cs"/>
+      </a:defRPr>
+    </a:lvl3pPr>
+    <a:lvl4pPr marL="1371600" algn="l" defTabSz="914400" rtl="0" eaLnBrk="1" latinLnBrk="0" hangingPunct="1">
+      <a:defRPr sz="1200" kern="1200">
+        <a:solidFill>
+          <a:schemeClr val="tx1"/>
+        </a:solidFill>
+        <a:latin typeface="+mn-lt"/>
+        <a:ea typeface="+mn-ea"/>
+        <a:cs typeface="+mn-cs"/>
+      </a:defRPr>
+    </a:lvl4pPr>
+    <a:lvl5pPr marL="1828800" algn="l" defTabSz="914400" rtl="0" eaLnBrk="1" latinLnBrk="0" hangingPunct="1">
+      <a:defRPr sz="1200" kern="1200">
+        <a:solidFill>
+          <a:schemeClr val="tx1"/>
+        </a:solidFill>
+        <a:latin typeface="+mn-lt"/>
+        <a:ea typeface="+mn-ea"/>
+        <a:cs typeface="+mn-cs"/>
+      </a:defRPr>
+    </a:lvl5pPr>
+    <a:lvl6pPr marL="2286000" algn="l" defTabSz="914400" rtl="0" eaLnBrk="1" latinLnBrk="0" hangingPunct="1">
+      <a:defRPr sz="1200" kern="1200">
+        <a:solidFill>
+          <a:schemeClr val="tx1"/>
+        </a:solidFill>
+        <a:latin typeface="+mn-lt"/>
+        <a:ea typeface="+mn-ea"/>
+        <a:cs typeface="+mn-cs"/>
+      </a:defRPr>
+    </a:lvl6pPr>
+    <a:lvl7pPr marL="2743200" algn="l" defTabSz="914400" rtl="0" eaLnBrk="1" latinLnBrk="0" hangingPunct="1">
+      <a:defRPr sz="1200" kern="1200">
+        <a:solidFill>
+          <a:schemeClr val="tx1"/>
+        </a:solidFill>
+        <a:latin typeface="+mn-lt"/>
+        <a:ea typeface="+mn-ea"/>
+        <a:cs typeface="+mn-cs"/>
+      </a:defRPr>
+    </a:lvl7pPr>
+    <a:lvl8pPr marL="3200400" algn="l" defTabSz="914400" rtl="0" eaLnBrk="1" latinLnBrk="0" hangingPunct="1">
+      <a:defRPr sz="1200" kern="1200">
+        <a:solidFill>
+          <a:schemeClr val="tx1"/>
+        </a:solidFill>
+        <a:latin typeface="+mn-lt"/>
+        <a:ea typeface="+mn-ea"/>
+        <a:cs typeface="+mn-cs"/>
+      </a:defRPr>
+    </a:lvl8pPr>
+    <a:lvl9pPr marL="3657600" algn="l" defTabSz="914400" rtl="0" eaLnBrk="1" latinLnBrk="0" hangingPunct="1">
+      <a:defRPr sz="1200" kern="1200">
+        <a:solidFill>
+          <a:schemeClr val="tx1"/>
+        </a:solidFill>
+        <a:latin typeface="+mn-lt"/>
+        <a:ea typeface="+mn-ea"/>
+        <a:cs typeface="+mn-cs"/>
+      </a:defRPr>
+    </a:lvl9pPr>
+  </p:notesStyle>
+</p:notesMaster>
+</file>
+
+<file path=ppt/notesSlides/notesSlide1.xml><?xml version="1.0" encoding="utf-8"?>
+<p:notes xmlns:a="http://schemas.openxmlformats.org/drawingml/2006/main" xmlns:r="http://schemas.openxmlformats.org/officeDocument/2006/relationships" xmlns:p="http://schemas.openxmlformats.org/presentationml/2006/main">
+  <p:cSld>
+    <p:spTree>
+      <p:nvGrpSpPr>
+        <p:cNvPr id="1" name=""/>
+        <p:cNvGrpSpPr/>
+        <p:nvPr/>
+      </p:nvGrpSpPr>
+      <p:grpSpPr>
+        <a:xfrm>
+          <a:off x="0" y="0"/>
+          <a:ext cx="0" cy="0"/>
+          <a:chOff x="0" y="0"/>
+          <a:chExt cx="0" cy="0"/>
+        </a:xfrm>
+      </p:grpSpPr>
+      <p:sp>
+        <p:nvSpPr>
+          <p:cNvPr id="2" name="Slide Image Placeholder 1"/>
+          <p:cNvSpPr>
+            <a:spLocks noGrp="1" noRot="1" noChangeAspect="1"/>
+          </p:cNvSpPr>
+          <p:nvPr>
+            <p:ph type="sldImg"/>
+          </p:nvPr>
+        </p:nvSpPr>
+        <p:spPr/>
+      </p:sp>
+      <p:sp>
+        <p:nvSpPr>
+          <p:cNvPr id="3" name="Notes Placeholder 2"/>
+          <p:cNvSpPr>
+            <a:spLocks noGrp="1"/>
+          </p:cNvSpPr>
+          <p:nvPr>
+            <p:ph type="body" idx="1"/>
+          </p:nvPr>
+        </p:nvSpPr>
+        <p:spPr/>
+        <p:txBody>
+          <a:bodyPr/>
+          <a:lstStyle/>
+          <a:p>
+            <a:r>
+              <a:rPr lang="en-US" dirty="0" smtClean="0"/>
+              <a:t>Tiffany</a:t>
+            </a:r>
+            <a:endParaRPr lang="en-US" dirty="0"/>
+          </a:p>
+        </p:txBody>
+      </p:sp>
+      <p:sp>
+        <p:nvSpPr>
+          <p:cNvPr id="4" name="Slide Number Placeholder 3"/>
+          <p:cNvSpPr>
+            <a:spLocks noGrp="1"/>
+          </p:cNvSpPr>
+          <p:nvPr>
+            <p:ph type="sldNum" sz="quarter" idx="10"/>
+          </p:nvPr>
+        </p:nvSpPr>
+        <p:spPr/>
+        <p:txBody>
+          <a:bodyPr/>
+          <a:lstStyle/>
+          <a:p>
+            <a:fld id="{BEDFE9A2-8C49-4AD2-A34F-E00FA8CC961E}" type="slidenum">
+              <a:rPr lang="en-US" smtClean="0"/>
+              <a:t>2</a:t>
+            </a:fld>
+            <a:endParaRPr lang="en-US" dirty="0"/>
+          </a:p>
+        </p:txBody>
+      </p:sp>
+    </p:spTree>
+    <p:extLst>
+      <p:ext uri="{BB962C8B-B14F-4D97-AF65-F5344CB8AC3E}">
+        <p14:creationId xmlns:p14="http://schemas.microsoft.com/office/powerpoint/2010/main" val="3937444994"/>
+      </p:ext>
+    </p:extLst>
+  </p:cSld>
+  <p:clrMapOvr>
+    <a:masterClrMapping/>
+  </p:clrMapOvr>
+</p:notes>
+</file>
+
+<file path=ppt/notesSlides/notesSlide2.xml><?xml version="1.0" encoding="utf-8"?>
+<p:notes xmlns:a="http://schemas.openxmlformats.org/drawingml/2006/main" xmlns:r="http://schemas.openxmlformats.org/officeDocument/2006/relationships" xmlns:p="http://schemas.openxmlformats.org/presentationml/2006/main">
+  <p:cSld>
+    <p:spTree>
+      <p:nvGrpSpPr>
+        <p:cNvPr id="1" name=""/>
+        <p:cNvGrpSpPr/>
+        <p:nvPr/>
+      </p:nvGrpSpPr>
+      <p:grpSpPr>
+        <a:xfrm>
+          <a:off x="0" y="0"/>
+          <a:ext cx="0" cy="0"/>
+          <a:chOff x="0" y="0"/>
+          <a:chExt cx="0" cy="0"/>
+        </a:xfrm>
+      </p:grpSpPr>
+      <p:sp>
+        <p:nvSpPr>
+          <p:cNvPr id="2" name="Slide Image Placeholder 1"/>
+          <p:cNvSpPr>
+            <a:spLocks noGrp="1" noRot="1" noChangeAspect="1"/>
+          </p:cNvSpPr>
+          <p:nvPr>
+            <p:ph type="sldImg"/>
+          </p:nvPr>
+        </p:nvSpPr>
+        <p:spPr/>
+      </p:sp>
+      <p:sp>
+        <p:nvSpPr>
+          <p:cNvPr id="3" name="Notes Placeholder 2"/>
+          <p:cNvSpPr>
+            <a:spLocks noGrp="1"/>
+          </p:cNvSpPr>
+          <p:nvPr>
+            <p:ph type="body" idx="1"/>
+          </p:nvPr>
+        </p:nvSpPr>
+        <p:spPr/>
+        <p:txBody>
+          <a:bodyPr/>
+          <a:lstStyle/>
+          <a:p>
+            <a:r>
+              <a:rPr lang="en-US" dirty="0" smtClean="0"/>
+              <a:t>Tiffany</a:t>
+            </a:r>
+            <a:endParaRPr lang="en-US" dirty="0"/>
+          </a:p>
+        </p:txBody>
+      </p:sp>
+      <p:sp>
+        <p:nvSpPr>
+          <p:cNvPr id="4" name="Slide Number Placeholder 3"/>
+          <p:cNvSpPr>
+            <a:spLocks noGrp="1"/>
+          </p:cNvSpPr>
+          <p:nvPr>
+            <p:ph type="sldNum" sz="quarter" idx="10"/>
+          </p:nvPr>
+        </p:nvSpPr>
+        <p:spPr/>
+        <p:txBody>
+          <a:bodyPr/>
+          <a:lstStyle/>
+          <a:p>
+            <a:fld id="{BEDFE9A2-8C49-4AD2-A34F-E00FA8CC961E}" type="slidenum">
+              <a:rPr lang="en-US" smtClean="0"/>
+              <a:t>3</a:t>
+            </a:fld>
+            <a:endParaRPr lang="en-US" dirty="0"/>
+          </a:p>
+        </p:txBody>
+      </p:sp>
+    </p:spTree>
+    <p:extLst>
+      <p:ext uri="{BB962C8B-B14F-4D97-AF65-F5344CB8AC3E}">
+        <p14:creationId xmlns:p14="http://schemas.microsoft.com/office/powerpoint/2010/main" val="2226674622"/>
+      </p:ext>
+    </p:extLst>
+  </p:cSld>
+  <p:clrMapOvr>
+    <a:masterClrMapping/>
+  </p:clrMapOvr>
+</p:notes>
+</file>
+
+<file path=ppt/notesSlides/notesSlide3.xml><?xml version="1.0" encoding="utf-8"?>
+<p:notes xmlns:a="http://schemas.openxmlformats.org/drawingml/2006/main" xmlns:r="http://schemas.openxmlformats.org/officeDocument/2006/relationships" xmlns:p="http://schemas.openxmlformats.org/presentationml/2006/main">
+  <p:cSld>
+    <p:spTree>
+      <p:nvGrpSpPr>
+        <p:cNvPr id="1" name=""/>
+        <p:cNvGrpSpPr/>
+        <p:nvPr/>
+      </p:nvGrpSpPr>
+      <p:grpSpPr>
+        <a:xfrm>
+          <a:off x="0" y="0"/>
+          <a:ext cx="0" cy="0"/>
+          <a:chOff x="0" y="0"/>
+          <a:chExt cx="0" cy="0"/>
+        </a:xfrm>
+      </p:grpSpPr>
+      <p:sp>
+        <p:nvSpPr>
+          <p:cNvPr id="2" name="Slide Image Placeholder 1"/>
+          <p:cNvSpPr>
+            <a:spLocks noGrp="1" noRot="1" noChangeAspect="1"/>
+          </p:cNvSpPr>
+          <p:nvPr>
+            <p:ph type="sldImg"/>
+          </p:nvPr>
+        </p:nvSpPr>
+        <p:spPr/>
+      </p:sp>
+      <p:sp>
+        <p:nvSpPr>
+          <p:cNvPr id="3" name="Notes Placeholder 2"/>
+          <p:cNvSpPr>
+            <a:spLocks noGrp="1"/>
+          </p:cNvSpPr>
+          <p:nvPr>
+            <p:ph type="body" idx="1"/>
+          </p:nvPr>
+        </p:nvSpPr>
+        <p:spPr/>
+        <p:txBody>
+          <a:bodyPr/>
+          <a:lstStyle/>
+          <a:p>
+            <a:r>
+              <a:rPr lang="en-US" dirty="0" smtClean="0"/>
+              <a:t>Cody</a:t>
+            </a:r>
+            <a:endParaRPr lang="en-US" dirty="0"/>
+          </a:p>
+        </p:txBody>
+      </p:sp>
+      <p:sp>
+        <p:nvSpPr>
+          <p:cNvPr id="4" name="Slide Number Placeholder 3"/>
+          <p:cNvSpPr>
+            <a:spLocks noGrp="1"/>
+          </p:cNvSpPr>
+          <p:nvPr>
+            <p:ph type="sldNum" sz="quarter" idx="10"/>
+          </p:nvPr>
+        </p:nvSpPr>
+        <p:spPr/>
+        <p:txBody>
+          <a:bodyPr/>
+          <a:lstStyle/>
+          <a:p>
+            <a:fld id="{BEDFE9A2-8C49-4AD2-A34F-E00FA8CC961E}" type="slidenum">
+              <a:rPr lang="en-US" smtClean="0"/>
+              <a:t>4</a:t>
+            </a:fld>
+            <a:endParaRPr lang="en-US" dirty="0"/>
+          </a:p>
+        </p:txBody>
+      </p:sp>
+    </p:spTree>
+    <p:extLst>
+      <p:ext uri="{BB962C8B-B14F-4D97-AF65-F5344CB8AC3E}">
+        <p14:creationId xmlns:p14="http://schemas.microsoft.com/office/powerpoint/2010/main" val="3722325341"/>
+      </p:ext>
+    </p:extLst>
+  </p:cSld>
+  <p:clrMapOvr>
+    <a:masterClrMapping/>
+  </p:clrMapOvr>
+</p:notes>
+</file>
+
+<file path=ppt/notesSlides/notesSlide4.xml><?xml version="1.0" encoding="utf-8"?>
+<p:notes xmlns:a="http://schemas.openxmlformats.org/drawingml/2006/main" xmlns:r="http://schemas.openxmlformats.org/officeDocument/2006/relationships" xmlns:p="http://schemas.openxmlformats.org/presentationml/2006/main">
+  <p:cSld>
+    <p:spTree>
+      <p:nvGrpSpPr>
+        <p:cNvPr id="1" name=""/>
+        <p:cNvGrpSpPr/>
+        <p:nvPr/>
+      </p:nvGrpSpPr>
+      <p:grpSpPr>
+        <a:xfrm>
+          <a:off x="0" y="0"/>
+          <a:ext cx="0" cy="0"/>
+          <a:chOff x="0" y="0"/>
+          <a:chExt cx="0" cy="0"/>
+        </a:xfrm>
+      </p:grpSpPr>
+      <p:sp>
+        <p:nvSpPr>
+          <p:cNvPr id="2" name="Slide Image Placeholder 1"/>
+          <p:cNvSpPr>
+            <a:spLocks noGrp="1" noRot="1" noChangeAspect="1"/>
+          </p:cNvSpPr>
+          <p:nvPr>
+            <p:ph type="sldImg"/>
+          </p:nvPr>
+        </p:nvSpPr>
+        <p:spPr/>
+      </p:sp>
+      <p:sp>
+        <p:nvSpPr>
+          <p:cNvPr id="3" name="Notes Placeholder 2"/>
+          <p:cNvSpPr>
+            <a:spLocks noGrp="1"/>
+          </p:cNvSpPr>
+          <p:nvPr>
+            <p:ph type="body" idx="1"/>
+          </p:nvPr>
+        </p:nvSpPr>
+        <p:spPr/>
+        <p:txBody>
+          <a:bodyPr/>
+          <a:lstStyle/>
+          <a:p>
+            <a:r>
+              <a:rPr lang="en-US" dirty="0" smtClean="0"/>
+              <a:t>Cody</a:t>
+            </a:r>
+            <a:endParaRPr lang="en-US" dirty="0"/>
+          </a:p>
+        </p:txBody>
+      </p:sp>
+      <p:sp>
+        <p:nvSpPr>
+          <p:cNvPr id="4" name="Slide Number Placeholder 3"/>
+          <p:cNvSpPr>
+            <a:spLocks noGrp="1"/>
+          </p:cNvSpPr>
+          <p:nvPr>
+            <p:ph type="sldNum" sz="quarter" idx="10"/>
+          </p:nvPr>
+        </p:nvSpPr>
+        <p:spPr/>
+        <p:txBody>
+          <a:bodyPr/>
+          <a:lstStyle/>
+          <a:p>
+            <a:fld id="{BEDFE9A2-8C49-4AD2-A34F-E00FA8CC961E}" type="slidenum">
+              <a:rPr lang="en-US" smtClean="0"/>
+              <a:t>5</a:t>
+            </a:fld>
+            <a:endParaRPr lang="en-US" dirty="0"/>
+          </a:p>
+        </p:txBody>
+      </p:sp>
+    </p:spTree>
+    <p:extLst>
+      <p:ext uri="{BB962C8B-B14F-4D97-AF65-F5344CB8AC3E}">
+        <p14:creationId xmlns:p14="http://schemas.microsoft.com/office/powerpoint/2010/main" val="406077236"/>
+      </p:ext>
+    </p:extLst>
+  </p:cSld>
+  <p:clrMapOvr>
+    <a:masterClrMapping/>
+  </p:clrMapOvr>
+</p:notes>
+</file>
+
+<file path=ppt/notesSlides/notesSlide5.xml><?xml version="1.0" encoding="utf-8"?>
+<p:notes xmlns:a="http://schemas.openxmlformats.org/drawingml/2006/main" xmlns:r="http://schemas.openxmlformats.org/officeDocument/2006/relationships" xmlns:p="http://schemas.openxmlformats.org/presentationml/2006/main">
+  <p:cSld>
+    <p:spTree>
+      <p:nvGrpSpPr>
+        <p:cNvPr id="1" name=""/>
+        <p:cNvGrpSpPr/>
+        <p:nvPr/>
+      </p:nvGrpSpPr>
+      <p:grpSpPr>
+        <a:xfrm>
+          <a:off x="0" y="0"/>
+          <a:ext cx="0" cy="0"/>
+          <a:chOff x="0" y="0"/>
+          <a:chExt cx="0" cy="0"/>
+        </a:xfrm>
+      </p:grpSpPr>
+      <p:sp>
+        <p:nvSpPr>
+          <p:cNvPr id="2" name="Slide Image Placeholder 1"/>
+          <p:cNvSpPr>
+            <a:spLocks noGrp="1" noRot="1" noChangeAspect="1"/>
+          </p:cNvSpPr>
+          <p:nvPr>
+            <p:ph type="sldImg"/>
+          </p:nvPr>
+        </p:nvSpPr>
+        <p:spPr/>
+      </p:sp>
+      <p:sp>
+        <p:nvSpPr>
+          <p:cNvPr id="3" name="Notes Placeholder 2"/>
+          <p:cNvSpPr>
+            <a:spLocks noGrp="1"/>
+          </p:cNvSpPr>
+          <p:nvPr>
+            <p:ph type="body" idx="1"/>
+          </p:nvPr>
+        </p:nvSpPr>
+        <p:spPr/>
+        <p:txBody>
+          <a:bodyPr/>
+          <a:lstStyle/>
+          <a:p>
+            <a:r>
+              <a:rPr lang="en-US" dirty="0" err="1" smtClean="0"/>
+              <a:t>Cody+Chris</a:t>
+            </a:r>
+            <a:endParaRPr lang="en-US" dirty="0"/>
+          </a:p>
+        </p:txBody>
+      </p:sp>
+      <p:sp>
+        <p:nvSpPr>
+          <p:cNvPr id="4" name="Slide Number Placeholder 3"/>
+          <p:cNvSpPr>
+            <a:spLocks noGrp="1"/>
+          </p:cNvSpPr>
+          <p:nvPr>
+            <p:ph type="sldNum" sz="quarter" idx="10"/>
+          </p:nvPr>
+        </p:nvSpPr>
+        <p:spPr/>
+        <p:txBody>
+          <a:bodyPr/>
+          <a:lstStyle/>
+          <a:p>
+            <a:fld id="{BEDFE9A2-8C49-4AD2-A34F-E00FA8CC961E}" type="slidenum">
+              <a:rPr lang="en-US" smtClean="0"/>
+              <a:t>6</a:t>
+            </a:fld>
+            <a:endParaRPr lang="en-US" dirty="0"/>
+          </a:p>
+        </p:txBody>
+      </p:sp>
+    </p:spTree>
+    <p:extLst>
+      <p:ext uri="{BB962C8B-B14F-4D97-AF65-F5344CB8AC3E}">
+        <p14:creationId xmlns:p14="http://schemas.microsoft.com/office/powerpoint/2010/main" val="3996974334"/>
+      </p:ext>
+    </p:extLst>
+  </p:cSld>
+  <p:clrMapOvr>
+    <a:masterClrMapping/>
+  </p:clrMapOvr>
+</p:notes>
+</file>
+
+<file path=ppt/notesSlides/notesSlide6.xml><?xml version="1.0" encoding="utf-8"?>
+<p:notes xmlns:a="http://schemas.openxmlformats.org/drawingml/2006/main" xmlns:r="http://schemas.openxmlformats.org/officeDocument/2006/relationships" xmlns:p="http://schemas.openxmlformats.org/presentationml/2006/main">
+  <p:cSld>
+    <p:spTree>
+      <p:nvGrpSpPr>
+        <p:cNvPr id="1" name=""/>
+        <p:cNvGrpSpPr/>
+        <p:nvPr/>
+      </p:nvGrpSpPr>
+      <p:grpSpPr>
+        <a:xfrm>
+          <a:off x="0" y="0"/>
+          <a:ext cx="0" cy="0"/>
+          <a:chOff x="0" y="0"/>
+          <a:chExt cx="0" cy="0"/>
+        </a:xfrm>
+      </p:grpSpPr>
+      <p:sp>
+        <p:nvSpPr>
+          <p:cNvPr id="2" name="Slide Image Placeholder 1"/>
+          <p:cNvSpPr>
+            <a:spLocks noGrp="1" noRot="1" noChangeAspect="1"/>
+          </p:cNvSpPr>
+          <p:nvPr>
+            <p:ph type="sldImg"/>
+          </p:nvPr>
+        </p:nvSpPr>
+        <p:spPr/>
+      </p:sp>
+      <p:sp>
+        <p:nvSpPr>
+          <p:cNvPr id="3" name="Notes Placeholder 2"/>
+          <p:cNvSpPr>
+            <a:spLocks noGrp="1"/>
+          </p:cNvSpPr>
+          <p:nvPr>
+            <p:ph type="body" idx="1"/>
+          </p:nvPr>
+        </p:nvSpPr>
+        <p:spPr/>
+        <p:txBody>
+          <a:bodyPr/>
+          <a:lstStyle/>
+          <a:p>
+            <a:r>
+              <a:rPr lang="en-US" dirty="0" smtClean="0"/>
+              <a:t>Chris</a:t>
+            </a:r>
+            <a:endParaRPr lang="en-US" dirty="0"/>
+          </a:p>
+        </p:txBody>
+      </p:sp>
+      <p:sp>
+        <p:nvSpPr>
+          <p:cNvPr id="4" name="Slide Number Placeholder 3"/>
+          <p:cNvSpPr>
+            <a:spLocks noGrp="1"/>
+          </p:cNvSpPr>
+          <p:nvPr>
+            <p:ph type="sldNum" sz="quarter" idx="10"/>
+          </p:nvPr>
+        </p:nvSpPr>
+        <p:spPr/>
+        <p:txBody>
+          <a:bodyPr/>
+          <a:lstStyle/>
+          <a:p>
+            <a:fld id="{BEDFE9A2-8C49-4AD2-A34F-E00FA8CC961E}" type="slidenum">
+              <a:rPr lang="en-US" smtClean="0"/>
+              <a:t>7</a:t>
+            </a:fld>
+            <a:endParaRPr lang="en-US" dirty="0"/>
+          </a:p>
+        </p:txBody>
+      </p:sp>
+    </p:spTree>
+    <p:extLst>
+      <p:ext uri="{BB962C8B-B14F-4D97-AF65-F5344CB8AC3E}">
+        <p14:creationId xmlns:p14="http://schemas.microsoft.com/office/powerpoint/2010/main" val="2453288199"/>
+      </p:ext>
+    </p:extLst>
+  </p:cSld>
+  <p:clrMapOvr>
+    <a:masterClrMapping/>
+  </p:clrMapOvr>
+</p:notes>
+</file>
+
+<file path=ppt/notesSlides/notesSlide7.xml><?xml version="1.0" encoding="utf-8"?>
+<p:notes xmlns:a="http://schemas.openxmlformats.org/drawingml/2006/main" xmlns:r="http://schemas.openxmlformats.org/officeDocument/2006/relationships" xmlns:p="http://schemas.openxmlformats.org/presentationml/2006/main">
+  <p:cSld>
+    <p:spTree>
+      <p:nvGrpSpPr>
+        <p:cNvPr id="1" name=""/>
+        <p:cNvGrpSpPr/>
+        <p:nvPr/>
+      </p:nvGrpSpPr>
+      <p:grpSpPr>
+        <a:xfrm>
+          <a:off x="0" y="0"/>
+          <a:ext cx="0" cy="0"/>
+          <a:chOff x="0" y="0"/>
+          <a:chExt cx="0" cy="0"/>
+        </a:xfrm>
+      </p:grpSpPr>
+      <p:sp>
+        <p:nvSpPr>
+          <p:cNvPr id="2" name="Slide Image Placeholder 1"/>
+          <p:cNvSpPr>
+            <a:spLocks noGrp="1" noRot="1" noChangeAspect="1"/>
+          </p:cNvSpPr>
+          <p:nvPr>
+            <p:ph type="sldImg"/>
+          </p:nvPr>
+        </p:nvSpPr>
+        <p:spPr/>
+      </p:sp>
+      <p:sp>
+        <p:nvSpPr>
+          <p:cNvPr id="3" name="Notes Placeholder 2"/>
+          <p:cNvSpPr>
+            <a:spLocks noGrp="1"/>
+          </p:cNvSpPr>
+          <p:nvPr>
+            <p:ph type="body" idx="1"/>
+          </p:nvPr>
+        </p:nvSpPr>
+        <p:spPr/>
+        <p:txBody>
+          <a:bodyPr/>
+          <a:lstStyle/>
+          <a:p>
+            <a:r>
+              <a:rPr lang="en-US" dirty="0" smtClean="0"/>
+              <a:t>Chris</a:t>
+            </a:r>
+            <a:endParaRPr lang="en-US" dirty="0"/>
+          </a:p>
+        </p:txBody>
+      </p:sp>
+      <p:sp>
+        <p:nvSpPr>
+          <p:cNvPr id="4" name="Slide Number Placeholder 3"/>
+          <p:cNvSpPr>
+            <a:spLocks noGrp="1"/>
+          </p:cNvSpPr>
+          <p:nvPr>
+            <p:ph type="sldNum" sz="quarter" idx="10"/>
+          </p:nvPr>
+        </p:nvSpPr>
+        <p:spPr/>
+        <p:txBody>
+          <a:bodyPr/>
+          <a:lstStyle/>
+          <a:p>
+            <a:fld id="{BEDFE9A2-8C49-4AD2-A34F-E00FA8CC961E}" type="slidenum">
+              <a:rPr lang="en-US" smtClean="0"/>
+              <a:t>8</a:t>
+            </a:fld>
+            <a:endParaRPr lang="en-US" dirty="0"/>
+          </a:p>
+        </p:txBody>
+      </p:sp>
+    </p:spTree>
+    <p:extLst>
+      <p:ext uri="{BB962C8B-B14F-4D97-AF65-F5344CB8AC3E}">
+        <p14:creationId xmlns:p14="http://schemas.microsoft.com/office/powerpoint/2010/main" val="1941561386"/>
+      </p:ext>
+    </p:extLst>
+  </p:cSld>
+  <p:clrMapOvr>
+    <a:masterClrMapping/>
+  </p:clrMapOvr>
+</p:notes>
+</file>
+
 <file path=ppt/slideLayouts/slideLayout1.xml><?xml version="1.0" encoding="utf-8"?>
 <p:sldLayout xmlns:a="http://schemas.openxmlformats.org/drawingml/2006/main" xmlns:r="http://schemas.openxmlformats.org/officeDocument/2006/relationships" xmlns:p="http://schemas.openxmlformats.org/presentationml/2006/main" type="title" preserve="1">
   <p:cSld name="Title Slide">
@@ -308,7 +1277,7 @@
               <a:rPr lang="en-US" smtClean="0"/>
               <a:t>5/16/2012</a:t>
             </a:fld>
-            <a:endParaRPr lang="en-US"/>
+            <a:endParaRPr lang="en-US" dirty="0"/>
           </a:p>
         </p:txBody>
       </p:sp>
@@ -331,7 +1300,7 @@
               <a:rPr lang="en-US" smtClean="0"/>
               <a:t>‹#›</a:t>
             </a:fld>
-            <a:endParaRPr lang="en-US"/>
+            <a:endParaRPr lang="en-US" dirty="0"/>
           </a:p>
         </p:txBody>
       </p:sp>
@@ -350,7 +1319,7 @@
           <a:bodyPr/>
           <a:lstStyle/>
           <a:p>
-            <a:endParaRPr lang="en-US"/>
+            <a:endParaRPr lang="en-US" dirty="0"/>
           </a:p>
         </p:txBody>
       </p:sp>
@@ -473,7 +1442,7 @@
               <a:rPr lang="en-US" smtClean="0"/>
               <a:t>5/16/2012</a:t>
             </a:fld>
-            <a:endParaRPr lang="en-US"/>
+            <a:endParaRPr lang="en-US" dirty="0"/>
           </a:p>
         </p:txBody>
       </p:sp>
@@ -492,7 +1461,7 @@
           <a:bodyPr/>
           <a:lstStyle/>
           <a:p>
-            <a:endParaRPr lang="en-US"/>
+            <a:endParaRPr lang="en-US" dirty="0"/>
           </a:p>
         </p:txBody>
       </p:sp>
@@ -515,7 +1484,7 @@
               <a:rPr lang="en-US" smtClean="0"/>
               <a:t>‹#›</a:t>
             </a:fld>
-            <a:endParaRPr lang="en-US"/>
+            <a:endParaRPr lang="en-US" dirty="0"/>
           </a:p>
         </p:txBody>
       </p:sp>
@@ -648,7 +1617,7 @@
               <a:rPr lang="en-US" smtClean="0"/>
               <a:t>5/16/2012</a:t>
             </a:fld>
-            <a:endParaRPr lang="en-US"/>
+            <a:endParaRPr lang="en-US" dirty="0"/>
           </a:p>
         </p:txBody>
       </p:sp>
@@ -667,7 +1636,7 @@
           <a:bodyPr/>
           <a:lstStyle/>
           <a:p>
-            <a:endParaRPr lang="en-US"/>
+            <a:endParaRPr lang="en-US" dirty="0"/>
           </a:p>
         </p:txBody>
       </p:sp>
@@ -690,7 +1659,7 @@
               <a:rPr lang="en-US" smtClean="0"/>
               <a:t>‹#›</a:t>
             </a:fld>
-            <a:endParaRPr lang="en-US"/>
+            <a:endParaRPr lang="en-US" dirty="0"/>
           </a:p>
         </p:txBody>
       </p:sp>
@@ -831,7 +1800,7 @@
               <a:rPr lang="en-US" smtClean="0"/>
               <a:t>5/16/2012</a:t>
             </a:fld>
-            <a:endParaRPr lang="en-US"/>
+            <a:endParaRPr lang="en-US" dirty="0"/>
           </a:p>
         </p:txBody>
       </p:sp>
@@ -850,7 +1819,7 @@
           <a:bodyPr/>
           <a:lstStyle/>
           <a:p>
-            <a:endParaRPr lang="en-US"/>
+            <a:endParaRPr lang="en-US" dirty="0"/>
           </a:p>
         </p:txBody>
       </p:sp>
@@ -873,7 +1842,7 @@
               <a:rPr lang="en-US" smtClean="0"/>
               <a:t>‹#›</a:t>
             </a:fld>
-            <a:endParaRPr lang="en-US"/>
+            <a:endParaRPr lang="en-US" dirty="0"/>
           </a:p>
         </p:txBody>
       </p:sp>
@@ -1093,7 +2062,7 @@
               <a:rPr lang="en-US" smtClean="0"/>
               <a:t>5/16/2012</a:t>
             </a:fld>
-            <a:endParaRPr lang="en-US"/>
+            <a:endParaRPr lang="en-US" dirty="0"/>
           </a:p>
         </p:txBody>
       </p:sp>
@@ -1112,7 +2081,7 @@
           <a:bodyPr/>
           <a:lstStyle/>
           <a:p>
-            <a:endParaRPr lang="en-US"/>
+            <a:endParaRPr lang="en-US" dirty="0"/>
           </a:p>
         </p:txBody>
       </p:sp>
@@ -1135,7 +2104,7 @@
               <a:rPr lang="en-US" smtClean="0"/>
               <a:t>‹#›</a:t>
             </a:fld>
-            <a:endParaRPr lang="en-US"/>
+            <a:endParaRPr lang="en-US" dirty="0"/>
           </a:p>
         </p:txBody>
       </p:sp>
@@ -1185,7 +2154,7 @@
           <a:lstStyle/>
           <a:p>
             <a:pPr algn="ctr"/>
-            <a:endParaRPr lang="en-US"/>
+            <a:endParaRPr lang="en-US" dirty="0"/>
           </a:p>
         </p:txBody>
       </p:sp>
@@ -1235,7 +2204,7 @@
           <a:lstStyle/>
           <a:p>
             <a:pPr algn="ctr"/>
-            <a:endParaRPr lang="en-US"/>
+            <a:endParaRPr lang="en-US" dirty="0"/>
           </a:p>
         </p:txBody>
       </p:sp>
@@ -1285,7 +2254,7 @@
           <a:lstStyle/>
           <a:p>
             <a:pPr algn="ctr"/>
-            <a:endParaRPr lang="en-US"/>
+            <a:endParaRPr lang="en-US" dirty="0"/>
           </a:p>
         </p:txBody>
       </p:sp>
@@ -1441,7 +2410,7 @@
               <a:rPr lang="en-US" smtClean="0"/>
               <a:t>5/16/2012</a:t>
             </a:fld>
-            <a:endParaRPr lang="en-US"/>
+            <a:endParaRPr lang="en-US" dirty="0"/>
           </a:p>
         </p:txBody>
       </p:sp>
@@ -1460,7 +2429,7 @@
           <a:bodyPr/>
           <a:lstStyle/>
           <a:p>
-            <a:endParaRPr lang="en-US"/>
+            <a:endParaRPr lang="en-US" dirty="0"/>
           </a:p>
         </p:txBody>
       </p:sp>
@@ -1483,7 +2452,7 @@
               <a:rPr lang="en-US" smtClean="0"/>
               <a:t>‹#›</a:t>
             </a:fld>
-            <a:endParaRPr lang="en-US"/>
+            <a:endParaRPr lang="en-US" dirty="0"/>
           </a:p>
         </p:txBody>
       </p:sp>
@@ -1749,7 +2718,7 @@
               <a:rPr lang="en-US" smtClean="0"/>
               <a:t>5/16/2012</a:t>
             </a:fld>
-            <a:endParaRPr lang="en-US"/>
+            <a:endParaRPr lang="en-US" dirty="0"/>
           </a:p>
         </p:txBody>
       </p:sp>
@@ -1768,7 +2737,7 @@
           <a:bodyPr/>
           <a:lstStyle/>
           <a:p>
-            <a:endParaRPr lang="en-US"/>
+            <a:endParaRPr lang="en-US" dirty="0"/>
           </a:p>
         </p:txBody>
       </p:sp>
@@ -1791,7 +2760,7 @@
               <a:rPr lang="en-US" smtClean="0"/>
               <a:t>‹#›</a:t>
             </a:fld>
-            <a:endParaRPr lang="en-US"/>
+            <a:endParaRPr lang="en-US" dirty="0"/>
           </a:p>
         </p:txBody>
       </p:sp>
@@ -1976,7 +2945,7 @@
               <a:rPr lang="en-US" smtClean="0"/>
               <a:t>5/16/2012</a:t>
             </a:fld>
-            <a:endParaRPr lang="en-US"/>
+            <a:endParaRPr lang="en-US" dirty="0"/>
           </a:p>
         </p:txBody>
       </p:sp>
@@ -1995,7 +2964,7 @@
           <a:bodyPr/>
           <a:lstStyle/>
           <a:p>
-            <a:endParaRPr lang="en-US"/>
+            <a:endParaRPr lang="en-US" dirty="0"/>
           </a:p>
         </p:txBody>
       </p:sp>
@@ -2018,7 +2987,7 @@
               <a:rPr lang="en-US" smtClean="0"/>
               <a:t>‹#›</a:t>
             </a:fld>
-            <a:endParaRPr lang="en-US"/>
+            <a:endParaRPr lang="en-US" dirty="0"/>
           </a:p>
         </p:txBody>
       </p:sp>
@@ -2066,7 +3035,7 @@
               <a:rPr lang="en-US" smtClean="0"/>
               <a:t>5/16/2012</a:t>
             </a:fld>
-            <a:endParaRPr lang="en-US"/>
+            <a:endParaRPr lang="en-US" dirty="0"/>
           </a:p>
         </p:txBody>
       </p:sp>
@@ -2085,7 +3054,7 @@
           <a:bodyPr/>
           <a:lstStyle/>
           <a:p>
-            <a:endParaRPr lang="en-US"/>
+            <a:endParaRPr lang="en-US" dirty="0"/>
           </a:p>
         </p:txBody>
       </p:sp>
@@ -2108,7 +3077,7 @@
               <a:rPr lang="en-US" smtClean="0"/>
               <a:t>‹#›</a:t>
             </a:fld>
-            <a:endParaRPr lang="en-US"/>
+            <a:endParaRPr lang="en-US" dirty="0"/>
           </a:p>
         </p:txBody>
       </p:sp>
@@ -2354,7 +3323,7 @@
               <a:rPr lang="en-US" smtClean="0"/>
               <a:t>5/16/2012</a:t>
             </a:fld>
-            <a:endParaRPr lang="en-US"/>
+            <a:endParaRPr lang="en-US" dirty="0"/>
           </a:p>
         </p:txBody>
       </p:sp>
@@ -2373,7 +3342,7 @@
           <a:bodyPr/>
           <a:lstStyle/>
           <a:p>
-            <a:endParaRPr lang="en-US"/>
+            <a:endParaRPr lang="en-US" dirty="0"/>
           </a:p>
         </p:txBody>
       </p:sp>
@@ -2396,7 +3365,7 @@
               <a:rPr lang="en-US" smtClean="0"/>
               <a:t>‹#›</a:t>
             </a:fld>
-            <a:endParaRPr lang="en-US"/>
+            <a:endParaRPr lang="en-US" dirty="0"/>
           </a:p>
         </p:txBody>
       </p:sp>
@@ -2530,7 +3499,7 @@
           </a:lstStyle>
           <a:p>
             <a:r>
-              <a:rPr lang="en-US" smtClean="0"/>
+              <a:rPr lang="en-US" dirty="0" smtClean="0"/>
               <a:t>Click icon to add picture</a:t>
             </a:r>
             <a:endParaRPr lang="en-US" dirty="0"/>
@@ -2623,7 +3592,7 @@
               <a:rPr lang="en-US" smtClean="0"/>
               <a:t>5/16/2012</a:t>
             </a:fld>
-            <a:endParaRPr lang="en-US"/>
+            <a:endParaRPr lang="en-US" dirty="0"/>
           </a:p>
         </p:txBody>
       </p:sp>
@@ -2642,7 +3611,7 @@
           <a:bodyPr/>
           <a:lstStyle/>
           <a:p>
-            <a:endParaRPr lang="en-US"/>
+            <a:endParaRPr lang="en-US" dirty="0"/>
           </a:p>
         </p:txBody>
       </p:sp>
@@ -2665,7 +3634,7 @@
               <a:rPr lang="en-US" smtClean="0"/>
               <a:t>‹#›</a:t>
             </a:fld>
-            <a:endParaRPr lang="en-US"/>
+            <a:endParaRPr lang="en-US" dirty="0"/>
           </a:p>
         </p:txBody>
       </p:sp>
@@ -2833,7 +3802,7 @@
               <a:rPr lang="en-US" smtClean="0"/>
               <a:t>5/16/2012</a:t>
             </a:fld>
-            <a:endParaRPr lang="en-US"/>
+            <a:endParaRPr lang="en-US" dirty="0"/>
           </a:p>
         </p:txBody>
       </p:sp>
@@ -2872,7 +3841,7 @@
             </a:lvl1pPr>
           </a:lstStyle>
           <a:p>
-            <a:endParaRPr lang="en-US"/>
+            <a:endParaRPr lang="en-US" dirty="0"/>
           </a:p>
         </p:txBody>
       </p:sp>
@@ -2915,7 +3884,7 @@
               <a:rPr lang="en-US" smtClean="0"/>
               <a:t>‹#›</a:t>
             </a:fld>
-            <a:endParaRPr lang="en-US"/>
+            <a:endParaRPr lang="en-US" dirty="0"/>
           </a:p>
         </p:txBody>
       </p:sp>
@@ -2965,7 +3934,7 @@
           <a:lstStyle/>
           <a:p>
             <a:pPr marL="0" algn="ctr" defTabSz="914400" rtl="0" eaLnBrk="1" latinLnBrk="0" hangingPunct="1"/>
-            <a:endParaRPr lang="en-US" sz="1800" kern="1200">
+            <a:endParaRPr lang="en-US" sz="1800" kern="1200" dirty="0">
               <a:solidFill>
                 <a:schemeClr val="lt1"/>
               </a:solidFill>
@@ -3022,7 +3991,7 @@
           <a:lstStyle/>
           <a:p>
             <a:pPr algn="ctr"/>
-            <a:endParaRPr lang="en-US"/>
+            <a:endParaRPr lang="en-US" dirty="0"/>
           </a:p>
         </p:txBody>
       </p:sp>
@@ -3409,6 +4378,101 @@
           </a:p>
         </p:txBody>
       </p:sp>
+      <p:pic>
+        <p:nvPicPr>
+          <p:cNvPr id="5" name="Picture 2" descr="http://abduzeedo.com/files/imagecache/img210x170/originals/Battleship-Poster-2.jpg"/>
+          <p:cNvPicPr>
+            <a:picLocks noChangeAspect="1" noChangeArrowheads="1"/>
+          </p:cNvPicPr>
+          <p:nvPr/>
+        </p:nvPicPr>
+        <p:blipFill>
+          <a:blip r:embed="rId2">
+            <a:extLst>
+              <a:ext uri="{28A0092B-C50C-407E-A947-70E740481C1C}">
+                <a14:useLocalDpi xmlns:a14="http://schemas.microsoft.com/office/drawing/2010/main" val="0"/>
+              </a:ext>
+            </a:extLst>
+          </a:blip>
+          <a:srcRect/>
+          <a:stretch>
+            <a:fillRect/>
+          </a:stretch>
+        </p:blipFill>
+        <p:spPr bwMode="auto">
+          <a:xfrm>
+            <a:off x="0" y="-38686"/>
+            <a:ext cx="9148823" cy="6903438"/>
+          </a:xfrm>
+          <a:prstGeom prst="rect">
+            <a:avLst/>
+          </a:prstGeom>
+          <a:noFill/>
+          <a:extLst>
+            <a:ext uri="{909E8E84-426E-40DD-AFC4-6F175D3DCCD1}">
+              <a14:hiddenFill xmlns:a14="http://schemas.microsoft.com/office/drawing/2010/main">
+                <a:solidFill>
+                  <a:srgbClr val="FFFFFF"/>
+                </a:solidFill>
+              </a14:hiddenFill>
+            </a:ext>
+          </a:extLst>
+        </p:spPr>
+      </p:pic>
+      <p:sp>
+        <p:nvSpPr>
+          <p:cNvPr id="6" name="TextBox 5"/>
+          <p:cNvSpPr txBox="1"/>
+          <p:nvPr/>
+        </p:nvSpPr>
+        <p:spPr>
+          <a:xfrm>
+            <a:off x="2310128" y="6463031"/>
+            <a:ext cx="5081272" cy="369332"/>
+          </a:xfrm>
+          <a:prstGeom prst="rect">
+            <a:avLst/>
+          </a:prstGeom>
+          <a:noFill/>
+        </p:spPr>
+        <p:txBody>
+          <a:bodyPr wrap="square" rtlCol="0">
+            <a:spAutoFit/>
+          </a:bodyPr>
+          <a:lstStyle/>
+          <a:p>
+            <a:r>
+              <a:rPr lang="en-US" dirty="0" smtClean="0">
+                <a:solidFill>
+                  <a:srgbClr val="FF0000"/>
+                </a:solidFill>
+              </a:rPr>
+              <a:t>Chris Hoorn    </a:t>
+            </a:r>
+            <a:r>
+              <a:rPr lang="en-US" dirty="0" smtClean="0">
+                <a:solidFill>
+                  <a:schemeClr val="bg1"/>
+                </a:solidFill>
+              </a:rPr>
+              <a:t>Cody Plungis    </a:t>
+            </a:r>
+            <a:r>
+              <a:rPr lang="en-US" dirty="0" smtClean="0">
+                <a:solidFill>
+                  <a:srgbClr val="FF0000"/>
+                </a:solidFill>
+              </a:rPr>
+              <a:t>Tiffany Pohl</a:t>
+            </a:r>
+            <a:endParaRPr lang="en-US" dirty="0">
+              <a:solidFill>
+                <a:srgbClr val="FF0000"/>
+              </a:solidFill>
+            </a:endParaRPr>
+          </a:p>
+        </p:txBody>
+      </p:sp>
     </p:spTree>
     <p:extLst>
       <p:ext uri="{BB962C8B-B14F-4D97-AF65-F5344CB8AC3E}">
@@ -3477,30 +4541,14 @@
           <a:bodyPr/>
           <a:lstStyle/>
           <a:p>
+            <a:pPr marL="0" indent="0">
+              <a:buNone/>
+            </a:pPr>
             <a:r>
               <a:rPr lang="en-US" dirty="0" smtClean="0"/>
-              <a:t>Team</a:t>
-            </a:r>
-          </a:p>
-          <a:p>
-            <a:pPr lvl="1"/>
-            <a:r>
-              <a:rPr lang="en-US" dirty="0" smtClean="0"/>
-              <a:t>Things</a:t>
-            </a:r>
-          </a:p>
-          <a:p>
-            <a:r>
-              <a:rPr lang="en-US" dirty="0" smtClean="0"/>
-              <a:t>Project</a:t>
-            </a:r>
-          </a:p>
-          <a:p>
-            <a:pPr lvl="1"/>
-            <a:r>
-              <a:rPr lang="en-US" dirty="0" smtClean="0"/>
-              <a:t>Other things!</a:t>
-            </a:r>
+              <a:t>Outline of Battleship</a:t>
+            </a:r>
+            <a:endParaRPr lang="en-US" dirty="0" smtClean="0"/>
           </a:p>
         </p:txBody>
       </p:sp>
@@ -3572,7 +4620,11 @@
           <a:bodyPr/>
           <a:lstStyle/>
           <a:p>
-            <a:endParaRPr lang="en-US"/>
+            <a:r>
+              <a:rPr lang="en-US" dirty="0" smtClean="0"/>
+              <a:t>Take from problem statement</a:t>
+            </a:r>
+            <a:endParaRPr lang="en-US" dirty="0"/>
           </a:p>
         </p:txBody>
       </p:sp>
@@ -3646,7 +4698,23 @@
           <a:p>
             <a:r>
               <a:rPr lang="en-US" dirty="0" smtClean="0"/>
-              <a:t>&lt;Class Diagram&gt;</a:t>
+              <a:t>&lt;Class Diagram</a:t>
+            </a:r>
+            <a:r>
+              <a:rPr lang="en-US" dirty="0" smtClean="0"/>
+              <a:t>&gt;</a:t>
+            </a:r>
+          </a:p>
+          <a:p>
+            <a:endParaRPr lang="en-US" dirty="0"/>
+          </a:p>
+          <a:p>
+            <a:endParaRPr lang="en-US" dirty="0" smtClean="0"/>
+          </a:p>
+          <a:p>
+            <a:r>
+              <a:rPr lang="en-US" dirty="0" smtClean="0"/>
+              <a:t>Talk about how it works</a:t>
             </a:r>
             <a:endParaRPr lang="en-US" dirty="0"/>
           </a:p>
@@ -3720,7 +4788,11 @@
           <a:bodyPr/>
           <a:lstStyle/>
           <a:p>
-            <a:endParaRPr lang="en-US"/>
+            <a:r>
+              <a:rPr lang="en-US" dirty="0" smtClean="0"/>
+              <a:t>Show it</a:t>
+            </a:r>
+            <a:endParaRPr lang="en-US" dirty="0"/>
           </a:p>
         </p:txBody>
       </p:sp>
@@ -3792,7 +4864,32 @@
           <a:bodyPr/>
           <a:lstStyle/>
           <a:p>
-            <a:endParaRPr lang="en-US"/>
+            <a:r>
+              <a:rPr lang="en-US" dirty="0" smtClean="0"/>
+              <a:t>Test cases</a:t>
+            </a:r>
+          </a:p>
+          <a:p>
+            <a:endParaRPr lang="en-US" dirty="0"/>
+          </a:p>
+          <a:p>
+            <a:r>
+              <a:rPr lang="en-US" dirty="0" smtClean="0"/>
+              <a:t>Changes throughout project</a:t>
+            </a:r>
+          </a:p>
+          <a:p>
+            <a:endParaRPr lang="en-US" dirty="0"/>
+          </a:p>
+          <a:p>
+            <a:endParaRPr lang="en-US" dirty="0" smtClean="0"/>
+          </a:p>
+          <a:p>
+            <a:r>
+              <a:rPr lang="en-US" dirty="0" smtClean="0"/>
+              <a:t>GUI user scenarios</a:t>
+            </a:r>
+            <a:endParaRPr lang="en-US" dirty="0"/>
           </a:p>
         </p:txBody>
       </p:sp>
@@ -3864,6 +4961,10 @@
           <a:bodyPr/>
           <a:lstStyle/>
           <a:p>
+            <a:r>
+              <a:rPr lang="en-US" dirty="0" smtClean="0"/>
+              <a:t>Taken from metrics</a:t>
+            </a:r>
             <a:endParaRPr lang="en-US" dirty="0"/>
           </a:p>
         </p:txBody>
@@ -3936,7 +5037,11 @@
           <a:bodyPr/>
           <a:lstStyle/>
           <a:p>
-            <a:endParaRPr lang="en-US"/>
+            <a:r>
+              <a:rPr lang="en-US" dirty="0" smtClean="0"/>
+              <a:t>Taken from metrics</a:t>
+            </a:r>
+            <a:endParaRPr lang="en-US" dirty="0"/>
           </a:p>
         </p:txBody>
       </p:sp>
@@ -4231,4 +5336,289 @@
   <a:objectDefaults/>
   <a:extraClrSchemeLst/>
 </a:theme>
+</file>
+
+<file path=ppt/theme/theme2.xml><?xml version="1.0" encoding="utf-8"?>
+<a:theme xmlns:a="http://schemas.openxmlformats.org/drawingml/2006/main" name="Office Theme">
+  <a:themeElements>
+    <a:clrScheme name="Office">
+      <a:dk1>
+        <a:sysClr val="windowText" lastClr="000000"/>
+      </a:dk1>
+      <a:lt1>
+        <a:sysClr val="window" lastClr="FFFFFF"/>
+      </a:lt1>
+      <a:dk2>
+        <a:srgbClr val="1F497D"/>
+      </a:dk2>
+      <a:lt2>
+        <a:srgbClr val="EEECE1"/>
+      </a:lt2>
+      <a:accent1>
+        <a:srgbClr val="4F81BD"/>
+      </a:accent1>
+      <a:accent2>
+        <a:srgbClr val="C0504D"/>
+      </a:accent2>
+      <a:accent3>
+        <a:srgbClr val="9BBB59"/>
+      </a:accent3>
+      <a:accent4>
+        <a:srgbClr val="8064A2"/>
+      </a:accent4>
+      <a:accent5>
+        <a:srgbClr val="4BACC6"/>
+      </a:accent5>
+      <a:accent6>
+        <a:srgbClr val="F79646"/>
+      </a:accent6>
+      <a:hlink>
+        <a:srgbClr val="0000FF"/>
+      </a:hlink>
+      <a:folHlink>
+        <a:srgbClr val="800080"/>
+      </a:folHlink>
+    </a:clrScheme>
+    <a:fontScheme name="Office">
+      <a:majorFont>
+        <a:latin typeface="Calibri"/>
+        <a:ea typeface=""/>
+        <a:cs typeface=""/>
+        <a:font script="Jpan" typeface="ＭＳ Ｐゴシック"/>
+        <a:font script="Hang" typeface="맑은 고딕"/>
+        <a:font script="Hans" typeface="宋体"/>
+        <a:font script="Hant" typeface="新細明體"/>
+        <a:font script="Arab" typeface="Times New Roman"/>
+        <a:font script="Hebr" typeface="Times New Roman"/>
+        <a:font script="Thai" typeface="Angsana New"/>
+        <a:font script="Ethi" typeface="Nyala"/>
+        <a:font script="Beng" typeface="Vrinda"/>
+        <a:font script="Gujr" typeface="Shruti"/>
+        <a:font script="Khmr" typeface="MoolBoran"/>
+        <a:font script="Knda" typeface="Tunga"/>
+        <a:font script="Guru" typeface="Raavi"/>
+        <a:font script="Cans" typeface="Euphemia"/>
+        <a:font script="Cher" typeface="Plantagenet Cherokee"/>
+        <a:font script="Yiii" typeface="Microsoft Yi Baiti"/>
+        <a:font script="Tibt" typeface="Microsoft Himalaya"/>
+        <a:font script="Thaa" typeface="MV Boli"/>
+        <a:font script="Deva" typeface="Mangal"/>
+        <a:font script="Telu" typeface="Gautami"/>
+        <a:font script="Taml" typeface="Latha"/>
+        <a:font script="Syrc" typeface="Estrangelo Edessa"/>
+        <a:font script="Orya" typeface="Kalinga"/>
+        <a:font script="Mlym" typeface="Kartika"/>
+        <a:font script="Laoo" typeface="DokChampa"/>
+        <a:font script="Sinh" typeface="Iskoola Pota"/>
+        <a:font script="Mong" typeface="Mongolian Baiti"/>
+        <a:font script="Viet" typeface="Times New Roman"/>
+        <a:font script="Uigh" typeface="Microsoft Uighur"/>
+        <a:font script="Geor" typeface="Sylfaen"/>
+      </a:majorFont>
+      <a:minorFont>
+        <a:latin typeface="Calibri"/>
+        <a:ea typeface=""/>
+        <a:cs typeface=""/>
+        <a:font script="Jpan" typeface="ＭＳ Ｐゴシック"/>
+        <a:font script="Hang" typeface="맑은 고딕"/>
+        <a:font script="Hans" typeface="宋体"/>
+        <a:font script="Hant" typeface="新細明體"/>
+        <a:font script="Arab" typeface="Arial"/>
+        <a:font script="Hebr" typeface="Arial"/>
+        <a:font script="Thai" typeface="Cordia New"/>
+        <a:font script="Ethi" typeface="Nyala"/>
+        <a:font script="Beng" typeface="Vrinda"/>
+        <a:font script="Gujr" typeface="Shruti"/>
+        <a:font script="Khmr" typeface="DaunPenh"/>
+        <a:font script="Knda" typeface="Tunga"/>
+        <a:font script="Guru" typeface="Raavi"/>
+        <a:font script="Cans" typeface="Euphemia"/>
+        <a:font script="Cher" typeface="Plantagenet Cherokee"/>
+        <a:font script="Yiii" typeface="Microsoft Yi Baiti"/>
+        <a:font script="Tibt" typeface="Microsoft Himalaya"/>
+        <a:font script="Thaa" typeface="MV Boli"/>
+        <a:font script="Deva" typeface="Mangal"/>
+        <a:font script="Telu" typeface="Gautami"/>
+        <a:font script="Taml" typeface="Latha"/>
+        <a:font script="Syrc" typeface="Estrangelo Edessa"/>
+        <a:font script="Orya" typeface="Kalinga"/>
+        <a:font script="Mlym" typeface="Kartika"/>
+        <a:font script="Laoo" typeface="DokChampa"/>
+        <a:font script="Sinh" typeface="Iskoola Pota"/>
+        <a:font script="Mong" typeface="Mongolian Baiti"/>
+        <a:font script="Viet" typeface="Arial"/>
+        <a:font script="Uigh" typeface="Microsoft Uighur"/>
+        <a:font script="Geor" typeface="Sylfaen"/>
+      </a:minorFont>
+    </a:fontScheme>
+    <a:fmtScheme name="Office">
+      <a:fillStyleLst>
+        <a:solidFill>
+          <a:schemeClr val="phClr"/>
+        </a:solidFill>
+        <a:gradFill rotWithShape="1">
+          <a:gsLst>
+            <a:gs pos="0">
+              <a:schemeClr val="phClr">
+                <a:tint val="50000"/>
+                <a:satMod val="300000"/>
+              </a:schemeClr>
+            </a:gs>
+            <a:gs pos="35000">
+              <a:schemeClr val="phClr">
+                <a:tint val="37000"/>
+                <a:satMod val="300000"/>
+              </a:schemeClr>
+            </a:gs>
+            <a:gs pos="100000">
+              <a:schemeClr val="phClr">
+                <a:tint val="15000"/>
+                <a:satMod val="350000"/>
+              </a:schemeClr>
+            </a:gs>
+          </a:gsLst>
+          <a:lin ang="16200000" scaled="1"/>
+        </a:gradFill>
+        <a:gradFill rotWithShape="1">
+          <a:gsLst>
+            <a:gs pos="0">
+              <a:schemeClr val="phClr">
+                <a:shade val="51000"/>
+                <a:satMod val="130000"/>
+              </a:schemeClr>
+            </a:gs>
+            <a:gs pos="80000">
+              <a:schemeClr val="phClr">
+                <a:shade val="93000"/>
+                <a:satMod val="130000"/>
+              </a:schemeClr>
+            </a:gs>
+            <a:gs pos="100000">
+              <a:schemeClr val="phClr">
+                <a:shade val="94000"/>
+                <a:satMod val="135000"/>
+              </a:schemeClr>
+            </a:gs>
+          </a:gsLst>
+          <a:lin ang="16200000" scaled="0"/>
+        </a:gradFill>
+      </a:fillStyleLst>
+      <a:lnStyleLst>
+        <a:ln w="9525" cap="flat" cmpd="sng" algn="ctr">
+          <a:solidFill>
+            <a:schemeClr val="phClr">
+              <a:shade val="95000"/>
+              <a:satMod val="105000"/>
+            </a:schemeClr>
+          </a:solidFill>
+          <a:prstDash val="solid"/>
+        </a:ln>
+        <a:ln w="25400" cap="flat" cmpd="sng" algn="ctr">
+          <a:solidFill>
+            <a:schemeClr val="phClr"/>
+          </a:solidFill>
+          <a:prstDash val="solid"/>
+        </a:ln>
+        <a:ln w="38100" cap="flat" cmpd="sng" algn="ctr">
+          <a:solidFill>
+            <a:schemeClr val="phClr"/>
+          </a:solidFill>
+          <a:prstDash val="solid"/>
+        </a:ln>
+      </a:lnStyleLst>
+      <a:effectStyleLst>
+        <a:effectStyle>
+          <a:effectLst>
+            <a:outerShdw blurRad="40000" dist="20000" dir="5400000" rotWithShape="0">
+              <a:srgbClr val="000000">
+                <a:alpha val="38000"/>
+              </a:srgbClr>
+            </a:outerShdw>
+          </a:effectLst>
+        </a:effectStyle>
+        <a:effectStyle>
+          <a:effectLst>
+            <a:outerShdw blurRad="40000" dist="23000" dir="5400000" rotWithShape="0">
+              <a:srgbClr val="000000">
+                <a:alpha val="35000"/>
+              </a:srgbClr>
+            </a:outerShdw>
+          </a:effectLst>
+        </a:effectStyle>
+        <a:effectStyle>
+          <a:effectLst>
+            <a:outerShdw blurRad="40000" dist="23000" dir="5400000" rotWithShape="0">
+              <a:srgbClr val="000000">
+                <a:alpha val="35000"/>
+              </a:srgbClr>
+            </a:outerShdw>
+          </a:effectLst>
+          <a:scene3d>
+            <a:camera prst="orthographicFront">
+              <a:rot lat="0" lon="0" rev="0"/>
+            </a:camera>
+            <a:lightRig rig="threePt" dir="t">
+              <a:rot lat="0" lon="0" rev="1200000"/>
+            </a:lightRig>
+          </a:scene3d>
+          <a:sp3d>
+            <a:bevelT w="63500" h="25400"/>
+          </a:sp3d>
+        </a:effectStyle>
+      </a:effectStyleLst>
+      <a:bgFillStyleLst>
+        <a:solidFill>
+          <a:schemeClr val="phClr"/>
+        </a:solidFill>
+        <a:gradFill rotWithShape="1">
+          <a:gsLst>
+            <a:gs pos="0">
+              <a:schemeClr val="phClr">
+                <a:tint val="40000"/>
+                <a:satMod val="350000"/>
+              </a:schemeClr>
+            </a:gs>
+            <a:gs pos="40000">
+              <a:schemeClr val="phClr">
+                <a:tint val="45000"/>
+                <a:shade val="99000"/>
+                <a:satMod val="350000"/>
+              </a:schemeClr>
+            </a:gs>
+            <a:gs pos="100000">
+              <a:schemeClr val="phClr">
+                <a:shade val="20000"/>
+                <a:satMod val="255000"/>
+              </a:schemeClr>
+            </a:gs>
+          </a:gsLst>
+          <a:path path="circle">
+            <a:fillToRect l="50000" t="-80000" r="50000" b="180000"/>
+          </a:path>
+        </a:gradFill>
+        <a:gradFill rotWithShape="1">
+          <a:gsLst>
+            <a:gs pos="0">
+              <a:schemeClr val="phClr">
+                <a:tint val="80000"/>
+                <a:satMod val="300000"/>
+              </a:schemeClr>
+            </a:gs>
+            <a:gs pos="100000">
+              <a:schemeClr val="phClr">
+                <a:shade val="30000"/>
+                <a:satMod val="200000"/>
+              </a:schemeClr>
+            </a:gs>
+          </a:gsLst>
+          <a:path path="circle">
+            <a:fillToRect l="50000" t="50000" r="50000" b="50000"/>
+          </a:path>
+        </a:gradFill>
+      </a:bgFillStyleLst>
+    </a:fmtScheme>
+  </a:themeElements>
+  <a:objectDefaults/>
+  <a:extraClrSchemeLst/>
+</a:theme>
 </file>
</xml_diff>

<commit_message>
changed publics to privates and correctd metrics and added portion of powerpoint
</commit_message>
<xml_diff>
--- a/Documents/Project Presentation/Battleship Project Presentation.pptx
+++ b/Documents/Project Presentation/Battleship Project Presentation.pptx
@@ -199,7 +199,7 @@
           <a:p>
             <a:fld id="{9044870C-384B-4EC1-B838-2204F18DC063}" type="datetimeFigureOut">
               <a:rPr lang="en-US" smtClean="0"/>
-              <a:t>5/16/2012</a:t>
+              <a:t>5/17/2012</a:t>
             </a:fld>
             <a:endParaRPr lang="en-US" dirty="0"/>
           </a:p>
@@ -1275,7 +1275,7 @@
           <a:p>
             <a:fld id="{5644CB08-640D-461B-975A-EED543F63E85}" type="datetimeFigureOut">
               <a:rPr lang="en-US" smtClean="0"/>
-              <a:t>5/16/2012</a:t>
+              <a:t>5/17/2012</a:t>
             </a:fld>
             <a:endParaRPr lang="en-US" dirty="0"/>
           </a:p>
@@ -1440,7 +1440,7 @@
           <a:p>
             <a:fld id="{5644CB08-640D-461B-975A-EED543F63E85}" type="datetimeFigureOut">
               <a:rPr lang="en-US" smtClean="0"/>
-              <a:t>5/16/2012</a:t>
+              <a:t>5/17/2012</a:t>
             </a:fld>
             <a:endParaRPr lang="en-US" dirty="0"/>
           </a:p>
@@ -1615,7 +1615,7 @@
           <a:p>
             <a:fld id="{5644CB08-640D-461B-975A-EED543F63E85}" type="datetimeFigureOut">
               <a:rPr lang="en-US" smtClean="0"/>
-              <a:t>5/16/2012</a:t>
+              <a:t>5/17/2012</a:t>
             </a:fld>
             <a:endParaRPr lang="en-US" dirty="0"/>
           </a:p>
@@ -1798,7 +1798,7 @@
           <a:p>
             <a:fld id="{5644CB08-640D-461B-975A-EED543F63E85}" type="datetimeFigureOut">
               <a:rPr lang="en-US" smtClean="0"/>
-              <a:t>5/16/2012</a:t>
+              <a:t>5/17/2012</a:t>
             </a:fld>
             <a:endParaRPr lang="en-US" dirty="0"/>
           </a:p>
@@ -2060,7 +2060,7 @@
           <a:p>
             <a:fld id="{5644CB08-640D-461B-975A-EED543F63E85}" type="datetimeFigureOut">
               <a:rPr lang="en-US" smtClean="0"/>
-              <a:t>5/16/2012</a:t>
+              <a:t>5/17/2012</a:t>
             </a:fld>
             <a:endParaRPr lang="en-US" dirty="0"/>
           </a:p>
@@ -2408,7 +2408,7 @@
           <a:p>
             <a:fld id="{5644CB08-640D-461B-975A-EED543F63E85}" type="datetimeFigureOut">
               <a:rPr lang="en-US" smtClean="0"/>
-              <a:t>5/16/2012</a:t>
+              <a:t>5/17/2012</a:t>
             </a:fld>
             <a:endParaRPr lang="en-US" dirty="0"/>
           </a:p>
@@ -2716,7 +2716,7 @@
           <a:p>
             <a:fld id="{5644CB08-640D-461B-975A-EED543F63E85}" type="datetimeFigureOut">
               <a:rPr lang="en-US" smtClean="0"/>
-              <a:t>5/16/2012</a:t>
+              <a:t>5/17/2012</a:t>
             </a:fld>
             <a:endParaRPr lang="en-US" dirty="0"/>
           </a:p>
@@ -2943,7 +2943,7 @@
           <a:p>
             <a:fld id="{5644CB08-640D-461B-975A-EED543F63E85}" type="datetimeFigureOut">
               <a:rPr lang="en-US" smtClean="0"/>
-              <a:t>5/16/2012</a:t>
+              <a:t>5/17/2012</a:t>
             </a:fld>
             <a:endParaRPr lang="en-US" dirty="0"/>
           </a:p>
@@ -3033,7 +3033,7 @@
           <a:p>
             <a:fld id="{5644CB08-640D-461B-975A-EED543F63E85}" type="datetimeFigureOut">
               <a:rPr lang="en-US" smtClean="0"/>
-              <a:t>5/16/2012</a:t>
+              <a:t>5/17/2012</a:t>
             </a:fld>
             <a:endParaRPr lang="en-US" dirty="0"/>
           </a:p>
@@ -3321,7 +3321,7 @@
           <a:p>
             <a:fld id="{5644CB08-640D-461B-975A-EED543F63E85}" type="datetimeFigureOut">
               <a:rPr lang="en-US" smtClean="0"/>
-              <a:t>5/16/2012</a:t>
+              <a:t>5/17/2012</a:t>
             </a:fld>
             <a:endParaRPr lang="en-US" dirty="0"/>
           </a:p>
@@ -3590,7 +3590,7 @@
           <a:p>
             <a:fld id="{5644CB08-640D-461B-975A-EED543F63E85}" type="datetimeFigureOut">
               <a:rPr lang="en-US" smtClean="0"/>
-              <a:t>5/16/2012</a:t>
+              <a:t>5/17/2012</a:t>
             </a:fld>
             <a:endParaRPr lang="en-US" dirty="0"/>
           </a:p>
@@ -3800,7 +3800,7 @@
           <a:p>
             <a:fld id="{5644CB08-640D-461B-975A-EED543F63E85}" type="datetimeFigureOut">
               <a:rPr lang="en-US" smtClean="0"/>
-              <a:t>5/16/2012</a:t>
+              <a:t>5/17/2012</a:t>
             </a:fld>
             <a:endParaRPr lang="en-US" dirty="0"/>
           </a:p>
@@ -4548,7 +4548,6 @@
               <a:rPr lang="en-US" dirty="0" smtClean="0"/>
               <a:t>Outline of Battleship</a:t>
             </a:r>
-            <a:endParaRPr lang="en-US" dirty="0" smtClean="0"/>
           </a:p>
         </p:txBody>
       </p:sp>
@@ -4698,11 +4697,7 @@
           <a:p>
             <a:r>
               <a:rPr lang="en-US" dirty="0" smtClean="0"/>
-              <a:t>&lt;Class Diagram</a:t>
-            </a:r>
-            <a:r>
-              <a:rPr lang="en-US" dirty="0" smtClean="0"/>
-              <a:t>&gt;</a:t>
+              <a:t>&lt;Class Diagram&gt;</a:t>
             </a:r>
           </a:p>
           <a:p>
@@ -4940,35 +4935,1056 @@
           <a:p>
             <a:r>
               <a:rPr lang="en-US" dirty="0" smtClean="0"/>
-              <a:t>Metrics</a:t>
-            </a:r>
-            <a:endParaRPr lang="en-US" dirty="0"/>
-          </a:p>
-        </p:txBody>
-      </p:sp>
-      <p:sp>
-        <p:nvSpPr>
-          <p:cNvPr id="3" name="Content Placeholder 2"/>
-          <p:cNvSpPr>
-            <a:spLocks noGrp="1"/>
-          </p:cNvSpPr>
+              <a:t>Metrics Used</a:t>
+            </a:r>
+            <a:endParaRPr lang="en-US" dirty="0"/>
+          </a:p>
+        </p:txBody>
+      </p:sp>
+      <p:graphicFrame>
+        <p:nvGraphicFramePr>
+          <p:cNvPr id="4" name="Content Placeholder 3"/>
+          <p:cNvGraphicFramePr>
+            <a:graphicFrameLocks noGrp="1"/>
+          </p:cNvGraphicFramePr>
           <p:nvPr>
             <p:ph idx="1"/>
-          </p:nvPr>
-        </p:nvSpPr>
-        <p:spPr/>
-        <p:txBody>
-          <a:bodyPr/>
-          <a:lstStyle/>
-          <a:p>
-            <a:r>
-              <a:rPr lang="en-US" dirty="0" smtClean="0"/>
-              <a:t>Taken from metrics</a:t>
-            </a:r>
-            <a:endParaRPr lang="en-US" dirty="0"/>
-          </a:p>
-        </p:txBody>
-      </p:sp>
+            <p:extLst>
+              <p:ext uri="{D42A27DB-BD31-4B8C-83A1-F6EECF244321}">
+                <p14:modId xmlns:p14="http://schemas.microsoft.com/office/powerpoint/2010/main" val="1754625034"/>
+              </p:ext>
+            </p:extLst>
+          </p:nvPr>
+        </p:nvGraphicFramePr>
+        <p:xfrm>
+          <a:off x="1531620" y="2233263"/>
+          <a:ext cx="6080760" cy="3541968"/>
+        </p:xfrm>
+        <a:graphic>
+          <a:graphicData uri="http://schemas.openxmlformats.org/drawingml/2006/table">
+            <a:tbl>
+              <a:tblPr firstRow="1" firstCol="1" bandRow="1">
+                <a:tableStyleId>{5C22544A-7EE6-4342-B048-85BDC9FD1C3A}</a:tableStyleId>
+              </a:tblPr>
+              <a:tblGrid>
+                <a:gridCol w="1216025"/>
+                <a:gridCol w="1995805"/>
+                <a:gridCol w="956310"/>
+                <a:gridCol w="956310"/>
+                <a:gridCol w="956310"/>
+              </a:tblGrid>
+              <a:tr h="0">
+                <a:tc>
+                  <a:txBody>
+                    <a:bodyPr/>
+                    <a:lstStyle/>
+                    <a:p>
+                      <a:pPr marL="0" marR="0" algn="ctr">
+                        <a:lnSpc>
+                          <a:spcPct val="115000"/>
+                        </a:lnSpc>
+                        <a:spcBef>
+                          <a:spcPts val="0"/>
+                        </a:spcBef>
+                        <a:spcAft>
+                          <a:spcPts val="0"/>
+                        </a:spcAft>
+                      </a:pPr>
+                      <a:r>
+                        <a:rPr lang="en-US" sz="1100" dirty="0">
+                          <a:effectLst/>
+                        </a:rPr>
+                        <a:t>Metric</a:t>
+                      </a:r>
+                      <a:endParaRPr lang="en-US" sz="1100" dirty="0">
+                        <a:effectLst/>
+                        <a:latin typeface="Calibri"/>
+                        <a:ea typeface="Calibri"/>
+                        <a:cs typeface="Times New Roman"/>
+                      </a:endParaRPr>
+                    </a:p>
+                  </a:txBody>
+                  <a:tcPr marL="68580" marR="68580" marT="0" marB="0" anchor="ctr"/>
+                </a:tc>
+                <a:tc>
+                  <a:txBody>
+                    <a:bodyPr/>
+                    <a:lstStyle/>
+                    <a:p>
+                      <a:pPr marL="0" marR="0" algn="ctr">
+                        <a:lnSpc>
+                          <a:spcPct val="115000"/>
+                        </a:lnSpc>
+                        <a:spcBef>
+                          <a:spcPts val="0"/>
+                        </a:spcBef>
+                        <a:spcAft>
+                          <a:spcPts val="0"/>
+                        </a:spcAft>
+                      </a:pPr>
+                      <a:r>
+                        <a:rPr lang="en-US" sz="1100">
+                          <a:effectLst/>
+                        </a:rPr>
+                        <a:t>Tracking Method</a:t>
+                      </a:r>
+                      <a:endParaRPr lang="en-US" sz="1100">
+                        <a:effectLst/>
+                        <a:latin typeface="Calibri"/>
+                        <a:ea typeface="Calibri"/>
+                        <a:cs typeface="Times New Roman"/>
+                      </a:endParaRPr>
+                    </a:p>
+                  </a:txBody>
+                  <a:tcPr marL="68580" marR="68580" marT="0" marB="0" anchor="ctr"/>
+                </a:tc>
+                <a:tc>
+                  <a:txBody>
+                    <a:bodyPr/>
+                    <a:lstStyle/>
+                    <a:p>
+                      <a:pPr marL="0" marR="0" algn="ctr">
+                        <a:lnSpc>
+                          <a:spcPct val="115000"/>
+                        </a:lnSpc>
+                        <a:spcBef>
+                          <a:spcPts val="0"/>
+                        </a:spcBef>
+                        <a:spcAft>
+                          <a:spcPts val="0"/>
+                        </a:spcAft>
+                      </a:pPr>
+                      <a:r>
+                        <a:rPr lang="en-US" sz="1100">
+                          <a:effectLst/>
+                        </a:rPr>
+                        <a:t>Min</a:t>
+                      </a:r>
+                      <a:endParaRPr lang="en-US" sz="1100">
+                        <a:effectLst/>
+                        <a:latin typeface="Calibri"/>
+                        <a:ea typeface="Calibri"/>
+                        <a:cs typeface="Times New Roman"/>
+                      </a:endParaRPr>
+                    </a:p>
+                  </a:txBody>
+                  <a:tcPr marL="68580" marR="68580" marT="0" marB="0" anchor="ctr"/>
+                </a:tc>
+                <a:tc>
+                  <a:txBody>
+                    <a:bodyPr/>
+                    <a:lstStyle/>
+                    <a:p>
+                      <a:pPr marL="0" marR="0" algn="ctr">
+                        <a:lnSpc>
+                          <a:spcPct val="115000"/>
+                        </a:lnSpc>
+                        <a:spcBef>
+                          <a:spcPts val="0"/>
+                        </a:spcBef>
+                        <a:spcAft>
+                          <a:spcPts val="0"/>
+                        </a:spcAft>
+                      </a:pPr>
+                      <a:r>
+                        <a:rPr lang="en-US" sz="1100">
+                          <a:effectLst/>
+                        </a:rPr>
+                        <a:t>Max</a:t>
+                      </a:r>
+                      <a:endParaRPr lang="en-US" sz="1100">
+                        <a:effectLst/>
+                        <a:latin typeface="Calibri"/>
+                        <a:ea typeface="Calibri"/>
+                        <a:cs typeface="Times New Roman"/>
+                      </a:endParaRPr>
+                    </a:p>
+                  </a:txBody>
+                  <a:tcPr marL="68580" marR="68580" marT="0" marB="0" anchor="ctr"/>
+                </a:tc>
+                <a:tc>
+                  <a:txBody>
+                    <a:bodyPr/>
+                    <a:lstStyle/>
+                    <a:p>
+                      <a:pPr marL="0" marR="0" algn="ctr">
+                        <a:lnSpc>
+                          <a:spcPct val="115000"/>
+                        </a:lnSpc>
+                        <a:spcBef>
+                          <a:spcPts val="0"/>
+                        </a:spcBef>
+                        <a:spcAft>
+                          <a:spcPts val="0"/>
+                        </a:spcAft>
+                      </a:pPr>
+                      <a:r>
+                        <a:rPr lang="en-US" sz="1100">
+                          <a:effectLst/>
+                        </a:rPr>
+                        <a:t>Ave</a:t>
+                      </a:r>
+                      <a:endParaRPr lang="en-US" sz="1100">
+                        <a:effectLst/>
+                        <a:latin typeface="Calibri"/>
+                        <a:ea typeface="Calibri"/>
+                        <a:cs typeface="Times New Roman"/>
+                      </a:endParaRPr>
+                    </a:p>
+                  </a:txBody>
+                  <a:tcPr marL="68580" marR="68580" marT="0" marB="0" anchor="ctr"/>
+                </a:tc>
+              </a:tr>
+              <a:tr h="613410">
+                <a:tc>
+                  <a:txBody>
+                    <a:bodyPr/>
+                    <a:lstStyle/>
+                    <a:p>
+                      <a:pPr marL="0" marR="0" algn="ctr">
+                        <a:lnSpc>
+                          <a:spcPct val="115000"/>
+                        </a:lnSpc>
+                        <a:spcBef>
+                          <a:spcPts val="0"/>
+                        </a:spcBef>
+                        <a:spcAft>
+                          <a:spcPts val="0"/>
+                        </a:spcAft>
+                      </a:pPr>
+                      <a:r>
+                        <a:rPr lang="en-US" sz="1100">
+                          <a:effectLst/>
+                        </a:rPr>
+                        <a:t># of Unit Tests and verified visual user stories</a:t>
+                      </a:r>
+                      <a:endParaRPr lang="en-US" sz="1100">
+                        <a:effectLst/>
+                        <a:latin typeface="Calibri"/>
+                        <a:ea typeface="Calibri"/>
+                        <a:cs typeface="Times New Roman"/>
+                      </a:endParaRPr>
+                    </a:p>
+                  </a:txBody>
+                  <a:tcPr marL="68580" marR="68580" marT="0" marB="0" anchor="ctr"/>
+                </a:tc>
+                <a:tc>
+                  <a:txBody>
+                    <a:bodyPr/>
+                    <a:lstStyle/>
+                    <a:p>
+                      <a:pPr marL="0" marR="0" algn="ctr">
+                        <a:lnSpc>
+                          <a:spcPct val="115000"/>
+                        </a:lnSpc>
+                        <a:spcBef>
+                          <a:spcPts val="0"/>
+                        </a:spcBef>
+                        <a:spcAft>
+                          <a:spcPts val="0"/>
+                        </a:spcAft>
+                      </a:pPr>
+                      <a:r>
+                        <a:rPr lang="en-US" sz="1100" dirty="0" smtClean="0">
+                          <a:effectLst/>
+                        </a:rPr>
+                        <a:t>Cumulative </a:t>
+                      </a:r>
+                      <a:r>
+                        <a:rPr lang="en-US" sz="1100" dirty="0">
+                          <a:effectLst/>
+                        </a:rPr>
+                        <a:t>tests each week counted by hand</a:t>
+                      </a:r>
+                      <a:endParaRPr lang="en-US" sz="1100" dirty="0">
+                        <a:effectLst/>
+                        <a:latin typeface="Calibri"/>
+                        <a:ea typeface="Calibri"/>
+                        <a:cs typeface="Times New Roman"/>
+                      </a:endParaRPr>
+                    </a:p>
+                  </a:txBody>
+                  <a:tcPr marL="68580" marR="68580" marT="0" marB="0" anchor="ctr"/>
+                </a:tc>
+                <a:tc>
+                  <a:txBody>
+                    <a:bodyPr/>
+                    <a:lstStyle/>
+                    <a:p>
+                      <a:pPr marL="0" marR="0" algn="ctr">
+                        <a:lnSpc>
+                          <a:spcPct val="115000"/>
+                        </a:lnSpc>
+                        <a:spcBef>
+                          <a:spcPts val="0"/>
+                        </a:spcBef>
+                        <a:spcAft>
+                          <a:spcPts val="0"/>
+                        </a:spcAft>
+                      </a:pPr>
+                      <a:r>
+                        <a:rPr lang="en-US" sz="1100">
+                          <a:effectLst/>
+                        </a:rPr>
+                        <a:t>-</a:t>
+                      </a:r>
+                      <a:endParaRPr lang="en-US" sz="1100">
+                        <a:effectLst/>
+                        <a:latin typeface="Calibri"/>
+                        <a:ea typeface="Calibri"/>
+                        <a:cs typeface="Times New Roman"/>
+                      </a:endParaRPr>
+                    </a:p>
+                  </a:txBody>
+                  <a:tcPr marL="68580" marR="68580" marT="0" marB="0" anchor="ctr"/>
+                </a:tc>
+                <a:tc>
+                  <a:txBody>
+                    <a:bodyPr/>
+                    <a:lstStyle/>
+                    <a:p>
+                      <a:pPr marL="0" marR="0" algn="ctr">
+                        <a:lnSpc>
+                          <a:spcPct val="115000"/>
+                        </a:lnSpc>
+                        <a:spcBef>
+                          <a:spcPts val="0"/>
+                        </a:spcBef>
+                        <a:spcAft>
+                          <a:spcPts val="0"/>
+                        </a:spcAft>
+                      </a:pPr>
+                      <a:r>
+                        <a:rPr lang="en-US" sz="1100">
+                          <a:effectLst/>
+                        </a:rPr>
+                        <a:t>- </a:t>
+                      </a:r>
+                      <a:endParaRPr lang="en-US" sz="1100">
+                        <a:effectLst/>
+                        <a:latin typeface="Calibri"/>
+                        <a:ea typeface="Calibri"/>
+                        <a:cs typeface="Times New Roman"/>
+                      </a:endParaRPr>
+                    </a:p>
+                  </a:txBody>
+                  <a:tcPr marL="68580" marR="68580" marT="0" marB="0" anchor="ctr"/>
+                </a:tc>
+                <a:tc>
+                  <a:txBody>
+                    <a:bodyPr/>
+                    <a:lstStyle/>
+                    <a:p>
+                      <a:pPr marL="0" marR="0" algn="ctr">
+                        <a:lnSpc>
+                          <a:spcPct val="115000"/>
+                        </a:lnSpc>
+                        <a:spcBef>
+                          <a:spcPts val="0"/>
+                        </a:spcBef>
+                        <a:spcAft>
+                          <a:spcPts val="0"/>
+                        </a:spcAft>
+                      </a:pPr>
+                      <a:r>
+                        <a:rPr lang="en-US" sz="1100">
+                          <a:effectLst/>
+                        </a:rPr>
+                        <a:t>Increasing</a:t>
+                      </a:r>
+                      <a:endParaRPr lang="en-US" sz="1100">
+                        <a:effectLst/>
+                        <a:latin typeface="Calibri"/>
+                        <a:ea typeface="Calibri"/>
+                        <a:cs typeface="Times New Roman"/>
+                      </a:endParaRPr>
+                    </a:p>
+                  </a:txBody>
+                  <a:tcPr marL="68580" marR="68580" marT="0" marB="0" anchor="ctr"/>
+                </a:tc>
+              </a:tr>
+              <a:tr h="613410">
+                <a:tc>
+                  <a:txBody>
+                    <a:bodyPr/>
+                    <a:lstStyle/>
+                    <a:p>
+                      <a:pPr marL="0" marR="0" algn="ctr">
+                        <a:lnSpc>
+                          <a:spcPct val="115000"/>
+                        </a:lnSpc>
+                        <a:spcBef>
+                          <a:spcPts val="0"/>
+                        </a:spcBef>
+                        <a:spcAft>
+                          <a:spcPts val="0"/>
+                        </a:spcAft>
+                      </a:pPr>
+                      <a:r>
+                        <a:rPr lang="en-US" sz="1100">
+                          <a:effectLst/>
+                        </a:rPr>
+                        <a:t>Test Cases per Public Method</a:t>
+                      </a:r>
+                      <a:endParaRPr lang="en-US" sz="1100">
+                        <a:effectLst/>
+                        <a:latin typeface="Calibri"/>
+                        <a:ea typeface="Calibri"/>
+                        <a:cs typeface="Times New Roman"/>
+                      </a:endParaRPr>
+                    </a:p>
+                  </a:txBody>
+                  <a:tcPr marL="68580" marR="68580" marT="0" marB="0" anchor="ctr"/>
+                </a:tc>
+                <a:tc>
+                  <a:txBody>
+                    <a:bodyPr/>
+                    <a:lstStyle/>
+                    <a:p>
+                      <a:pPr marL="0" marR="0" algn="ctr">
+                        <a:lnSpc>
+                          <a:spcPct val="115000"/>
+                        </a:lnSpc>
+                        <a:spcBef>
+                          <a:spcPts val="0"/>
+                        </a:spcBef>
+                        <a:spcAft>
+                          <a:spcPts val="0"/>
+                        </a:spcAft>
+                      </a:pPr>
+                      <a:r>
+                        <a:rPr lang="en-US" sz="1100" dirty="0">
+                          <a:effectLst/>
+                        </a:rPr>
+                        <a:t>Counted Test Cases ÷ Counted Public Methods</a:t>
+                      </a:r>
+                      <a:endParaRPr lang="en-US" sz="1100" dirty="0">
+                        <a:effectLst/>
+                        <a:latin typeface="Calibri"/>
+                        <a:ea typeface="Calibri"/>
+                        <a:cs typeface="Times New Roman"/>
+                      </a:endParaRPr>
+                    </a:p>
+                  </a:txBody>
+                  <a:tcPr marL="68580" marR="68580" marT="0" marB="0" anchor="ctr"/>
+                </a:tc>
+                <a:tc>
+                  <a:txBody>
+                    <a:bodyPr/>
+                    <a:lstStyle/>
+                    <a:p>
+                      <a:pPr marL="0" marR="0" algn="ctr">
+                        <a:lnSpc>
+                          <a:spcPct val="115000"/>
+                        </a:lnSpc>
+                        <a:spcBef>
+                          <a:spcPts val="0"/>
+                        </a:spcBef>
+                        <a:spcAft>
+                          <a:spcPts val="0"/>
+                        </a:spcAft>
+                      </a:pPr>
+                      <a:r>
+                        <a:rPr lang="en-US" sz="1100">
+                          <a:effectLst/>
+                        </a:rPr>
+                        <a:t>-</a:t>
+                      </a:r>
+                      <a:endParaRPr lang="en-US" sz="1100">
+                        <a:effectLst/>
+                        <a:latin typeface="Calibri"/>
+                        <a:ea typeface="Calibri"/>
+                        <a:cs typeface="Times New Roman"/>
+                      </a:endParaRPr>
+                    </a:p>
+                  </a:txBody>
+                  <a:tcPr marL="68580" marR="68580" marT="0" marB="0" anchor="ctr"/>
+                </a:tc>
+                <a:tc>
+                  <a:txBody>
+                    <a:bodyPr/>
+                    <a:lstStyle/>
+                    <a:p>
+                      <a:pPr marL="0" marR="0" algn="ctr">
+                        <a:lnSpc>
+                          <a:spcPct val="115000"/>
+                        </a:lnSpc>
+                        <a:spcBef>
+                          <a:spcPts val="0"/>
+                        </a:spcBef>
+                        <a:spcAft>
+                          <a:spcPts val="0"/>
+                        </a:spcAft>
+                      </a:pPr>
+                      <a:r>
+                        <a:rPr lang="en-US" sz="1100">
+                          <a:effectLst/>
+                        </a:rPr>
+                        <a:t>-</a:t>
+                      </a:r>
+                      <a:endParaRPr lang="en-US" sz="1100">
+                        <a:effectLst/>
+                        <a:latin typeface="Calibri"/>
+                        <a:ea typeface="Calibri"/>
+                        <a:cs typeface="Times New Roman"/>
+                      </a:endParaRPr>
+                    </a:p>
+                  </a:txBody>
+                  <a:tcPr marL="68580" marR="68580" marT="0" marB="0" anchor="ctr"/>
+                </a:tc>
+                <a:tc>
+                  <a:txBody>
+                    <a:bodyPr/>
+                    <a:lstStyle/>
+                    <a:p>
+                      <a:pPr marL="0" marR="0" algn="ctr">
+                        <a:lnSpc>
+                          <a:spcPct val="115000"/>
+                        </a:lnSpc>
+                        <a:spcBef>
+                          <a:spcPts val="0"/>
+                        </a:spcBef>
+                        <a:spcAft>
+                          <a:spcPts val="0"/>
+                        </a:spcAft>
+                      </a:pPr>
+                      <a:r>
+                        <a:rPr lang="en-US" sz="1100" dirty="0" smtClean="0">
+                          <a:effectLst/>
+                        </a:rPr>
+                        <a:t>&gt;1.5</a:t>
+                      </a:r>
+                      <a:endParaRPr lang="en-US" sz="1100" dirty="0">
+                        <a:effectLst/>
+                        <a:latin typeface="Calibri"/>
+                        <a:ea typeface="Calibri"/>
+                        <a:cs typeface="Times New Roman"/>
+                      </a:endParaRPr>
+                    </a:p>
+                  </a:txBody>
+                  <a:tcPr marL="68580" marR="68580" marT="0" marB="0" anchor="ctr"/>
+                </a:tc>
+              </a:tr>
+              <a:tr h="613410">
+                <a:tc>
+                  <a:txBody>
+                    <a:bodyPr/>
+                    <a:lstStyle/>
+                    <a:p>
+                      <a:pPr marL="0" marR="0" algn="ctr">
+                        <a:lnSpc>
+                          <a:spcPct val="115000"/>
+                        </a:lnSpc>
+                        <a:spcBef>
+                          <a:spcPts val="0"/>
+                        </a:spcBef>
+                        <a:spcAft>
+                          <a:spcPts val="0"/>
+                        </a:spcAft>
+                      </a:pPr>
+                      <a:r>
+                        <a:rPr lang="en-US" sz="1100" dirty="0">
+                          <a:effectLst/>
+                        </a:rPr>
+                        <a:t>Lines of Code per Method</a:t>
+                      </a:r>
+                      <a:endParaRPr lang="en-US" sz="1100" dirty="0">
+                        <a:effectLst/>
+                        <a:latin typeface="Calibri"/>
+                        <a:ea typeface="Calibri"/>
+                        <a:cs typeface="Times New Roman"/>
+                      </a:endParaRPr>
+                    </a:p>
+                  </a:txBody>
+                  <a:tcPr marL="68580" marR="68580" marT="0" marB="0" anchor="ctr"/>
+                </a:tc>
+                <a:tc>
+                  <a:txBody>
+                    <a:bodyPr/>
+                    <a:lstStyle/>
+                    <a:p>
+                      <a:pPr marL="0" marR="0" algn="ctr">
+                        <a:lnSpc>
+                          <a:spcPct val="115000"/>
+                        </a:lnSpc>
+                        <a:spcBef>
+                          <a:spcPts val="0"/>
+                        </a:spcBef>
+                        <a:spcAft>
+                          <a:spcPts val="0"/>
+                        </a:spcAft>
+                      </a:pPr>
+                      <a:r>
+                        <a:rPr lang="en-US" sz="1100" dirty="0">
+                          <a:effectLst/>
+                        </a:rPr>
+                        <a:t>Tracked by Eclipse Metrics</a:t>
+                      </a:r>
+                      <a:endParaRPr lang="en-US" sz="1100" dirty="0">
+                        <a:effectLst/>
+                        <a:latin typeface="Calibri"/>
+                        <a:ea typeface="Calibri"/>
+                        <a:cs typeface="Times New Roman"/>
+                      </a:endParaRPr>
+                    </a:p>
+                  </a:txBody>
+                  <a:tcPr marL="68580" marR="68580" marT="0" marB="0" anchor="ctr"/>
+                </a:tc>
+                <a:tc>
+                  <a:txBody>
+                    <a:bodyPr/>
+                    <a:lstStyle/>
+                    <a:p>
+                      <a:pPr marL="0" marR="0" algn="ctr">
+                        <a:lnSpc>
+                          <a:spcPct val="115000"/>
+                        </a:lnSpc>
+                        <a:spcBef>
+                          <a:spcPts val="0"/>
+                        </a:spcBef>
+                        <a:spcAft>
+                          <a:spcPts val="0"/>
+                        </a:spcAft>
+                      </a:pPr>
+                      <a:r>
+                        <a:rPr lang="en-US" sz="1100">
+                          <a:effectLst/>
+                        </a:rPr>
+                        <a:t>1</a:t>
+                      </a:r>
+                      <a:endParaRPr lang="en-US" sz="1100">
+                        <a:effectLst/>
+                        <a:latin typeface="Calibri"/>
+                        <a:ea typeface="Calibri"/>
+                        <a:cs typeface="Times New Roman"/>
+                      </a:endParaRPr>
+                    </a:p>
+                  </a:txBody>
+                  <a:tcPr marL="68580" marR="68580" marT="0" marB="0" anchor="ctr"/>
+                </a:tc>
+                <a:tc>
+                  <a:txBody>
+                    <a:bodyPr/>
+                    <a:lstStyle/>
+                    <a:p>
+                      <a:pPr marL="0" marR="0" algn="ctr">
+                        <a:lnSpc>
+                          <a:spcPct val="115000"/>
+                        </a:lnSpc>
+                        <a:spcBef>
+                          <a:spcPts val="0"/>
+                        </a:spcBef>
+                        <a:spcAft>
+                          <a:spcPts val="0"/>
+                        </a:spcAft>
+                      </a:pPr>
+                      <a:r>
+                        <a:rPr lang="en-US" sz="1100" dirty="0" smtClean="0">
+                          <a:effectLst/>
+                        </a:rPr>
+                        <a:t>50</a:t>
+                      </a:r>
+                      <a:endParaRPr lang="en-US" sz="1100" dirty="0">
+                        <a:effectLst/>
+                        <a:latin typeface="Calibri"/>
+                        <a:ea typeface="Calibri"/>
+                        <a:cs typeface="Times New Roman"/>
+                      </a:endParaRPr>
+                    </a:p>
+                  </a:txBody>
+                  <a:tcPr marL="68580" marR="68580" marT="0" marB="0" anchor="ctr"/>
+                </a:tc>
+                <a:tc>
+                  <a:txBody>
+                    <a:bodyPr/>
+                    <a:lstStyle/>
+                    <a:p>
+                      <a:pPr marL="0" marR="0" algn="ctr">
+                        <a:lnSpc>
+                          <a:spcPct val="115000"/>
+                        </a:lnSpc>
+                        <a:spcBef>
+                          <a:spcPts val="0"/>
+                        </a:spcBef>
+                        <a:spcAft>
+                          <a:spcPts val="0"/>
+                        </a:spcAft>
+                      </a:pPr>
+                      <a:r>
+                        <a:rPr lang="en-US" sz="1100" dirty="0">
+                          <a:effectLst/>
+                        </a:rPr>
+                        <a:t>&lt;20</a:t>
+                      </a:r>
+                      <a:endParaRPr lang="en-US" sz="1100" dirty="0">
+                        <a:effectLst/>
+                        <a:latin typeface="Calibri"/>
+                        <a:ea typeface="Calibri"/>
+                        <a:cs typeface="Times New Roman"/>
+                      </a:endParaRPr>
+                    </a:p>
+                  </a:txBody>
+                  <a:tcPr marL="68580" marR="68580" marT="0" marB="0" anchor="ctr"/>
+                </a:tc>
+              </a:tr>
+              <a:tr h="613410">
+                <a:tc>
+                  <a:txBody>
+                    <a:bodyPr/>
+                    <a:lstStyle/>
+                    <a:p>
+                      <a:pPr marL="0" marR="0" algn="ctr">
+                        <a:lnSpc>
+                          <a:spcPct val="115000"/>
+                        </a:lnSpc>
+                        <a:spcBef>
+                          <a:spcPts val="0"/>
+                        </a:spcBef>
+                        <a:spcAft>
+                          <a:spcPts val="0"/>
+                        </a:spcAft>
+                      </a:pPr>
+                      <a:r>
+                        <a:rPr lang="en-US" sz="1100">
+                          <a:effectLst/>
+                        </a:rPr>
+                        <a:t>Lines of Code</a:t>
+                      </a:r>
+                      <a:endParaRPr lang="en-US" sz="1100">
+                        <a:effectLst/>
+                        <a:latin typeface="Calibri"/>
+                        <a:ea typeface="Calibri"/>
+                        <a:cs typeface="Times New Roman"/>
+                      </a:endParaRPr>
+                    </a:p>
+                  </a:txBody>
+                  <a:tcPr marL="68580" marR="68580" marT="0" marB="0" anchor="ctr"/>
+                </a:tc>
+                <a:tc>
+                  <a:txBody>
+                    <a:bodyPr/>
+                    <a:lstStyle/>
+                    <a:p>
+                      <a:pPr marL="0" marR="0" algn="ctr">
+                        <a:lnSpc>
+                          <a:spcPct val="115000"/>
+                        </a:lnSpc>
+                        <a:spcBef>
+                          <a:spcPts val="0"/>
+                        </a:spcBef>
+                        <a:spcAft>
+                          <a:spcPts val="0"/>
+                        </a:spcAft>
+                      </a:pPr>
+                      <a:r>
+                        <a:rPr lang="en-US" sz="1100" dirty="0" smtClean="0">
+                          <a:effectLst/>
+                        </a:rPr>
+                        <a:t>Cumulative</a:t>
+                      </a:r>
+                      <a:r>
+                        <a:rPr lang="en-US" sz="1100" baseline="0" dirty="0" smtClean="0">
+                          <a:effectLst/>
+                        </a:rPr>
+                        <a:t> </a:t>
+                      </a:r>
+                      <a:r>
+                        <a:rPr lang="en-US" sz="1100" dirty="0" smtClean="0">
+                          <a:effectLst/>
+                        </a:rPr>
+                        <a:t>lines </a:t>
+                      </a:r>
+                      <a:r>
+                        <a:rPr lang="en-US" sz="1100" dirty="0">
+                          <a:effectLst/>
+                        </a:rPr>
+                        <a:t>each week counted by Eclipse </a:t>
+                      </a:r>
+                      <a:r>
+                        <a:rPr lang="en-US" sz="1100" dirty="0" smtClean="0">
+                          <a:effectLst/>
+                        </a:rPr>
+                        <a:t>Metric (number of non-comment</a:t>
+                      </a:r>
+                      <a:r>
+                        <a:rPr lang="en-US" sz="1100" baseline="0" dirty="0" smtClean="0">
+                          <a:effectLst/>
+                        </a:rPr>
+                        <a:t> or blank lines)</a:t>
+                      </a:r>
+                      <a:endParaRPr lang="en-US" sz="1100" dirty="0">
+                        <a:effectLst/>
+                        <a:latin typeface="Calibri"/>
+                        <a:ea typeface="Calibri"/>
+                        <a:cs typeface="Times New Roman"/>
+                      </a:endParaRPr>
+                    </a:p>
+                  </a:txBody>
+                  <a:tcPr marL="68580" marR="68580" marT="0" marB="0" anchor="ctr"/>
+                </a:tc>
+                <a:tc>
+                  <a:txBody>
+                    <a:bodyPr/>
+                    <a:lstStyle/>
+                    <a:p>
+                      <a:pPr marL="0" marR="0" algn="ctr">
+                        <a:lnSpc>
+                          <a:spcPct val="115000"/>
+                        </a:lnSpc>
+                        <a:spcBef>
+                          <a:spcPts val="0"/>
+                        </a:spcBef>
+                        <a:spcAft>
+                          <a:spcPts val="0"/>
+                        </a:spcAft>
+                      </a:pPr>
+                      <a:r>
+                        <a:rPr lang="en-US" sz="1100">
+                          <a:effectLst/>
+                        </a:rPr>
+                        <a:t>-</a:t>
+                      </a:r>
+                      <a:endParaRPr lang="en-US" sz="1100">
+                        <a:effectLst/>
+                        <a:latin typeface="Calibri"/>
+                        <a:ea typeface="Calibri"/>
+                        <a:cs typeface="Times New Roman"/>
+                      </a:endParaRPr>
+                    </a:p>
+                  </a:txBody>
+                  <a:tcPr marL="68580" marR="68580" marT="0" marB="0" anchor="ctr"/>
+                </a:tc>
+                <a:tc>
+                  <a:txBody>
+                    <a:bodyPr/>
+                    <a:lstStyle/>
+                    <a:p>
+                      <a:pPr marL="0" marR="0" algn="ctr">
+                        <a:lnSpc>
+                          <a:spcPct val="115000"/>
+                        </a:lnSpc>
+                        <a:spcBef>
+                          <a:spcPts val="0"/>
+                        </a:spcBef>
+                        <a:spcAft>
+                          <a:spcPts val="0"/>
+                        </a:spcAft>
+                      </a:pPr>
+                      <a:r>
+                        <a:rPr lang="en-US" sz="1100">
+                          <a:effectLst/>
+                        </a:rPr>
+                        <a:t>-</a:t>
+                      </a:r>
+                      <a:endParaRPr lang="en-US" sz="1100">
+                        <a:effectLst/>
+                        <a:latin typeface="Calibri"/>
+                        <a:ea typeface="Calibri"/>
+                        <a:cs typeface="Times New Roman"/>
+                      </a:endParaRPr>
+                    </a:p>
+                  </a:txBody>
+                  <a:tcPr marL="68580" marR="68580" marT="0" marB="0" anchor="ctr"/>
+                </a:tc>
+                <a:tc>
+                  <a:txBody>
+                    <a:bodyPr/>
+                    <a:lstStyle/>
+                    <a:p>
+                      <a:pPr marL="0" marR="0" algn="ctr">
+                        <a:lnSpc>
+                          <a:spcPct val="115000"/>
+                        </a:lnSpc>
+                        <a:spcBef>
+                          <a:spcPts val="0"/>
+                        </a:spcBef>
+                        <a:spcAft>
+                          <a:spcPts val="0"/>
+                        </a:spcAft>
+                      </a:pPr>
+                      <a:r>
+                        <a:rPr lang="en-US" sz="1100">
+                          <a:effectLst/>
+                        </a:rPr>
+                        <a:t>Increasing</a:t>
+                      </a:r>
+                      <a:endParaRPr lang="en-US" sz="1100">
+                        <a:effectLst/>
+                        <a:latin typeface="Calibri"/>
+                        <a:ea typeface="Calibri"/>
+                        <a:cs typeface="Times New Roman"/>
+                      </a:endParaRPr>
+                    </a:p>
+                  </a:txBody>
+                  <a:tcPr marL="68580" marR="68580" marT="0" marB="0" anchor="ctr"/>
+                </a:tc>
+              </a:tr>
+              <a:tr h="613410">
+                <a:tc>
+                  <a:txBody>
+                    <a:bodyPr/>
+                    <a:lstStyle/>
+                    <a:p>
+                      <a:pPr marL="0" marR="0" algn="ctr">
+                        <a:lnSpc>
+                          <a:spcPct val="115000"/>
+                        </a:lnSpc>
+                        <a:spcBef>
+                          <a:spcPts val="0"/>
+                        </a:spcBef>
+                        <a:spcAft>
+                          <a:spcPts val="0"/>
+                        </a:spcAft>
+                      </a:pPr>
+                      <a:r>
+                        <a:rPr lang="en-US" sz="1100">
+                          <a:effectLst/>
+                        </a:rPr>
+                        <a:t>Number of Parameters</a:t>
+                      </a:r>
+                      <a:endParaRPr lang="en-US" sz="1100">
+                        <a:effectLst/>
+                        <a:latin typeface="Calibri"/>
+                        <a:ea typeface="Calibri"/>
+                        <a:cs typeface="Times New Roman"/>
+                      </a:endParaRPr>
+                    </a:p>
+                  </a:txBody>
+                  <a:tcPr marL="68580" marR="68580" marT="0" marB="0" anchor="ctr"/>
+                </a:tc>
+                <a:tc>
+                  <a:txBody>
+                    <a:bodyPr/>
+                    <a:lstStyle/>
+                    <a:p>
+                      <a:pPr marL="0" marR="0" algn="ctr">
+                        <a:lnSpc>
+                          <a:spcPct val="115000"/>
+                        </a:lnSpc>
+                        <a:spcBef>
+                          <a:spcPts val="0"/>
+                        </a:spcBef>
+                        <a:spcAft>
+                          <a:spcPts val="0"/>
+                        </a:spcAft>
+                      </a:pPr>
+                      <a:r>
+                        <a:rPr lang="en-US" sz="1100" dirty="0">
+                          <a:effectLst/>
+                        </a:rPr>
+                        <a:t>Tracked by Eclipse Metrics</a:t>
+                      </a:r>
+                      <a:endParaRPr lang="en-US" sz="1100" dirty="0">
+                        <a:effectLst/>
+                        <a:latin typeface="Calibri"/>
+                        <a:ea typeface="Calibri"/>
+                        <a:cs typeface="Times New Roman"/>
+                      </a:endParaRPr>
+                    </a:p>
+                  </a:txBody>
+                  <a:tcPr marL="68580" marR="68580" marT="0" marB="0" anchor="ctr"/>
+                </a:tc>
+                <a:tc>
+                  <a:txBody>
+                    <a:bodyPr/>
+                    <a:lstStyle/>
+                    <a:p>
+                      <a:pPr marL="0" marR="0" algn="ctr">
+                        <a:lnSpc>
+                          <a:spcPct val="115000"/>
+                        </a:lnSpc>
+                        <a:spcBef>
+                          <a:spcPts val="0"/>
+                        </a:spcBef>
+                        <a:spcAft>
+                          <a:spcPts val="0"/>
+                        </a:spcAft>
+                      </a:pPr>
+                      <a:r>
+                        <a:rPr lang="en-US" sz="1100">
+                          <a:effectLst/>
+                        </a:rPr>
+                        <a:t>0</a:t>
+                      </a:r>
+                      <a:endParaRPr lang="en-US" sz="1100">
+                        <a:effectLst/>
+                        <a:latin typeface="Calibri"/>
+                        <a:ea typeface="Calibri"/>
+                        <a:cs typeface="Times New Roman"/>
+                      </a:endParaRPr>
+                    </a:p>
+                  </a:txBody>
+                  <a:tcPr marL="68580" marR="68580" marT="0" marB="0" anchor="ctr"/>
+                </a:tc>
+                <a:tc>
+                  <a:txBody>
+                    <a:bodyPr/>
+                    <a:lstStyle/>
+                    <a:p>
+                      <a:pPr marL="0" marR="0" algn="ctr">
+                        <a:lnSpc>
+                          <a:spcPct val="115000"/>
+                        </a:lnSpc>
+                        <a:spcBef>
+                          <a:spcPts val="0"/>
+                        </a:spcBef>
+                        <a:spcAft>
+                          <a:spcPts val="0"/>
+                        </a:spcAft>
+                      </a:pPr>
+                      <a:r>
+                        <a:rPr lang="en-US" sz="1100">
+                          <a:effectLst/>
+                        </a:rPr>
+                        <a:t>6</a:t>
+                      </a:r>
+                      <a:endParaRPr lang="en-US" sz="1100">
+                        <a:effectLst/>
+                        <a:latin typeface="Calibri"/>
+                        <a:ea typeface="Calibri"/>
+                        <a:cs typeface="Times New Roman"/>
+                      </a:endParaRPr>
+                    </a:p>
+                  </a:txBody>
+                  <a:tcPr marL="68580" marR="68580" marT="0" marB="0" anchor="ctr"/>
+                </a:tc>
+                <a:tc>
+                  <a:txBody>
+                    <a:bodyPr/>
+                    <a:lstStyle/>
+                    <a:p>
+                      <a:pPr marL="0" marR="0" algn="ctr">
+                        <a:lnSpc>
+                          <a:spcPct val="115000"/>
+                        </a:lnSpc>
+                        <a:spcBef>
+                          <a:spcPts val="0"/>
+                        </a:spcBef>
+                        <a:spcAft>
+                          <a:spcPts val="0"/>
+                        </a:spcAft>
+                      </a:pPr>
+                      <a:r>
+                        <a:rPr lang="en-US" sz="1100" dirty="0">
+                          <a:effectLst/>
+                        </a:rPr>
+                        <a:t>&lt;3</a:t>
+                      </a:r>
+                      <a:endParaRPr lang="en-US" sz="1100" dirty="0">
+                        <a:effectLst/>
+                        <a:latin typeface="Calibri"/>
+                        <a:ea typeface="Calibri"/>
+                        <a:cs typeface="Times New Roman"/>
+                      </a:endParaRPr>
+                    </a:p>
+                  </a:txBody>
+                  <a:tcPr marL="68580" marR="68580" marT="0" marB="0" anchor="ctr"/>
+                </a:tc>
+              </a:tr>
+            </a:tbl>
+          </a:graphicData>
+        </a:graphic>
+      </p:graphicFrame>
     </p:spTree>
     <p:extLst>
       <p:ext uri="{BB962C8B-B14F-4D97-AF65-F5344CB8AC3E}">
@@ -5022,29 +6038,1019 @@
           </a:p>
         </p:txBody>
       </p:sp>
-      <p:sp>
-        <p:nvSpPr>
-          <p:cNvPr id="3" name="Content Placeholder 2"/>
-          <p:cNvSpPr>
-            <a:spLocks noGrp="1"/>
-          </p:cNvSpPr>
+      <p:graphicFrame>
+        <p:nvGraphicFramePr>
+          <p:cNvPr id="4" name="Content Placeholder 3"/>
+          <p:cNvGraphicFramePr>
+            <a:graphicFrameLocks noGrp="1"/>
+          </p:cNvGraphicFramePr>
           <p:nvPr>
             <p:ph idx="1"/>
-          </p:nvPr>
-        </p:nvSpPr>
-        <p:spPr/>
-        <p:txBody>
-          <a:bodyPr/>
-          <a:lstStyle/>
-          <a:p>
-            <a:r>
-              <a:rPr lang="en-US" dirty="0" smtClean="0"/>
-              <a:t>Taken from metrics</a:t>
-            </a:r>
-            <a:endParaRPr lang="en-US" dirty="0"/>
-          </a:p>
-        </p:txBody>
-      </p:sp>
+            <p:extLst>
+              <p:ext uri="{D42A27DB-BD31-4B8C-83A1-F6EECF244321}">
+                <p14:modId xmlns:p14="http://schemas.microsoft.com/office/powerpoint/2010/main" val="2745331944"/>
+              </p:ext>
+            </p:extLst>
+          </p:nvPr>
+        </p:nvGraphicFramePr>
+        <p:xfrm>
+          <a:off x="1537335" y="2233263"/>
+          <a:ext cx="6069330" cy="3248724"/>
+        </p:xfrm>
+        <a:graphic>
+          <a:graphicData uri="http://schemas.openxmlformats.org/drawingml/2006/table">
+            <a:tbl>
+              <a:tblPr firstRow="1" firstCol="1" bandRow="1">
+                <a:tableStyleId>{5C22544A-7EE6-4342-B048-85BDC9FD1C3A}</a:tableStyleId>
+              </a:tblPr>
+              <a:tblGrid>
+                <a:gridCol w="1216025"/>
+                <a:gridCol w="1617345"/>
+                <a:gridCol w="1617980"/>
+                <a:gridCol w="1617980"/>
+              </a:tblGrid>
+              <a:tr h="0">
+                <a:tc>
+                  <a:txBody>
+                    <a:bodyPr/>
+                    <a:lstStyle/>
+                    <a:p>
+                      <a:pPr marL="0" marR="0" algn="ctr">
+                        <a:lnSpc>
+                          <a:spcPct val="115000"/>
+                        </a:lnSpc>
+                        <a:spcBef>
+                          <a:spcPts val="0"/>
+                        </a:spcBef>
+                        <a:spcAft>
+                          <a:spcPts val="0"/>
+                        </a:spcAft>
+                      </a:pPr>
+                      <a:r>
+                        <a:rPr lang="en-US" sz="1100" dirty="0">
+                          <a:effectLst/>
+                        </a:rPr>
+                        <a:t>Metric</a:t>
+                      </a:r>
+                      <a:endParaRPr lang="en-US" sz="1100" dirty="0">
+                        <a:effectLst/>
+                        <a:latin typeface="Calibri"/>
+                        <a:ea typeface="Calibri"/>
+                        <a:cs typeface="Times New Roman"/>
+                      </a:endParaRPr>
+                    </a:p>
+                  </a:txBody>
+                  <a:tcPr marL="68580" marR="68580" marT="0" marB="0" anchor="ctr"/>
+                </a:tc>
+                <a:tc>
+                  <a:txBody>
+                    <a:bodyPr/>
+                    <a:lstStyle/>
+                    <a:p>
+                      <a:pPr marL="0" marR="0" algn="ctr">
+                        <a:lnSpc>
+                          <a:spcPct val="115000"/>
+                        </a:lnSpc>
+                        <a:spcBef>
+                          <a:spcPts val="0"/>
+                        </a:spcBef>
+                        <a:spcAft>
+                          <a:spcPts val="0"/>
+                        </a:spcAft>
+                      </a:pPr>
+                      <a:r>
+                        <a:rPr lang="en-US" sz="1100">
+                          <a:effectLst/>
+                        </a:rPr>
+                        <a:t>Week 3</a:t>
+                      </a:r>
+                      <a:endParaRPr lang="en-US" sz="1100">
+                        <a:effectLst/>
+                        <a:latin typeface="Calibri"/>
+                        <a:ea typeface="Calibri"/>
+                        <a:cs typeface="Times New Roman"/>
+                      </a:endParaRPr>
+                    </a:p>
+                  </a:txBody>
+                  <a:tcPr marL="68580" marR="68580" marT="0" marB="0" anchor="ctr"/>
+                </a:tc>
+                <a:tc>
+                  <a:txBody>
+                    <a:bodyPr/>
+                    <a:lstStyle/>
+                    <a:p>
+                      <a:pPr marL="0" marR="0" algn="ctr">
+                        <a:lnSpc>
+                          <a:spcPct val="115000"/>
+                        </a:lnSpc>
+                        <a:spcBef>
+                          <a:spcPts val="0"/>
+                        </a:spcBef>
+                        <a:spcAft>
+                          <a:spcPts val="0"/>
+                        </a:spcAft>
+                      </a:pPr>
+                      <a:r>
+                        <a:rPr lang="en-US" sz="1100">
+                          <a:effectLst/>
+                        </a:rPr>
+                        <a:t>Week 4</a:t>
+                      </a:r>
+                      <a:endParaRPr lang="en-US" sz="1100">
+                        <a:effectLst/>
+                        <a:latin typeface="Calibri"/>
+                        <a:ea typeface="Calibri"/>
+                        <a:cs typeface="Times New Roman"/>
+                      </a:endParaRPr>
+                    </a:p>
+                  </a:txBody>
+                  <a:tcPr marL="68580" marR="68580" marT="0" marB="0" anchor="ctr"/>
+                </a:tc>
+                <a:tc>
+                  <a:txBody>
+                    <a:bodyPr/>
+                    <a:lstStyle/>
+                    <a:p>
+                      <a:pPr marL="0" marR="0" algn="ctr">
+                        <a:lnSpc>
+                          <a:spcPct val="115000"/>
+                        </a:lnSpc>
+                        <a:spcBef>
+                          <a:spcPts val="0"/>
+                        </a:spcBef>
+                        <a:spcAft>
+                          <a:spcPts val="0"/>
+                        </a:spcAft>
+                      </a:pPr>
+                      <a:r>
+                        <a:rPr lang="en-US" sz="1100">
+                          <a:effectLst/>
+                        </a:rPr>
+                        <a:t>Week 5</a:t>
+                      </a:r>
+                      <a:endParaRPr lang="en-US" sz="1100">
+                        <a:effectLst/>
+                        <a:latin typeface="Calibri"/>
+                        <a:ea typeface="Calibri"/>
+                        <a:cs typeface="Times New Roman"/>
+                      </a:endParaRPr>
+                    </a:p>
+                  </a:txBody>
+                  <a:tcPr marL="68580" marR="68580" marT="0" marB="0" anchor="ctr"/>
+                </a:tc>
+              </a:tr>
+              <a:tr h="613410">
+                <a:tc>
+                  <a:txBody>
+                    <a:bodyPr/>
+                    <a:lstStyle/>
+                    <a:p>
+                      <a:pPr marL="0" marR="0" algn="ctr">
+                        <a:lnSpc>
+                          <a:spcPct val="115000"/>
+                        </a:lnSpc>
+                        <a:spcBef>
+                          <a:spcPts val="0"/>
+                        </a:spcBef>
+                        <a:spcAft>
+                          <a:spcPts val="0"/>
+                        </a:spcAft>
+                      </a:pPr>
+                      <a:r>
+                        <a:rPr lang="en-US" sz="1100">
+                          <a:effectLst/>
+                        </a:rPr>
+                        <a:t># of Unit Tests and verifications</a:t>
+                      </a:r>
+                      <a:endParaRPr lang="en-US" sz="1100">
+                        <a:effectLst/>
+                        <a:latin typeface="Calibri"/>
+                        <a:ea typeface="Calibri"/>
+                        <a:cs typeface="Times New Roman"/>
+                      </a:endParaRPr>
+                    </a:p>
+                  </a:txBody>
+                  <a:tcPr marL="68580" marR="68580" marT="0" marB="0" anchor="ctr"/>
+                </a:tc>
+                <a:tc>
+                  <a:txBody>
+                    <a:bodyPr/>
+                    <a:lstStyle/>
+                    <a:p>
+                      <a:pPr marL="0" marR="0" algn="ctr">
+                        <a:lnSpc>
+                          <a:spcPct val="115000"/>
+                        </a:lnSpc>
+                        <a:spcBef>
+                          <a:spcPts val="0"/>
+                        </a:spcBef>
+                        <a:spcAft>
+                          <a:spcPts val="0"/>
+                        </a:spcAft>
+                      </a:pPr>
+                      <a:r>
+                        <a:rPr lang="en-US" sz="1100">
+                          <a:effectLst/>
+                        </a:rPr>
+                        <a:t>71</a:t>
+                      </a:r>
+                      <a:endParaRPr lang="en-US" sz="1100">
+                        <a:effectLst/>
+                        <a:latin typeface="Calibri"/>
+                        <a:ea typeface="Calibri"/>
+                        <a:cs typeface="Times New Roman"/>
+                      </a:endParaRPr>
+                    </a:p>
+                  </a:txBody>
+                  <a:tcPr marL="68580" marR="68580" marT="0" marB="0" anchor="ctr"/>
+                </a:tc>
+                <a:tc>
+                  <a:txBody>
+                    <a:bodyPr/>
+                    <a:lstStyle/>
+                    <a:p>
+                      <a:pPr marL="0" marR="0" algn="ctr">
+                        <a:lnSpc>
+                          <a:spcPct val="115000"/>
+                        </a:lnSpc>
+                        <a:spcBef>
+                          <a:spcPts val="0"/>
+                        </a:spcBef>
+                        <a:spcAft>
+                          <a:spcPts val="0"/>
+                        </a:spcAft>
+                      </a:pPr>
+                      <a:r>
+                        <a:rPr lang="en-US" sz="1100">
+                          <a:effectLst/>
+                        </a:rPr>
+                        <a:t>82      Backlog: 3</a:t>
+                      </a:r>
+                      <a:endParaRPr lang="en-US" sz="1100">
+                        <a:effectLst/>
+                        <a:latin typeface="Calibri"/>
+                        <a:ea typeface="Calibri"/>
+                        <a:cs typeface="Times New Roman"/>
+                      </a:endParaRPr>
+                    </a:p>
+                  </a:txBody>
+                  <a:tcPr marL="68580" marR="68580" marT="0" marB="0" anchor="ctr"/>
+                </a:tc>
+                <a:tc>
+                  <a:txBody>
+                    <a:bodyPr/>
+                    <a:lstStyle/>
+                    <a:p>
+                      <a:pPr marL="0" marR="0" algn="ctr">
+                        <a:lnSpc>
+                          <a:spcPct val="115000"/>
+                        </a:lnSpc>
+                        <a:spcBef>
+                          <a:spcPts val="0"/>
+                        </a:spcBef>
+                        <a:spcAft>
+                          <a:spcPts val="0"/>
+                        </a:spcAft>
+                      </a:pPr>
+                      <a:r>
+                        <a:rPr lang="en-US" sz="1100">
+                          <a:effectLst/>
+                        </a:rPr>
+                        <a:t>90</a:t>
+                      </a:r>
+                      <a:endParaRPr lang="en-US" sz="1100">
+                        <a:effectLst/>
+                        <a:latin typeface="Calibri"/>
+                        <a:ea typeface="Calibri"/>
+                        <a:cs typeface="Times New Roman"/>
+                      </a:endParaRPr>
+                    </a:p>
+                  </a:txBody>
+                  <a:tcPr marL="68580" marR="68580" marT="0" marB="0" anchor="ctr"/>
+                </a:tc>
+              </a:tr>
+              <a:tr h="613410">
+                <a:tc>
+                  <a:txBody>
+                    <a:bodyPr/>
+                    <a:lstStyle/>
+                    <a:p>
+                      <a:pPr marL="0" marR="0" algn="ctr">
+                        <a:lnSpc>
+                          <a:spcPct val="115000"/>
+                        </a:lnSpc>
+                        <a:spcBef>
+                          <a:spcPts val="0"/>
+                        </a:spcBef>
+                        <a:spcAft>
+                          <a:spcPts val="0"/>
+                        </a:spcAft>
+                      </a:pPr>
+                      <a:r>
+                        <a:rPr lang="en-US" sz="1100">
+                          <a:effectLst/>
+                        </a:rPr>
+                        <a:t>Test Cases per Public Method</a:t>
+                      </a:r>
+                      <a:endParaRPr lang="en-US" sz="1100">
+                        <a:effectLst/>
+                        <a:latin typeface="Calibri"/>
+                        <a:ea typeface="Calibri"/>
+                        <a:cs typeface="Times New Roman"/>
+                      </a:endParaRPr>
+                    </a:p>
+                  </a:txBody>
+                  <a:tcPr marL="68580" marR="68580" marT="0" marB="0" anchor="ctr"/>
+                </a:tc>
+                <a:tc>
+                  <a:txBody>
+                    <a:bodyPr/>
+                    <a:lstStyle/>
+                    <a:p>
+                      <a:pPr marL="0" marR="0" algn="ctr">
+                        <a:lnSpc>
+                          <a:spcPct val="115000"/>
+                        </a:lnSpc>
+                        <a:spcBef>
+                          <a:spcPts val="0"/>
+                        </a:spcBef>
+                        <a:spcAft>
+                          <a:spcPts val="0"/>
+                        </a:spcAft>
+                      </a:pPr>
+                      <a:r>
+                        <a:rPr lang="en-US" sz="1100" dirty="0">
+                          <a:effectLst/>
+                        </a:rPr>
+                        <a:t>71/54 = </a:t>
+                      </a:r>
+                      <a:r>
+                        <a:rPr lang="en-US" sz="1100" dirty="0">
+                          <a:solidFill>
+                            <a:srgbClr val="FF0000"/>
+                          </a:solidFill>
+                          <a:effectLst/>
+                        </a:rPr>
+                        <a:t>1.31</a:t>
+                      </a:r>
+                      <a:endParaRPr lang="en-US" sz="1100" dirty="0">
+                        <a:solidFill>
+                          <a:srgbClr val="FF0000"/>
+                        </a:solidFill>
+                        <a:effectLst/>
+                        <a:latin typeface="Calibri"/>
+                        <a:ea typeface="Calibri"/>
+                        <a:cs typeface="Times New Roman"/>
+                      </a:endParaRPr>
+                    </a:p>
+                  </a:txBody>
+                  <a:tcPr marL="68580" marR="68580" marT="0" marB="0" anchor="ctr"/>
+                </a:tc>
+                <a:tc>
+                  <a:txBody>
+                    <a:bodyPr/>
+                    <a:lstStyle/>
+                    <a:p>
+                      <a:pPr marL="0" marR="0" algn="ctr">
+                        <a:lnSpc>
+                          <a:spcPct val="115000"/>
+                        </a:lnSpc>
+                        <a:spcBef>
+                          <a:spcPts val="0"/>
+                        </a:spcBef>
+                        <a:spcAft>
+                          <a:spcPts val="0"/>
+                        </a:spcAft>
+                      </a:pPr>
+                      <a:r>
+                        <a:rPr lang="en-US" sz="1100" dirty="0">
+                          <a:effectLst/>
+                        </a:rPr>
+                        <a:t>82/61 = </a:t>
+                      </a:r>
+                      <a:r>
+                        <a:rPr lang="en-US" sz="1100" dirty="0">
+                          <a:solidFill>
+                            <a:srgbClr val="FF0000"/>
+                          </a:solidFill>
+                          <a:effectLst/>
+                        </a:rPr>
+                        <a:t>1.35</a:t>
+                      </a:r>
+                      <a:endParaRPr lang="en-US" sz="1100" dirty="0">
+                        <a:solidFill>
+                          <a:srgbClr val="FF0000"/>
+                        </a:solidFill>
+                        <a:effectLst/>
+                        <a:latin typeface="Calibri"/>
+                        <a:ea typeface="Calibri"/>
+                        <a:cs typeface="Times New Roman"/>
+                      </a:endParaRPr>
+                    </a:p>
+                  </a:txBody>
+                  <a:tcPr marL="68580" marR="68580" marT="0" marB="0" anchor="ctr"/>
+                </a:tc>
+                <a:tc>
+                  <a:txBody>
+                    <a:bodyPr/>
+                    <a:lstStyle/>
+                    <a:p>
+                      <a:pPr marL="0" marR="0" algn="ctr">
+                        <a:lnSpc>
+                          <a:spcPct val="115000"/>
+                        </a:lnSpc>
+                        <a:spcBef>
+                          <a:spcPts val="0"/>
+                        </a:spcBef>
+                        <a:spcAft>
+                          <a:spcPts val="0"/>
+                        </a:spcAft>
+                      </a:pPr>
+                      <a:r>
+                        <a:rPr lang="en-US" sz="1100" dirty="0">
+                          <a:effectLst/>
+                        </a:rPr>
+                        <a:t>90/56 = </a:t>
+                      </a:r>
+                      <a:r>
+                        <a:rPr lang="en-US" sz="1100" dirty="0">
+                          <a:solidFill>
+                            <a:srgbClr val="00B050"/>
+                          </a:solidFill>
+                          <a:effectLst/>
+                        </a:rPr>
+                        <a:t>1.61</a:t>
+                      </a:r>
+                      <a:endParaRPr lang="en-US" sz="1100" dirty="0">
+                        <a:solidFill>
+                          <a:srgbClr val="00B050"/>
+                        </a:solidFill>
+                        <a:effectLst/>
+                        <a:latin typeface="Calibri"/>
+                        <a:ea typeface="Calibri"/>
+                        <a:cs typeface="Times New Roman"/>
+                      </a:endParaRPr>
+                    </a:p>
+                  </a:txBody>
+                  <a:tcPr marL="68580" marR="68580" marT="0" marB="0" anchor="ctr"/>
+                </a:tc>
+              </a:tr>
+              <a:tr h="613410">
+                <a:tc>
+                  <a:txBody>
+                    <a:bodyPr/>
+                    <a:lstStyle/>
+                    <a:p>
+                      <a:pPr marL="0" marR="0" algn="ctr">
+                        <a:lnSpc>
+                          <a:spcPct val="115000"/>
+                        </a:lnSpc>
+                        <a:spcBef>
+                          <a:spcPts val="0"/>
+                        </a:spcBef>
+                        <a:spcAft>
+                          <a:spcPts val="0"/>
+                        </a:spcAft>
+                      </a:pPr>
+                      <a:r>
+                        <a:rPr lang="en-US" sz="1100">
+                          <a:effectLst/>
+                        </a:rPr>
+                        <a:t>Lines of Code per Method</a:t>
+                      </a:r>
+                      <a:endParaRPr lang="en-US" sz="1100">
+                        <a:effectLst/>
+                        <a:latin typeface="Calibri"/>
+                        <a:ea typeface="Calibri"/>
+                        <a:cs typeface="Times New Roman"/>
+                      </a:endParaRPr>
+                    </a:p>
+                  </a:txBody>
+                  <a:tcPr marL="68580" marR="68580" marT="0" marB="0" anchor="ctr"/>
+                </a:tc>
+                <a:tc>
+                  <a:txBody>
+                    <a:bodyPr/>
+                    <a:lstStyle/>
+                    <a:p>
+                      <a:pPr marL="0" marR="0" algn="ctr">
+                        <a:lnSpc>
+                          <a:spcPct val="115000"/>
+                        </a:lnSpc>
+                        <a:spcBef>
+                          <a:spcPts val="0"/>
+                        </a:spcBef>
+                        <a:spcAft>
+                          <a:spcPts val="0"/>
+                        </a:spcAft>
+                      </a:pPr>
+                      <a:r>
+                        <a:rPr lang="en-US" sz="1100" dirty="0">
+                          <a:effectLst/>
+                        </a:rPr>
+                        <a:t>Max: </a:t>
+                      </a:r>
+                      <a:r>
+                        <a:rPr lang="en-US" sz="1100" dirty="0">
+                          <a:solidFill>
+                            <a:srgbClr val="00B050"/>
+                          </a:solidFill>
+                          <a:effectLst/>
+                        </a:rPr>
+                        <a:t>36</a:t>
+                      </a:r>
+                      <a:r>
+                        <a:rPr lang="en-US" sz="1100" dirty="0">
+                          <a:effectLst/>
+                        </a:rPr>
+                        <a:t>   Ave: </a:t>
+                      </a:r>
+                      <a:r>
+                        <a:rPr lang="en-US" sz="1100" dirty="0">
+                          <a:solidFill>
+                            <a:srgbClr val="00B050"/>
+                          </a:solidFill>
+                          <a:effectLst/>
+                        </a:rPr>
+                        <a:t>5.26</a:t>
+                      </a:r>
+                      <a:endParaRPr lang="en-US" sz="1100" dirty="0">
+                        <a:solidFill>
+                          <a:srgbClr val="00B050"/>
+                        </a:solidFill>
+                        <a:effectLst/>
+                        <a:latin typeface="Calibri"/>
+                        <a:ea typeface="Calibri"/>
+                        <a:cs typeface="Times New Roman"/>
+                      </a:endParaRPr>
+                    </a:p>
+                  </a:txBody>
+                  <a:tcPr marL="68580" marR="68580" marT="0" marB="0" anchor="ctr"/>
+                </a:tc>
+                <a:tc>
+                  <a:txBody>
+                    <a:bodyPr/>
+                    <a:lstStyle/>
+                    <a:p>
+                      <a:pPr marL="0" marR="0" algn="ctr">
+                        <a:lnSpc>
+                          <a:spcPct val="115000"/>
+                        </a:lnSpc>
+                        <a:spcBef>
+                          <a:spcPts val="0"/>
+                        </a:spcBef>
+                        <a:spcAft>
+                          <a:spcPts val="0"/>
+                        </a:spcAft>
+                      </a:pPr>
+                      <a:r>
+                        <a:rPr lang="en-US" sz="1100" dirty="0">
+                          <a:effectLst/>
+                        </a:rPr>
+                        <a:t>Max: </a:t>
+                      </a:r>
+                      <a:r>
+                        <a:rPr lang="en-US" sz="1100" dirty="0">
+                          <a:solidFill>
+                            <a:srgbClr val="00B050"/>
+                          </a:solidFill>
+                          <a:effectLst/>
+                        </a:rPr>
+                        <a:t>36</a:t>
+                      </a:r>
+                      <a:r>
+                        <a:rPr lang="en-US" sz="1100" dirty="0">
+                          <a:effectLst/>
+                        </a:rPr>
+                        <a:t>    Ave: </a:t>
+                      </a:r>
+                      <a:r>
+                        <a:rPr lang="en-US" sz="1100" dirty="0">
+                          <a:solidFill>
+                            <a:srgbClr val="00B050"/>
+                          </a:solidFill>
+                          <a:effectLst/>
+                        </a:rPr>
+                        <a:t>5.9</a:t>
+                      </a:r>
+                      <a:endParaRPr lang="en-US" sz="1100" dirty="0">
+                        <a:solidFill>
+                          <a:srgbClr val="00B050"/>
+                        </a:solidFill>
+                        <a:effectLst/>
+                        <a:latin typeface="Calibri"/>
+                        <a:ea typeface="Calibri"/>
+                        <a:cs typeface="Times New Roman"/>
+                      </a:endParaRPr>
+                    </a:p>
+                  </a:txBody>
+                  <a:tcPr marL="68580" marR="68580" marT="0" marB="0" anchor="ctr"/>
+                </a:tc>
+                <a:tc>
+                  <a:txBody>
+                    <a:bodyPr/>
+                    <a:lstStyle/>
+                    <a:p>
+                      <a:pPr marL="0" marR="0" algn="ctr">
+                        <a:lnSpc>
+                          <a:spcPct val="115000"/>
+                        </a:lnSpc>
+                        <a:spcBef>
+                          <a:spcPts val="0"/>
+                        </a:spcBef>
+                        <a:spcAft>
+                          <a:spcPts val="0"/>
+                        </a:spcAft>
+                      </a:pPr>
+                      <a:r>
+                        <a:rPr lang="en-US" sz="1100" dirty="0">
+                          <a:effectLst/>
+                        </a:rPr>
+                        <a:t>Max: </a:t>
+                      </a:r>
+                      <a:r>
+                        <a:rPr lang="en-US" sz="1100" dirty="0">
+                          <a:solidFill>
+                            <a:srgbClr val="FF0000"/>
+                          </a:solidFill>
+                          <a:effectLst/>
+                        </a:rPr>
+                        <a:t>69</a:t>
+                      </a:r>
+                      <a:r>
+                        <a:rPr lang="en-US" sz="1100" dirty="0">
+                          <a:effectLst/>
+                        </a:rPr>
+                        <a:t>    Ave: </a:t>
+                      </a:r>
+                      <a:r>
+                        <a:rPr lang="en-US" sz="1100" dirty="0">
+                          <a:solidFill>
+                            <a:srgbClr val="00B050"/>
+                          </a:solidFill>
+                          <a:effectLst/>
+                        </a:rPr>
+                        <a:t>6.8</a:t>
+                      </a:r>
+                      <a:endParaRPr lang="en-US" sz="1100" dirty="0">
+                        <a:solidFill>
+                          <a:srgbClr val="00B050"/>
+                        </a:solidFill>
+                        <a:effectLst/>
+                        <a:latin typeface="Calibri"/>
+                        <a:ea typeface="Calibri"/>
+                        <a:cs typeface="Times New Roman"/>
+                      </a:endParaRPr>
+                    </a:p>
+                  </a:txBody>
+                  <a:tcPr marL="68580" marR="68580" marT="0" marB="0" anchor="ctr"/>
+                </a:tc>
+              </a:tr>
+              <a:tr h="613410">
+                <a:tc>
+                  <a:txBody>
+                    <a:bodyPr/>
+                    <a:lstStyle/>
+                    <a:p>
+                      <a:pPr marL="0" marR="0" algn="ctr">
+                        <a:lnSpc>
+                          <a:spcPct val="115000"/>
+                        </a:lnSpc>
+                        <a:spcBef>
+                          <a:spcPts val="0"/>
+                        </a:spcBef>
+                        <a:spcAft>
+                          <a:spcPts val="0"/>
+                        </a:spcAft>
+                      </a:pPr>
+                      <a:r>
+                        <a:rPr lang="en-US" sz="1100">
+                          <a:effectLst/>
+                        </a:rPr>
+                        <a:t>Lines of Code</a:t>
+                      </a:r>
+                      <a:endParaRPr lang="en-US" sz="1100">
+                        <a:effectLst/>
+                        <a:latin typeface="Calibri"/>
+                        <a:ea typeface="Calibri"/>
+                        <a:cs typeface="Times New Roman"/>
+                      </a:endParaRPr>
+                    </a:p>
+                  </a:txBody>
+                  <a:tcPr marL="68580" marR="68580" marT="0" marB="0" anchor="ctr"/>
+                </a:tc>
+                <a:tc>
+                  <a:txBody>
+                    <a:bodyPr/>
+                    <a:lstStyle/>
+                    <a:p>
+                      <a:pPr marL="0" marR="0" algn="ctr">
+                        <a:lnSpc>
+                          <a:spcPct val="115000"/>
+                        </a:lnSpc>
+                        <a:spcBef>
+                          <a:spcPts val="0"/>
+                        </a:spcBef>
+                        <a:spcAft>
+                          <a:spcPts val="0"/>
+                        </a:spcAft>
+                      </a:pPr>
+                      <a:r>
+                        <a:rPr lang="en-US" sz="1100">
+                          <a:effectLst/>
+                        </a:rPr>
+                        <a:t>1265</a:t>
+                      </a:r>
+                      <a:endParaRPr lang="en-US" sz="1100">
+                        <a:effectLst/>
+                        <a:latin typeface="Calibri"/>
+                        <a:ea typeface="Calibri"/>
+                        <a:cs typeface="Times New Roman"/>
+                      </a:endParaRPr>
+                    </a:p>
+                  </a:txBody>
+                  <a:tcPr marL="68580" marR="68580" marT="0" marB="0" anchor="ctr"/>
+                </a:tc>
+                <a:tc>
+                  <a:txBody>
+                    <a:bodyPr/>
+                    <a:lstStyle/>
+                    <a:p>
+                      <a:pPr marL="0" marR="0" algn="ctr">
+                        <a:lnSpc>
+                          <a:spcPct val="115000"/>
+                        </a:lnSpc>
+                        <a:spcBef>
+                          <a:spcPts val="0"/>
+                        </a:spcBef>
+                        <a:spcAft>
+                          <a:spcPts val="0"/>
+                        </a:spcAft>
+                      </a:pPr>
+                      <a:r>
+                        <a:rPr lang="en-US" sz="1100">
+                          <a:effectLst/>
+                        </a:rPr>
+                        <a:t>1537</a:t>
+                      </a:r>
+                      <a:endParaRPr lang="en-US" sz="1100">
+                        <a:effectLst/>
+                        <a:latin typeface="Calibri"/>
+                        <a:ea typeface="Calibri"/>
+                        <a:cs typeface="Times New Roman"/>
+                      </a:endParaRPr>
+                    </a:p>
+                  </a:txBody>
+                  <a:tcPr marL="68580" marR="68580" marT="0" marB="0" anchor="ctr"/>
+                </a:tc>
+                <a:tc>
+                  <a:txBody>
+                    <a:bodyPr/>
+                    <a:lstStyle/>
+                    <a:p>
+                      <a:pPr marL="0" marR="0" algn="ctr">
+                        <a:lnSpc>
+                          <a:spcPct val="115000"/>
+                        </a:lnSpc>
+                        <a:spcBef>
+                          <a:spcPts val="0"/>
+                        </a:spcBef>
+                        <a:spcAft>
+                          <a:spcPts val="0"/>
+                        </a:spcAft>
+                      </a:pPr>
+                      <a:r>
+                        <a:rPr lang="en-US" sz="1100">
+                          <a:effectLst/>
+                        </a:rPr>
+                        <a:t>1878</a:t>
+                      </a:r>
+                      <a:endParaRPr lang="en-US" sz="1100">
+                        <a:effectLst/>
+                        <a:latin typeface="Calibri"/>
+                        <a:ea typeface="Calibri"/>
+                        <a:cs typeface="Times New Roman"/>
+                      </a:endParaRPr>
+                    </a:p>
+                  </a:txBody>
+                  <a:tcPr marL="68580" marR="68580" marT="0" marB="0" anchor="ctr"/>
+                </a:tc>
+              </a:tr>
+              <a:tr h="613410">
+                <a:tc>
+                  <a:txBody>
+                    <a:bodyPr/>
+                    <a:lstStyle/>
+                    <a:p>
+                      <a:pPr marL="0" marR="0" algn="ctr">
+                        <a:lnSpc>
+                          <a:spcPct val="115000"/>
+                        </a:lnSpc>
+                        <a:spcBef>
+                          <a:spcPts val="0"/>
+                        </a:spcBef>
+                        <a:spcAft>
+                          <a:spcPts val="0"/>
+                        </a:spcAft>
+                      </a:pPr>
+                      <a:r>
+                        <a:rPr lang="en-US" sz="1100">
+                          <a:effectLst/>
+                        </a:rPr>
+                        <a:t>Number of Parameters</a:t>
+                      </a:r>
+                      <a:endParaRPr lang="en-US" sz="1100">
+                        <a:effectLst/>
+                        <a:latin typeface="Calibri"/>
+                        <a:ea typeface="Calibri"/>
+                        <a:cs typeface="Times New Roman"/>
+                      </a:endParaRPr>
+                    </a:p>
+                  </a:txBody>
+                  <a:tcPr marL="68580" marR="68580" marT="0" marB="0" anchor="ctr"/>
+                </a:tc>
+                <a:tc>
+                  <a:txBody>
+                    <a:bodyPr/>
+                    <a:lstStyle/>
+                    <a:p>
+                      <a:pPr marL="0" marR="0" algn="ctr">
+                        <a:lnSpc>
+                          <a:spcPct val="115000"/>
+                        </a:lnSpc>
+                        <a:spcBef>
+                          <a:spcPts val="0"/>
+                        </a:spcBef>
+                        <a:spcAft>
+                          <a:spcPts val="0"/>
+                        </a:spcAft>
+                      </a:pPr>
+                      <a:r>
+                        <a:rPr lang="en-US" sz="1100" dirty="0">
+                          <a:effectLst/>
+                        </a:rPr>
+                        <a:t>Max: </a:t>
+                      </a:r>
+                      <a:r>
+                        <a:rPr lang="en-US" sz="1100" dirty="0">
+                          <a:solidFill>
+                            <a:srgbClr val="00B050"/>
+                          </a:solidFill>
+                          <a:effectLst/>
+                        </a:rPr>
+                        <a:t>4</a:t>
+                      </a:r>
+                      <a:r>
+                        <a:rPr lang="en-US" sz="1100" dirty="0">
+                          <a:effectLst/>
+                        </a:rPr>
+                        <a:t>   Ave: </a:t>
+                      </a:r>
+                      <a:r>
+                        <a:rPr lang="en-US" sz="1100" dirty="0">
+                          <a:solidFill>
+                            <a:srgbClr val="00B050"/>
+                          </a:solidFill>
+                          <a:effectLst/>
+                        </a:rPr>
+                        <a:t>0.331</a:t>
+                      </a:r>
+                      <a:endParaRPr lang="en-US" sz="1100" dirty="0">
+                        <a:solidFill>
+                          <a:srgbClr val="00B050"/>
+                        </a:solidFill>
+                        <a:effectLst/>
+                        <a:latin typeface="Calibri"/>
+                        <a:ea typeface="Calibri"/>
+                        <a:cs typeface="Times New Roman"/>
+                      </a:endParaRPr>
+                    </a:p>
+                  </a:txBody>
+                  <a:tcPr marL="68580" marR="68580" marT="0" marB="0" anchor="ctr"/>
+                </a:tc>
+                <a:tc>
+                  <a:txBody>
+                    <a:bodyPr/>
+                    <a:lstStyle/>
+                    <a:p>
+                      <a:pPr marL="0" marR="0" algn="ctr">
+                        <a:lnSpc>
+                          <a:spcPct val="115000"/>
+                        </a:lnSpc>
+                        <a:spcBef>
+                          <a:spcPts val="0"/>
+                        </a:spcBef>
+                        <a:spcAft>
+                          <a:spcPts val="0"/>
+                        </a:spcAft>
+                      </a:pPr>
+                      <a:r>
+                        <a:rPr lang="en-US" sz="1100" dirty="0">
+                          <a:effectLst/>
+                        </a:rPr>
+                        <a:t>Max: </a:t>
+                      </a:r>
+                      <a:r>
+                        <a:rPr lang="en-US" sz="1100" dirty="0">
+                          <a:solidFill>
+                            <a:srgbClr val="00B050"/>
+                          </a:solidFill>
+                          <a:effectLst/>
+                        </a:rPr>
+                        <a:t>4</a:t>
+                      </a:r>
+                      <a:r>
+                        <a:rPr lang="en-US" sz="1100" dirty="0">
+                          <a:effectLst/>
+                        </a:rPr>
+                        <a:t>     Ave: </a:t>
+                      </a:r>
+                      <a:r>
+                        <a:rPr lang="en-US" sz="1100" dirty="0">
+                          <a:solidFill>
+                            <a:srgbClr val="00B050"/>
+                          </a:solidFill>
+                          <a:effectLst/>
+                        </a:rPr>
+                        <a:t>0.421</a:t>
+                      </a:r>
+                      <a:endParaRPr lang="en-US" sz="1100" dirty="0">
+                        <a:solidFill>
+                          <a:srgbClr val="00B050"/>
+                        </a:solidFill>
+                        <a:effectLst/>
+                        <a:latin typeface="Calibri"/>
+                        <a:ea typeface="Calibri"/>
+                        <a:cs typeface="Times New Roman"/>
+                      </a:endParaRPr>
+                    </a:p>
+                  </a:txBody>
+                  <a:tcPr marL="68580" marR="68580" marT="0" marB="0" anchor="ctr"/>
+                </a:tc>
+                <a:tc>
+                  <a:txBody>
+                    <a:bodyPr/>
+                    <a:lstStyle/>
+                    <a:p>
+                      <a:pPr marL="0" marR="0" algn="ctr">
+                        <a:lnSpc>
+                          <a:spcPct val="115000"/>
+                        </a:lnSpc>
+                        <a:spcBef>
+                          <a:spcPts val="0"/>
+                        </a:spcBef>
+                        <a:spcAft>
+                          <a:spcPts val="0"/>
+                        </a:spcAft>
+                      </a:pPr>
+                      <a:r>
+                        <a:rPr lang="en-US" sz="1100" dirty="0">
+                          <a:effectLst/>
+                        </a:rPr>
+                        <a:t>Max: </a:t>
+                      </a:r>
+                      <a:r>
+                        <a:rPr lang="en-US" sz="1100" dirty="0">
+                          <a:solidFill>
+                            <a:srgbClr val="00B050"/>
+                          </a:solidFill>
+                          <a:effectLst/>
+                        </a:rPr>
+                        <a:t>6</a:t>
+                      </a:r>
+                      <a:r>
+                        <a:rPr lang="en-US" sz="1100" dirty="0">
+                          <a:effectLst/>
+                        </a:rPr>
+                        <a:t>     Ave: </a:t>
+                      </a:r>
+                      <a:r>
+                        <a:rPr lang="en-US" sz="1100" dirty="0">
+                          <a:solidFill>
+                            <a:srgbClr val="00B050"/>
+                          </a:solidFill>
+                          <a:effectLst/>
+                        </a:rPr>
+                        <a:t>0.47</a:t>
+                      </a:r>
+                      <a:endParaRPr lang="en-US" sz="1100" dirty="0">
+                        <a:solidFill>
+                          <a:srgbClr val="00B050"/>
+                        </a:solidFill>
+                        <a:effectLst/>
+                        <a:latin typeface="Calibri"/>
+                        <a:ea typeface="Calibri"/>
+                        <a:cs typeface="Times New Roman"/>
+                      </a:endParaRPr>
+                    </a:p>
+                  </a:txBody>
+                  <a:tcPr marL="68580" marR="68580" marT="0" marB="0" anchor="ctr"/>
+                </a:tc>
+              </a:tr>
+            </a:tbl>
+          </a:graphicData>
+        </a:graphic>
+      </p:graphicFrame>
     </p:spTree>
     <p:extLst>
       <p:ext uri="{BB962C8B-B14F-4D97-AF65-F5344CB8AC3E}">

</xml_diff>

<commit_message>
Finished project presentation slides
</commit_message>
<xml_diff>
--- a/Documents/Project Presentation/Battleship Project Presentation.pptx
+++ b/Documents/Project Presentation/Battleship Project Presentation.pptx
@@ -115,6 +115,3398 @@
     </a:lvl9pPr>
   </p:defaultTextStyle>
 </p:presentation>
+</file>
+
+<file path=ppt/diagrams/colors1.xml><?xml version="1.0" encoding="utf-8"?>
+<dgm:colorsDef xmlns:dgm="http://schemas.openxmlformats.org/drawingml/2006/diagram" xmlns:a="http://schemas.openxmlformats.org/drawingml/2006/main" uniqueId="urn:microsoft.com/office/officeart/2005/8/colors/accent1_2">
+  <dgm:title val=""/>
+  <dgm:desc val=""/>
+  <dgm:catLst>
+    <dgm:cat type="accent1" pri="11200"/>
+  </dgm:catLst>
+  <dgm:styleLbl name="node0">
+    <dgm:fillClrLst meth="repeat">
+      <a:schemeClr val="accent1"/>
+    </dgm:fillClrLst>
+    <dgm:linClrLst meth="repeat">
+      <a:schemeClr val="lt1"/>
+    </dgm:linClrLst>
+    <dgm:effectClrLst/>
+    <dgm:txLinClrLst/>
+    <dgm:txFillClrLst/>
+    <dgm:txEffectClrLst/>
+  </dgm:styleLbl>
+  <dgm:styleLbl name="alignNode1">
+    <dgm:fillClrLst meth="repeat">
+      <a:schemeClr val="accent1"/>
+    </dgm:fillClrLst>
+    <dgm:linClrLst meth="repeat">
+      <a:schemeClr val="accent1"/>
+    </dgm:linClrLst>
+    <dgm:effectClrLst/>
+    <dgm:txLinClrLst/>
+    <dgm:txFillClrLst/>
+    <dgm:txEffectClrLst/>
+  </dgm:styleLbl>
+  <dgm:styleLbl name="node1">
+    <dgm:fillClrLst meth="repeat">
+      <a:schemeClr val="accent1"/>
+    </dgm:fillClrLst>
+    <dgm:linClrLst meth="repeat">
+      <a:schemeClr val="lt1"/>
+    </dgm:linClrLst>
+    <dgm:effectClrLst/>
+    <dgm:txLinClrLst/>
+    <dgm:txFillClrLst/>
+    <dgm:txEffectClrLst/>
+  </dgm:styleLbl>
+  <dgm:styleLbl name="lnNode1">
+    <dgm:fillClrLst meth="repeat">
+      <a:schemeClr val="accent1"/>
+    </dgm:fillClrLst>
+    <dgm:linClrLst meth="repeat">
+      <a:schemeClr val="lt1"/>
+    </dgm:linClrLst>
+    <dgm:effectClrLst/>
+    <dgm:txLinClrLst/>
+    <dgm:txFillClrLst/>
+    <dgm:txEffectClrLst/>
+  </dgm:styleLbl>
+  <dgm:styleLbl name="vennNode1">
+    <dgm:fillClrLst meth="repeat">
+      <a:schemeClr val="accent1">
+        <a:alpha val="50000"/>
+      </a:schemeClr>
+    </dgm:fillClrLst>
+    <dgm:linClrLst meth="repeat">
+      <a:schemeClr val="lt1"/>
+    </dgm:linClrLst>
+    <dgm:effectClrLst/>
+    <dgm:txLinClrLst/>
+    <dgm:txFillClrLst/>
+    <dgm:txEffectClrLst/>
+  </dgm:styleLbl>
+  <dgm:styleLbl name="node2">
+    <dgm:fillClrLst meth="repeat">
+      <a:schemeClr val="accent1"/>
+    </dgm:fillClrLst>
+    <dgm:linClrLst meth="repeat">
+      <a:schemeClr val="lt1"/>
+    </dgm:linClrLst>
+    <dgm:effectClrLst/>
+    <dgm:txLinClrLst/>
+    <dgm:txFillClrLst/>
+    <dgm:txEffectClrLst/>
+  </dgm:styleLbl>
+  <dgm:styleLbl name="node3">
+    <dgm:fillClrLst meth="repeat">
+      <a:schemeClr val="accent1"/>
+    </dgm:fillClrLst>
+    <dgm:linClrLst meth="repeat">
+      <a:schemeClr val="lt1"/>
+    </dgm:linClrLst>
+    <dgm:effectClrLst/>
+    <dgm:txLinClrLst/>
+    <dgm:txFillClrLst/>
+    <dgm:txEffectClrLst/>
+  </dgm:styleLbl>
+  <dgm:styleLbl name="node4">
+    <dgm:fillClrLst meth="repeat">
+      <a:schemeClr val="accent1"/>
+    </dgm:fillClrLst>
+    <dgm:linClrLst meth="repeat">
+      <a:schemeClr val="lt1"/>
+    </dgm:linClrLst>
+    <dgm:effectClrLst/>
+    <dgm:txLinClrLst/>
+    <dgm:txFillClrLst/>
+    <dgm:txEffectClrLst/>
+  </dgm:styleLbl>
+  <dgm:styleLbl name="fgImgPlace1">
+    <dgm:fillClrLst meth="repeat">
+      <a:schemeClr val="accent1">
+        <a:tint val="50000"/>
+      </a:schemeClr>
+    </dgm:fillClrLst>
+    <dgm:linClrLst meth="repeat">
+      <a:schemeClr val="lt1"/>
+    </dgm:linClrLst>
+    <dgm:effectClrLst/>
+    <dgm:txLinClrLst/>
+    <dgm:txFillClrLst meth="repeat">
+      <a:schemeClr val="lt1"/>
+    </dgm:txFillClrLst>
+    <dgm:txEffectClrLst/>
+  </dgm:styleLbl>
+  <dgm:styleLbl name="alignImgPlace1">
+    <dgm:fillClrLst meth="repeat">
+      <a:schemeClr val="accent1">
+        <a:tint val="50000"/>
+      </a:schemeClr>
+    </dgm:fillClrLst>
+    <dgm:linClrLst meth="repeat">
+      <a:schemeClr val="lt1"/>
+    </dgm:linClrLst>
+    <dgm:effectClrLst/>
+    <dgm:txLinClrLst/>
+    <dgm:txFillClrLst meth="repeat">
+      <a:schemeClr val="lt1"/>
+    </dgm:txFillClrLst>
+    <dgm:txEffectClrLst/>
+  </dgm:styleLbl>
+  <dgm:styleLbl name="bgImgPlace1">
+    <dgm:fillClrLst meth="repeat">
+      <a:schemeClr val="accent1">
+        <a:tint val="50000"/>
+      </a:schemeClr>
+    </dgm:fillClrLst>
+    <dgm:linClrLst meth="repeat">
+      <a:schemeClr val="lt1"/>
+    </dgm:linClrLst>
+    <dgm:effectClrLst/>
+    <dgm:txLinClrLst/>
+    <dgm:txFillClrLst meth="repeat">
+      <a:schemeClr val="lt1"/>
+    </dgm:txFillClrLst>
+    <dgm:txEffectClrLst/>
+  </dgm:styleLbl>
+  <dgm:styleLbl name="sibTrans2D1">
+    <dgm:fillClrLst meth="repeat">
+      <a:schemeClr val="accent1">
+        <a:tint val="60000"/>
+      </a:schemeClr>
+    </dgm:fillClrLst>
+    <dgm:linClrLst meth="repeat">
+      <a:schemeClr val="accent1">
+        <a:tint val="60000"/>
+      </a:schemeClr>
+    </dgm:linClrLst>
+    <dgm:effectClrLst/>
+    <dgm:txLinClrLst/>
+    <dgm:txFillClrLst/>
+    <dgm:txEffectClrLst/>
+  </dgm:styleLbl>
+  <dgm:styleLbl name="fgSibTrans2D1">
+    <dgm:fillClrLst meth="repeat">
+      <a:schemeClr val="accent1">
+        <a:tint val="60000"/>
+      </a:schemeClr>
+    </dgm:fillClrLst>
+    <dgm:linClrLst meth="repeat">
+      <a:schemeClr val="accent1">
+        <a:tint val="60000"/>
+      </a:schemeClr>
+    </dgm:linClrLst>
+    <dgm:effectClrLst/>
+    <dgm:txLinClrLst/>
+    <dgm:txFillClrLst/>
+    <dgm:txEffectClrLst/>
+  </dgm:styleLbl>
+  <dgm:styleLbl name="bgSibTrans2D1">
+    <dgm:fillClrLst meth="repeat">
+      <a:schemeClr val="accent1">
+        <a:tint val="60000"/>
+      </a:schemeClr>
+    </dgm:fillClrLst>
+    <dgm:linClrLst meth="repeat">
+      <a:schemeClr val="accent1">
+        <a:tint val="60000"/>
+      </a:schemeClr>
+    </dgm:linClrLst>
+    <dgm:effectClrLst/>
+    <dgm:txLinClrLst/>
+    <dgm:txFillClrLst/>
+    <dgm:txEffectClrLst/>
+  </dgm:styleLbl>
+  <dgm:styleLbl name="sibTrans1D1">
+    <dgm:fillClrLst meth="repeat">
+      <a:schemeClr val="accent1"/>
+    </dgm:fillClrLst>
+    <dgm:linClrLst meth="repeat">
+      <a:schemeClr val="accent1"/>
+    </dgm:linClrLst>
+    <dgm:effectClrLst/>
+    <dgm:txLinClrLst/>
+    <dgm:txFillClrLst meth="repeat">
+      <a:schemeClr val="tx1"/>
+    </dgm:txFillClrLst>
+    <dgm:txEffectClrLst/>
+  </dgm:styleLbl>
+  <dgm:styleLbl name="callout">
+    <dgm:fillClrLst meth="repeat">
+      <a:schemeClr val="accent1"/>
+    </dgm:fillClrLst>
+    <dgm:linClrLst meth="repeat">
+      <a:schemeClr val="accent1">
+        <a:tint val="50000"/>
+      </a:schemeClr>
+    </dgm:linClrLst>
+    <dgm:effectClrLst/>
+    <dgm:txLinClrLst/>
+    <dgm:txFillClrLst meth="repeat">
+      <a:schemeClr val="tx1"/>
+    </dgm:txFillClrLst>
+    <dgm:txEffectClrLst/>
+  </dgm:styleLbl>
+  <dgm:styleLbl name="asst0">
+    <dgm:fillClrLst meth="repeat">
+      <a:schemeClr val="accent1"/>
+    </dgm:fillClrLst>
+    <dgm:linClrLst meth="repeat">
+      <a:schemeClr val="lt1"/>
+    </dgm:linClrLst>
+    <dgm:effectClrLst/>
+    <dgm:txLinClrLst/>
+    <dgm:txFillClrLst/>
+    <dgm:txEffectClrLst/>
+  </dgm:styleLbl>
+  <dgm:styleLbl name="asst1">
+    <dgm:fillClrLst meth="repeat">
+      <a:schemeClr val="accent1"/>
+    </dgm:fillClrLst>
+    <dgm:linClrLst meth="repeat">
+      <a:schemeClr val="lt1"/>
+    </dgm:linClrLst>
+    <dgm:effectClrLst/>
+    <dgm:txLinClrLst/>
+    <dgm:txFillClrLst/>
+    <dgm:txEffectClrLst/>
+  </dgm:styleLbl>
+  <dgm:styleLbl name="asst2">
+    <dgm:fillClrLst meth="repeat">
+      <a:schemeClr val="accent1"/>
+    </dgm:fillClrLst>
+    <dgm:linClrLst meth="repeat">
+      <a:schemeClr val="lt1"/>
+    </dgm:linClrLst>
+    <dgm:effectClrLst/>
+    <dgm:txLinClrLst/>
+    <dgm:txFillClrLst/>
+    <dgm:txEffectClrLst/>
+  </dgm:styleLbl>
+  <dgm:styleLbl name="asst3">
+    <dgm:fillClrLst meth="repeat">
+      <a:schemeClr val="accent1"/>
+    </dgm:fillClrLst>
+    <dgm:linClrLst meth="repeat">
+      <a:schemeClr val="lt1"/>
+    </dgm:linClrLst>
+    <dgm:effectClrLst/>
+    <dgm:txLinClrLst/>
+    <dgm:txFillClrLst/>
+    <dgm:txEffectClrLst/>
+  </dgm:styleLbl>
+  <dgm:styleLbl name="asst4">
+    <dgm:fillClrLst meth="repeat">
+      <a:schemeClr val="accent1"/>
+    </dgm:fillClrLst>
+    <dgm:linClrLst meth="repeat">
+      <a:schemeClr val="lt1"/>
+    </dgm:linClrLst>
+    <dgm:effectClrLst/>
+    <dgm:txLinClrLst/>
+    <dgm:txFillClrLst/>
+    <dgm:txEffectClrLst/>
+  </dgm:styleLbl>
+  <dgm:styleLbl name="parChTrans2D1">
+    <dgm:fillClrLst meth="repeat">
+      <a:schemeClr val="accent1">
+        <a:tint val="60000"/>
+      </a:schemeClr>
+    </dgm:fillClrLst>
+    <dgm:linClrLst meth="repeat">
+      <a:schemeClr val="accent1">
+        <a:tint val="60000"/>
+      </a:schemeClr>
+    </dgm:linClrLst>
+    <dgm:effectClrLst/>
+    <dgm:txLinClrLst/>
+    <dgm:txFillClrLst meth="repeat">
+      <a:schemeClr val="lt1"/>
+    </dgm:txFillClrLst>
+    <dgm:txEffectClrLst/>
+  </dgm:styleLbl>
+  <dgm:styleLbl name="parChTrans2D2">
+    <dgm:fillClrLst meth="repeat">
+      <a:schemeClr val="accent1"/>
+    </dgm:fillClrLst>
+    <dgm:linClrLst meth="repeat">
+      <a:schemeClr val="accent1"/>
+    </dgm:linClrLst>
+    <dgm:effectClrLst/>
+    <dgm:txLinClrLst/>
+    <dgm:txFillClrLst meth="repeat">
+      <a:schemeClr val="lt1"/>
+    </dgm:txFillClrLst>
+    <dgm:txEffectClrLst/>
+  </dgm:styleLbl>
+  <dgm:styleLbl name="parChTrans2D3">
+    <dgm:fillClrLst meth="repeat">
+      <a:schemeClr val="accent1"/>
+    </dgm:fillClrLst>
+    <dgm:linClrLst meth="repeat">
+      <a:schemeClr val="accent1"/>
+    </dgm:linClrLst>
+    <dgm:effectClrLst/>
+    <dgm:txLinClrLst/>
+    <dgm:txFillClrLst meth="repeat">
+      <a:schemeClr val="lt1"/>
+    </dgm:txFillClrLst>
+    <dgm:txEffectClrLst/>
+  </dgm:styleLbl>
+  <dgm:styleLbl name="parChTrans2D4">
+    <dgm:fillClrLst meth="repeat">
+      <a:schemeClr val="accent1"/>
+    </dgm:fillClrLst>
+    <dgm:linClrLst meth="repeat">
+      <a:schemeClr val="accent1"/>
+    </dgm:linClrLst>
+    <dgm:effectClrLst/>
+    <dgm:txLinClrLst/>
+    <dgm:txFillClrLst meth="repeat">
+      <a:schemeClr val="lt1"/>
+    </dgm:txFillClrLst>
+    <dgm:txEffectClrLst/>
+  </dgm:styleLbl>
+  <dgm:styleLbl name="parChTrans1D1">
+    <dgm:fillClrLst meth="repeat">
+      <a:schemeClr val="accent1"/>
+    </dgm:fillClrLst>
+    <dgm:linClrLst meth="repeat">
+      <a:schemeClr val="accent1">
+        <a:shade val="60000"/>
+      </a:schemeClr>
+    </dgm:linClrLst>
+    <dgm:effectClrLst/>
+    <dgm:txLinClrLst/>
+    <dgm:txFillClrLst meth="repeat">
+      <a:schemeClr val="tx1"/>
+    </dgm:txFillClrLst>
+    <dgm:txEffectClrLst/>
+  </dgm:styleLbl>
+  <dgm:styleLbl name="parChTrans1D2">
+    <dgm:fillClrLst meth="repeat">
+      <a:schemeClr val="accent1"/>
+    </dgm:fillClrLst>
+    <dgm:linClrLst meth="repeat">
+      <a:schemeClr val="accent1">
+        <a:shade val="60000"/>
+      </a:schemeClr>
+    </dgm:linClrLst>
+    <dgm:effectClrLst/>
+    <dgm:txLinClrLst/>
+    <dgm:txFillClrLst meth="repeat">
+      <a:schemeClr val="tx1"/>
+    </dgm:txFillClrLst>
+    <dgm:txEffectClrLst/>
+  </dgm:styleLbl>
+  <dgm:styleLbl name="parChTrans1D3">
+    <dgm:fillClrLst meth="repeat">
+      <a:schemeClr val="accent1"/>
+    </dgm:fillClrLst>
+    <dgm:linClrLst meth="repeat">
+      <a:schemeClr val="accent1">
+        <a:shade val="80000"/>
+      </a:schemeClr>
+    </dgm:linClrLst>
+    <dgm:effectClrLst/>
+    <dgm:txLinClrLst/>
+    <dgm:txFillClrLst meth="repeat">
+      <a:schemeClr val="tx1"/>
+    </dgm:txFillClrLst>
+    <dgm:txEffectClrLst/>
+  </dgm:styleLbl>
+  <dgm:styleLbl name="parChTrans1D4">
+    <dgm:fillClrLst meth="repeat">
+      <a:schemeClr val="accent1"/>
+    </dgm:fillClrLst>
+    <dgm:linClrLst meth="repeat">
+      <a:schemeClr val="accent1">
+        <a:shade val="80000"/>
+      </a:schemeClr>
+    </dgm:linClrLst>
+    <dgm:effectClrLst/>
+    <dgm:txLinClrLst/>
+    <dgm:txFillClrLst meth="repeat">
+      <a:schemeClr val="tx1"/>
+    </dgm:txFillClrLst>
+    <dgm:txEffectClrLst/>
+  </dgm:styleLbl>
+  <dgm:styleLbl name="fgAcc1">
+    <dgm:fillClrLst meth="repeat">
+      <a:schemeClr val="lt1">
+        <a:alpha val="90000"/>
+      </a:schemeClr>
+    </dgm:fillClrLst>
+    <dgm:linClrLst meth="repeat">
+      <a:schemeClr val="accent1"/>
+    </dgm:linClrLst>
+    <dgm:effectClrLst/>
+    <dgm:txLinClrLst/>
+    <dgm:txFillClrLst meth="repeat">
+      <a:schemeClr val="dk1"/>
+    </dgm:txFillClrLst>
+    <dgm:txEffectClrLst/>
+  </dgm:styleLbl>
+  <dgm:styleLbl name="conFgAcc1">
+    <dgm:fillClrLst meth="repeat">
+      <a:schemeClr val="lt1">
+        <a:alpha val="90000"/>
+      </a:schemeClr>
+    </dgm:fillClrLst>
+    <dgm:linClrLst meth="repeat">
+      <a:schemeClr val="accent1"/>
+    </dgm:linClrLst>
+    <dgm:effectClrLst/>
+    <dgm:txLinClrLst/>
+    <dgm:txFillClrLst meth="repeat">
+      <a:schemeClr val="dk1"/>
+    </dgm:txFillClrLst>
+    <dgm:txEffectClrLst/>
+  </dgm:styleLbl>
+  <dgm:styleLbl name="alignAcc1">
+    <dgm:fillClrLst meth="repeat">
+      <a:schemeClr val="lt1">
+        <a:alpha val="90000"/>
+      </a:schemeClr>
+    </dgm:fillClrLst>
+    <dgm:linClrLst meth="repeat">
+      <a:schemeClr val="accent1"/>
+    </dgm:linClrLst>
+    <dgm:effectClrLst/>
+    <dgm:txLinClrLst/>
+    <dgm:txFillClrLst meth="repeat">
+      <a:schemeClr val="dk1"/>
+    </dgm:txFillClrLst>
+    <dgm:txEffectClrLst/>
+  </dgm:styleLbl>
+  <dgm:styleLbl name="trAlignAcc1">
+    <dgm:fillClrLst meth="repeat">
+      <a:schemeClr val="lt1">
+        <a:alpha val="40000"/>
+      </a:schemeClr>
+    </dgm:fillClrLst>
+    <dgm:linClrLst meth="repeat">
+      <a:schemeClr val="accent1"/>
+    </dgm:linClrLst>
+    <dgm:effectClrLst/>
+    <dgm:txLinClrLst/>
+    <dgm:txFillClrLst meth="repeat">
+      <a:schemeClr val="dk1"/>
+    </dgm:txFillClrLst>
+    <dgm:txEffectClrLst/>
+  </dgm:styleLbl>
+  <dgm:styleLbl name="bgAcc1">
+    <dgm:fillClrLst meth="repeat">
+      <a:schemeClr val="lt1">
+        <a:alpha val="90000"/>
+      </a:schemeClr>
+    </dgm:fillClrLst>
+    <dgm:linClrLst meth="repeat">
+      <a:schemeClr val="accent1"/>
+    </dgm:linClrLst>
+    <dgm:effectClrLst/>
+    <dgm:txLinClrLst/>
+    <dgm:txFillClrLst meth="repeat">
+      <a:schemeClr val="dk1"/>
+    </dgm:txFillClrLst>
+    <dgm:txEffectClrLst/>
+  </dgm:styleLbl>
+  <dgm:styleLbl name="solidFgAcc1">
+    <dgm:fillClrLst meth="repeat">
+      <a:schemeClr val="lt1"/>
+    </dgm:fillClrLst>
+    <dgm:linClrLst meth="repeat">
+      <a:schemeClr val="accent1"/>
+    </dgm:linClrLst>
+    <dgm:effectClrLst/>
+    <dgm:txLinClrLst/>
+    <dgm:txFillClrLst meth="repeat">
+      <a:schemeClr val="dk1"/>
+    </dgm:txFillClrLst>
+    <dgm:txEffectClrLst/>
+  </dgm:styleLbl>
+  <dgm:styleLbl name="solidAlignAcc1">
+    <dgm:fillClrLst meth="repeat">
+      <a:schemeClr val="lt1"/>
+    </dgm:fillClrLst>
+    <dgm:linClrLst meth="repeat">
+      <a:schemeClr val="accent1"/>
+    </dgm:linClrLst>
+    <dgm:effectClrLst/>
+    <dgm:txLinClrLst/>
+    <dgm:txFillClrLst meth="repeat">
+      <a:schemeClr val="dk1"/>
+    </dgm:txFillClrLst>
+    <dgm:txEffectClrLst/>
+  </dgm:styleLbl>
+  <dgm:styleLbl name="solidBgAcc1">
+    <dgm:fillClrLst meth="repeat">
+      <a:schemeClr val="lt1"/>
+    </dgm:fillClrLst>
+    <dgm:linClrLst meth="repeat">
+      <a:schemeClr val="accent1"/>
+    </dgm:linClrLst>
+    <dgm:effectClrLst/>
+    <dgm:txLinClrLst/>
+    <dgm:txFillClrLst meth="repeat">
+      <a:schemeClr val="dk1"/>
+    </dgm:txFillClrLst>
+    <dgm:txEffectClrLst/>
+  </dgm:styleLbl>
+  <dgm:styleLbl name="fgAccFollowNode1">
+    <dgm:fillClrLst meth="repeat">
+      <a:schemeClr val="accent1">
+        <a:alpha val="90000"/>
+        <a:tint val="40000"/>
+      </a:schemeClr>
+    </dgm:fillClrLst>
+    <dgm:linClrLst meth="repeat">
+      <a:schemeClr val="accent1">
+        <a:alpha val="90000"/>
+        <a:tint val="40000"/>
+      </a:schemeClr>
+    </dgm:linClrLst>
+    <dgm:effectClrLst/>
+    <dgm:txLinClrLst/>
+    <dgm:txFillClrLst meth="repeat">
+      <a:schemeClr val="dk1"/>
+    </dgm:txFillClrLst>
+    <dgm:txEffectClrLst/>
+  </dgm:styleLbl>
+  <dgm:styleLbl name="alignAccFollowNode1">
+    <dgm:fillClrLst meth="repeat">
+      <a:schemeClr val="accent1">
+        <a:alpha val="90000"/>
+        <a:tint val="40000"/>
+      </a:schemeClr>
+    </dgm:fillClrLst>
+    <dgm:linClrLst meth="repeat">
+      <a:schemeClr val="accent1">
+        <a:alpha val="90000"/>
+        <a:tint val="40000"/>
+      </a:schemeClr>
+    </dgm:linClrLst>
+    <dgm:effectClrLst/>
+    <dgm:txLinClrLst/>
+    <dgm:txFillClrLst meth="repeat">
+      <a:schemeClr val="dk1"/>
+    </dgm:txFillClrLst>
+    <dgm:txEffectClrLst/>
+  </dgm:styleLbl>
+  <dgm:styleLbl name="bgAccFollowNode1">
+    <dgm:fillClrLst meth="repeat">
+      <a:schemeClr val="accent1">
+        <a:alpha val="90000"/>
+        <a:tint val="40000"/>
+      </a:schemeClr>
+    </dgm:fillClrLst>
+    <dgm:linClrLst meth="repeat">
+      <a:schemeClr val="accent1">
+        <a:alpha val="90000"/>
+        <a:tint val="40000"/>
+      </a:schemeClr>
+    </dgm:linClrLst>
+    <dgm:effectClrLst/>
+    <dgm:txLinClrLst/>
+    <dgm:txFillClrLst meth="repeat">
+      <a:schemeClr val="dk1"/>
+    </dgm:txFillClrLst>
+    <dgm:txEffectClrLst/>
+  </dgm:styleLbl>
+  <dgm:styleLbl name="fgAcc0">
+    <dgm:fillClrLst meth="repeat">
+      <a:schemeClr val="lt1">
+        <a:alpha val="90000"/>
+      </a:schemeClr>
+    </dgm:fillClrLst>
+    <dgm:linClrLst meth="repeat">
+      <a:schemeClr val="accent1"/>
+    </dgm:linClrLst>
+    <dgm:effectClrLst/>
+    <dgm:txLinClrLst/>
+    <dgm:txFillClrLst meth="repeat">
+      <a:schemeClr val="dk1"/>
+    </dgm:txFillClrLst>
+    <dgm:txEffectClrLst/>
+  </dgm:styleLbl>
+  <dgm:styleLbl name="fgAcc2">
+    <dgm:fillClrLst meth="repeat">
+      <a:schemeClr val="lt1">
+        <a:alpha val="90000"/>
+      </a:schemeClr>
+    </dgm:fillClrLst>
+    <dgm:linClrLst meth="repeat">
+      <a:schemeClr val="accent1"/>
+    </dgm:linClrLst>
+    <dgm:effectClrLst/>
+    <dgm:txLinClrLst/>
+    <dgm:txFillClrLst meth="repeat">
+      <a:schemeClr val="dk1"/>
+    </dgm:txFillClrLst>
+    <dgm:txEffectClrLst/>
+  </dgm:styleLbl>
+  <dgm:styleLbl name="fgAcc3">
+    <dgm:fillClrLst meth="repeat">
+      <a:schemeClr val="lt1">
+        <a:alpha val="90000"/>
+      </a:schemeClr>
+    </dgm:fillClrLst>
+    <dgm:linClrLst meth="repeat">
+      <a:schemeClr val="accent1"/>
+    </dgm:linClrLst>
+    <dgm:effectClrLst/>
+    <dgm:txLinClrLst/>
+    <dgm:txFillClrLst meth="repeat">
+      <a:schemeClr val="dk1"/>
+    </dgm:txFillClrLst>
+    <dgm:txEffectClrLst/>
+  </dgm:styleLbl>
+  <dgm:styleLbl name="fgAcc4">
+    <dgm:fillClrLst meth="repeat">
+      <a:schemeClr val="lt1">
+        <a:alpha val="90000"/>
+      </a:schemeClr>
+    </dgm:fillClrLst>
+    <dgm:linClrLst meth="repeat">
+      <a:schemeClr val="accent1"/>
+    </dgm:linClrLst>
+    <dgm:effectClrLst/>
+    <dgm:txLinClrLst/>
+    <dgm:txFillClrLst meth="repeat">
+      <a:schemeClr val="dk1"/>
+    </dgm:txFillClrLst>
+    <dgm:txEffectClrLst/>
+  </dgm:styleLbl>
+  <dgm:styleLbl name="bgShp">
+    <dgm:fillClrLst meth="repeat">
+      <a:schemeClr val="accent1">
+        <a:tint val="40000"/>
+      </a:schemeClr>
+    </dgm:fillClrLst>
+    <dgm:linClrLst meth="repeat">
+      <a:schemeClr val="accent1"/>
+    </dgm:linClrLst>
+    <dgm:effectClrLst/>
+    <dgm:txLinClrLst/>
+    <dgm:txFillClrLst meth="repeat">
+      <a:schemeClr val="dk1"/>
+    </dgm:txFillClrLst>
+    <dgm:txEffectClrLst/>
+  </dgm:styleLbl>
+  <dgm:styleLbl name="dkBgShp">
+    <dgm:fillClrLst meth="repeat">
+      <a:schemeClr val="accent1">
+        <a:shade val="80000"/>
+      </a:schemeClr>
+    </dgm:fillClrLst>
+    <dgm:linClrLst meth="repeat">
+      <a:schemeClr val="accent1"/>
+    </dgm:linClrLst>
+    <dgm:effectClrLst/>
+    <dgm:txLinClrLst/>
+    <dgm:txFillClrLst meth="repeat">
+      <a:schemeClr val="lt1"/>
+    </dgm:txFillClrLst>
+    <dgm:txEffectClrLst/>
+  </dgm:styleLbl>
+  <dgm:styleLbl name="trBgShp">
+    <dgm:fillClrLst meth="repeat">
+      <a:schemeClr val="accent1">
+        <a:tint val="50000"/>
+        <a:alpha val="40000"/>
+      </a:schemeClr>
+    </dgm:fillClrLst>
+    <dgm:linClrLst meth="repeat">
+      <a:schemeClr val="accent1"/>
+    </dgm:linClrLst>
+    <dgm:effectClrLst/>
+    <dgm:txLinClrLst/>
+    <dgm:txFillClrLst meth="repeat">
+      <a:schemeClr val="lt1"/>
+    </dgm:txFillClrLst>
+    <dgm:txEffectClrLst/>
+  </dgm:styleLbl>
+  <dgm:styleLbl name="fgShp">
+    <dgm:fillClrLst meth="repeat">
+      <a:schemeClr val="accent1">
+        <a:tint val="60000"/>
+      </a:schemeClr>
+    </dgm:fillClrLst>
+    <dgm:linClrLst meth="repeat">
+      <a:schemeClr val="lt1"/>
+    </dgm:linClrLst>
+    <dgm:effectClrLst/>
+    <dgm:txLinClrLst/>
+    <dgm:txFillClrLst meth="repeat">
+      <a:schemeClr val="dk1"/>
+    </dgm:txFillClrLst>
+    <dgm:txEffectClrLst/>
+  </dgm:styleLbl>
+  <dgm:styleLbl name="revTx">
+    <dgm:fillClrLst meth="repeat">
+      <a:schemeClr val="lt1">
+        <a:alpha val="0"/>
+      </a:schemeClr>
+    </dgm:fillClrLst>
+    <dgm:linClrLst meth="repeat">
+      <a:schemeClr val="dk1">
+        <a:alpha val="0"/>
+      </a:schemeClr>
+    </dgm:linClrLst>
+    <dgm:effectClrLst/>
+    <dgm:txLinClrLst/>
+    <dgm:txFillClrLst meth="repeat">
+      <a:schemeClr val="tx1"/>
+    </dgm:txFillClrLst>
+    <dgm:txEffectClrLst/>
+  </dgm:styleLbl>
+</dgm:colorsDef>
+</file>
+
+<file path=ppt/diagrams/data1.xml><?xml version="1.0" encoding="utf-8"?>
+<dgm:dataModel xmlns:dgm="http://schemas.openxmlformats.org/drawingml/2006/diagram" xmlns:a="http://schemas.openxmlformats.org/drawingml/2006/main">
+  <dgm:ptLst>
+    <dgm:pt modelId="{190770C8-8D4C-470D-9E32-B04ADE689A12}" type="doc">
+      <dgm:prSet loTypeId="urn:microsoft.com/office/officeart/2005/8/layout/cycle2" loCatId="cycle" qsTypeId="urn:microsoft.com/office/officeart/2005/8/quickstyle/simple4" qsCatId="simple" csTypeId="urn:microsoft.com/office/officeart/2005/8/colors/accent1_2" csCatId="accent1" phldr="1"/>
+      <dgm:spPr/>
+      <dgm:t>
+        <a:bodyPr/>
+        <a:lstStyle/>
+        <a:p>
+          <a:endParaRPr lang="en-US"/>
+        </a:p>
+      </dgm:t>
+    </dgm:pt>
+    <dgm:pt modelId="{79F93BA4-A6A9-49D1-B152-9618EB1F1F92}">
+      <dgm:prSet phldrT="[Text]"/>
+      <dgm:spPr/>
+      <dgm:t>
+        <a:bodyPr/>
+        <a:lstStyle/>
+        <a:p>
+          <a:r>
+            <a:rPr lang="en-US" dirty="0" smtClean="0"/>
+            <a:t>Write Tests</a:t>
+          </a:r>
+          <a:endParaRPr lang="en-US" dirty="0"/>
+        </a:p>
+      </dgm:t>
+    </dgm:pt>
+    <dgm:pt modelId="{8A11D0B8-FE37-4910-93BC-1CE9037CAB61}" type="parTrans" cxnId="{45D377A4-A37B-45B9-BF8D-C7DD2DF1FA94}">
+      <dgm:prSet/>
+      <dgm:spPr/>
+      <dgm:t>
+        <a:bodyPr/>
+        <a:lstStyle/>
+        <a:p>
+          <a:endParaRPr lang="en-US"/>
+        </a:p>
+      </dgm:t>
+    </dgm:pt>
+    <dgm:pt modelId="{9B55E3AB-D2C5-4244-A191-027550800238}" type="sibTrans" cxnId="{45D377A4-A37B-45B9-BF8D-C7DD2DF1FA94}">
+      <dgm:prSet/>
+      <dgm:spPr/>
+      <dgm:t>
+        <a:bodyPr/>
+        <a:lstStyle/>
+        <a:p>
+          <a:endParaRPr lang="en-US"/>
+        </a:p>
+      </dgm:t>
+    </dgm:pt>
+    <dgm:pt modelId="{57959D22-4694-4A0F-A80C-C063633094B9}">
+      <dgm:prSet phldrT="[Text]"/>
+      <dgm:spPr/>
+      <dgm:t>
+        <a:bodyPr/>
+        <a:lstStyle/>
+        <a:p>
+          <a:r>
+            <a:rPr lang="en-US" dirty="0" smtClean="0"/>
+            <a:t>Add Function</a:t>
+          </a:r>
+          <a:endParaRPr lang="en-US" dirty="0"/>
+        </a:p>
+      </dgm:t>
+    </dgm:pt>
+    <dgm:pt modelId="{9A77E1AD-4045-4BA2-8A5D-E3CD1F011257}" type="parTrans" cxnId="{A1B1DE03-863C-48E2-9C08-0018AECA5CA0}">
+      <dgm:prSet/>
+      <dgm:spPr/>
+      <dgm:t>
+        <a:bodyPr/>
+        <a:lstStyle/>
+        <a:p>
+          <a:endParaRPr lang="en-US"/>
+        </a:p>
+      </dgm:t>
+    </dgm:pt>
+    <dgm:pt modelId="{BF2C4B42-525E-479B-AC81-9827F9EBB04C}" type="sibTrans" cxnId="{A1B1DE03-863C-48E2-9C08-0018AECA5CA0}">
+      <dgm:prSet/>
+      <dgm:spPr/>
+      <dgm:t>
+        <a:bodyPr/>
+        <a:lstStyle/>
+        <a:p>
+          <a:endParaRPr lang="en-US"/>
+        </a:p>
+      </dgm:t>
+    </dgm:pt>
+    <dgm:pt modelId="{81F24EC1-2872-4B1E-8440-F37DCC5BDBA6}">
+      <dgm:prSet phldrT="[Text]"/>
+      <dgm:spPr/>
+      <dgm:t>
+        <a:bodyPr/>
+        <a:lstStyle/>
+        <a:p>
+          <a:r>
+            <a:rPr lang="en-US" dirty="0" smtClean="0"/>
+            <a:t>Revise Past Tests</a:t>
+          </a:r>
+          <a:endParaRPr lang="en-US" dirty="0"/>
+        </a:p>
+      </dgm:t>
+    </dgm:pt>
+    <dgm:pt modelId="{19338E4C-38BA-47A9-802F-7A733BA16081}" type="parTrans" cxnId="{4EC8786C-1ECA-4638-8DD6-9F4E28FD2CC1}">
+      <dgm:prSet/>
+      <dgm:spPr/>
+      <dgm:t>
+        <a:bodyPr/>
+        <a:lstStyle/>
+        <a:p>
+          <a:endParaRPr lang="en-US"/>
+        </a:p>
+      </dgm:t>
+    </dgm:pt>
+    <dgm:pt modelId="{8656068D-C277-473B-99B0-FABDC8797BDC}" type="sibTrans" cxnId="{4EC8786C-1ECA-4638-8DD6-9F4E28FD2CC1}">
+      <dgm:prSet/>
+      <dgm:spPr/>
+      <dgm:t>
+        <a:bodyPr/>
+        <a:lstStyle/>
+        <a:p>
+          <a:endParaRPr lang="en-US"/>
+        </a:p>
+      </dgm:t>
+    </dgm:pt>
+    <dgm:pt modelId="{FC46C9E2-068C-4EC7-88FD-1C91F8A7130A}">
+      <dgm:prSet phldrT="[Text]"/>
+      <dgm:spPr/>
+      <dgm:t>
+        <a:bodyPr/>
+        <a:lstStyle/>
+        <a:p>
+          <a:r>
+            <a:rPr lang="en-US" dirty="0" smtClean="0"/>
+            <a:t>Run Tests</a:t>
+          </a:r>
+          <a:endParaRPr lang="en-US" dirty="0"/>
+        </a:p>
+      </dgm:t>
+    </dgm:pt>
+    <dgm:pt modelId="{0391F969-3953-4721-95D3-9B812691488A}" type="parTrans" cxnId="{DB5FDEE2-4931-4735-AABD-5A88EE903E5C}">
+      <dgm:prSet/>
+      <dgm:spPr/>
+      <dgm:t>
+        <a:bodyPr/>
+        <a:lstStyle/>
+        <a:p>
+          <a:endParaRPr lang="en-US"/>
+        </a:p>
+      </dgm:t>
+    </dgm:pt>
+    <dgm:pt modelId="{D5621349-5567-4856-8BED-DAEF3C1679DE}" type="sibTrans" cxnId="{DB5FDEE2-4931-4735-AABD-5A88EE903E5C}">
+      <dgm:prSet/>
+      <dgm:spPr/>
+      <dgm:t>
+        <a:bodyPr/>
+        <a:lstStyle/>
+        <a:p>
+          <a:endParaRPr lang="en-US"/>
+        </a:p>
+      </dgm:t>
+    </dgm:pt>
+    <dgm:pt modelId="{D03DD5B3-8AC9-4EBA-B91D-F57C4DABA3B5}">
+      <dgm:prSet phldrT="[Text]"/>
+      <dgm:spPr/>
+      <dgm:t>
+        <a:bodyPr/>
+        <a:lstStyle/>
+        <a:p>
+          <a:r>
+            <a:rPr lang="en-US" dirty="0" smtClean="0"/>
+            <a:t>Interpret Result</a:t>
+          </a:r>
+          <a:endParaRPr lang="en-US" dirty="0"/>
+        </a:p>
+      </dgm:t>
+    </dgm:pt>
+    <dgm:pt modelId="{434DD8DA-19F9-4D08-8CD3-9B0283FF9214}" type="parTrans" cxnId="{90717D4C-DDE5-4DDA-ABCB-9CBC0660CEC5}">
+      <dgm:prSet/>
+      <dgm:spPr/>
+      <dgm:t>
+        <a:bodyPr/>
+        <a:lstStyle/>
+        <a:p>
+          <a:endParaRPr lang="en-US"/>
+        </a:p>
+      </dgm:t>
+    </dgm:pt>
+    <dgm:pt modelId="{998EA877-5833-416B-8092-5E5F6EA1382D}" type="sibTrans" cxnId="{90717D4C-DDE5-4DDA-ABCB-9CBC0660CEC5}">
+      <dgm:prSet/>
+      <dgm:spPr/>
+      <dgm:t>
+        <a:bodyPr/>
+        <a:lstStyle/>
+        <a:p>
+          <a:endParaRPr lang="en-US"/>
+        </a:p>
+      </dgm:t>
+    </dgm:pt>
+    <dgm:pt modelId="{EDD48AB6-364A-4C74-9E06-8AFE6D2719BC}" type="pres">
+      <dgm:prSet presAssocID="{190770C8-8D4C-470D-9E32-B04ADE689A12}" presName="cycle" presStyleCnt="0">
+        <dgm:presLayoutVars>
+          <dgm:dir/>
+          <dgm:resizeHandles val="exact"/>
+        </dgm:presLayoutVars>
+      </dgm:prSet>
+      <dgm:spPr/>
+    </dgm:pt>
+    <dgm:pt modelId="{CBD245A0-E455-4CAF-B3BA-7BCCF5F0D9DF}" type="pres">
+      <dgm:prSet presAssocID="{79F93BA4-A6A9-49D1-B152-9618EB1F1F92}" presName="node" presStyleLbl="node1" presStyleIdx="0" presStyleCnt="5" custRadScaleRad="100068" custRadScaleInc="-3204">
+        <dgm:presLayoutVars>
+          <dgm:bulletEnabled val="1"/>
+        </dgm:presLayoutVars>
+      </dgm:prSet>
+      <dgm:spPr/>
+    </dgm:pt>
+    <dgm:pt modelId="{37FE0927-F5E5-4668-8DBE-D255CE13CBE4}" type="pres">
+      <dgm:prSet presAssocID="{9B55E3AB-D2C5-4244-A191-027550800238}" presName="sibTrans" presStyleLbl="sibTrans2D1" presStyleIdx="0" presStyleCnt="5"/>
+      <dgm:spPr/>
+    </dgm:pt>
+    <dgm:pt modelId="{1E9A022D-BA35-4D37-803E-5A04385BBF46}" type="pres">
+      <dgm:prSet presAssocID="{9B55E3AB-D2C5-4244-A191-027550800238}" presName="connectorText" presStyleLbl="sibTrans2D1" presStyleIdx="0" presStyleCnt="5"/>
+      <dgm:spPr/>
+    </dgm:pt>
+    <dgm:pt modelId="{3A5AF1D0-5380-4962-907C-6199C0B092C7}" type="pres">
+      <dgm:prSet presAssocID="{57959D22-4694-4A0F-A80C-C063633094B9}" presName="node" presStyleLbl="node1" presStyleIdx="1" presStyleCnt="5">
+        <dgm:presLayoutVars>
+          <dgm:bulletEnabled val="1"/>
+        </dgm:presLayoutVars>
+      </dgm:prSet>
+      <dgm:spPr/>
+      <dgm:t>
+        <a:bodyPr/>
+        <a:lstStyle/>
+        <a:p>
+          <a:endParaRPr lang="en-US"/>
+        </a:p>
+      </dgm:t>
+    </dgm:pt>
+    <dgm:pt modelId="{86F8274C-CF59-4850-AFAB-F529049B9AAC}" type="pres">
+      <dgm:prSet presAssocID="{BF2C4B42-525E-479B-AC81-9827F9EBB04C}" presName="sibTrans" presStyleLbl="sibTrans2D1" presStyleIdx="1" presStyleCnt="5"/>
+      <dgm:spPr/>
+    </dgm:pt>
+    <dgm:pt modelId="{91032604-1D39-4D7A-BE23-6380444B0E01}" type="pres">
+      <dgm:prSet presAssocID="{BF2C4B42-525E-479B-AC81-9827F9EBB04C}" presName="connectorText" presStyleLbl="sibTrans2D1" presStyleIdx="1" presStyleCnt="5"/>
+      <dgm:spPr/>
+    </dgm:pt>
+    <dgm:pt modelId="{8964AD52-68D2-4375-A2F0-243890E07089}" type="pres">
+      <dgm:prSet presAssocID="{81F24EC1-2872-4B1E-8440-F37DCC5BDBA6}" presName="node" presStyleLbl="node1" presStyleIdx="2" presStyleCnt="5">
+        <dgm:presLayoutVars>
+          <dgm:bulletEnabled val="1"/>
+        </dgm:presLayoutVars>
+      </dgm:prSet>
+      <dgm:spPr/>
+      <dgm:t>
+        <a:bodyPr/>
+        <a:lstStyle/>
+        <a:p>
+          <a:endParaRPr lang="en-US"/>
+        </a:p>
+      </dgm:t>
+    </dgm:pt>
+    <dgm:pt modelId="{B36C6181-3F9C-4CBD-8CCE-C8211C490C0F}" type="pres">
+      <dgm:prSet presAssocID="{8656068D-C277-473B-99B0-FABDC8797BDC}" presName="sibTrans" presStyleLbl="sibTrans2D1" presStyleIdx="2" presStyleCnt="5"/>
+      <dgm:spPr/>
+    </dgm:pt>
+    <dgm:pt modelId="{C10F0AE3-85FF-41A9-A2BF-B46681896931}" type="pres">
+      <dgm:prSet presAssocID="{8656068D-C277-473B-99B0-FABDC8797BDC}" presName="connectorText" presStyleLbl="sibTrans2D1" presStyleIdx="2" presStyleCnt="5"/>
+      <dgm:spPr/>
+    </dgm:pt>
+    <dgm:pt modelId="{1A7E8F07-5996-4315-98AD-745A327BFC6D}" type="pres">
+      <dgm:prSet presAssocID="{FC46C9E2-068C-4EC7-88FD-1C91F8A7130A}" presName="node" presStyleLbl="node1" presStyleIdx="3" presStyleCnt="5">
+        <dgm:presLayoutVars>
+          <dgm:bulletEnabled val="1"/>
+        </dgm:presLayoutVars>
+      </dgm:prSet>
+      <dgm:spPr/>
+    </dgm:pt>
+    <dgm:pt modelId="{BCE23A88-C56A-4E01-B123-B35E923F7CF0}" type="pres">
+      <dgm:prSet presAssocID="{D5621349-5567-4856-8BED-DAEF3C1679DE}" presName="sibTrans" presStyleLbl="sibTrans2D1" presStyleIdx="3" presStyleCnt="5"/>
+      <dgm:spPr/>
+    </dgm:pt>
+    <dgm:pt modelId="{A73C70E8-219B-4A47-96E4-BF723E3EE74D}" type="pres">
+      <dgm:prSet presAssocID="{D5621349-5567-4856-8BED-DAEF3C1679DE}" presName="connectorText" presStyleLbl="sibTrans2D1" presStyleIdx="3" presStyleCnt="5"/>
+      <dgm:spPr/>
+    </dgm:pt>
+    <dgm:pt modelId="{1CE9DAFA-1335-4E29-ABA3-55C3557F1054}" type="pres">
+      <dgm:prSet presAssocID="{D03DD5B3-8AC9-4EBA-B91D-F57C4DABA3B5}" presName="node" presStyleLbl="node1" presStyleIdx="4" presStyleCnt="5">
+        <dgm:presLayoutVars>
+          <dgm:bulletEnabled val="1"/>
+        </dgm:presLayoutVars>
+      </dgm:prSet>
+      <dgm:spPr/>
+      <dgm:t>
+        <a:bodyPr/>
+        <a:lstStyle/>
+        <a:p>
+          <a:endParaRPr lang="en-US"/>
+        </a:p>
+      </dgm:t>
+    </dgm:pt>
+    <dgm:pt modelId="{BEEED8EC-05AC-4DB9-AED8-14E6F9C313DB}" type="pres">
+      <dgm:prSet presAssocID="{998EA877-5833-416B-8092-5E5F6EA1382D}" presName="sibTrans" presStyleLbl="sibTrans2D1" presStyleIdx="4" presStyleCnt="5"/>
+      <dgm:spPr/>
+    </dgm:pt>
+    <dgm:pt modelId="{253E196B-7891-47A6-BB92-085ACE7563D8}" type="pres">
+      <dgm:prSet presAssocID="{998EA877-5833-416B-8092-5E5F6EA1382D}" presName="connectorText" presStyleLbl="sibTrans2D1" presStyleIdx="4" presStyleCnt="5"/>
+      <dgm:spPr/>
+    </dgm:pt>
+  </dgm:ptLst>
+  <dgm:cxnLst>
+    <dgm:cxn modelId="{4EC8786C-1ECA-4638-8DD6-9F4E28FD2CC1}" srcId="{190770C8-8D4C-470D-9E32-B04ADE689A12}" destId="{81F24EC1-2872-4B1E-8440-F37DCC5BDBA6}" srcOrd="2" destOrd="0" parTransId="{19338E4C-38BA-47A9-802F-7A733BA16081}" sibTransId="{8656068D-C277-473B-99B0-FABDC8797BDC}"/>
+    <dgm:cxn modelId="{DB5FDEE2-4931-4735-AABD-5A88EE903E5C}" srcId="{190770C8-8D4C-470D-9E32-B04ADE689A12}" destId="{FC46C9E2-068C-4EC7-88FD-1C91F8A7130A}" srcOrd="3" destOrd="0" parTransId="{0391F969-3953-4721-95D3-9B812691488A}" sibTransId="{D5621349-5567-4856-8BED-DAEF3C1679DE}"/>
+    <dgm:cxn modelId="{45D377A4-A37B-45B9-BF8D-C7DD2DF1FA94}" srcId="{190770C8-8D4C-470D-9E32-B04ADE689A12}" destId="{79F93BA4-A6A9-49D1-B152-9618EB1F1F92}" srcOrd="0" destOrd="0" parTransId="{8A11D0B8-FE37-4910-93BC-1CE9037CAB61}" sibTransId="{9B55E3AB-D2C5-4244-A191-027550800238}"/>
+    <dgm:cxn modelId="{7ADDB7CC-45E4-4553-8E2B-DB083F42EF00}" type="presOf" srcId="{BF2C4B42-525E-479B-AC81-9827F9EBB04C}" destId="{91032604-1D39-4D7A-BE23-6380444B0E01}" srcOrd="1" destOrd="0" presId="urn:microsoft.com/office/officeart/2005/8/layout/cycle2"/>
+    <dgm:cxn modelId="{8F6DBFC4-605F-4C6A-84FF-56176CFF3EF6}" type="presOf" srcId="{998EA877-5833-416B-8092-5E5F6EA1382D}" destId="{253E196B-7891-47A6-BB92-085ACE7563D8}" srcOrd="1" destOrd="0" presId="urn:microsoft.com/office/officeart/2005/8/layout/cycle2"/>
+    <dgm:cxn modelId="{0946C5EF-DB92-420B-B699-58EC94A6A020}" type="presOf" srcId="{BF2C4B42-525E-479B-AC81-9827F9EBB04C}" destId="{86F8274C-CF59-4850-AFAB-F529049B9AAC}" srcOrd="0" destOrd="0" presId="urn:microsoft.com/office/officeart/2005/8/layout/cycle2"/>
+    <dgm:cxn modelId="{A1B1DE03-863C-48E2-9C08-0018AECA5CA0}" srcId="{190770C8-8D4C-470D-9E32-B04ADE689A12}" destId="{57959D22-4694-4A0F-A80C-C063633094B9}" srcOrd="1" destOrd="0" parTransId="{9A77E1AD-4045-4BA2-8A5D-E3CD1F011257}" sibTransId="{BF2C4B42-525E-479B-AC81-9827F9EBB04C}"/>
+    <dgm:cxn modelId="{BED30F9F-9944-4B2F-9921-80DA122C7A4A}" type="presOf" srcId="{D03DD5B3-8AC9-4EBA-B91D-F57C4DABA3B5}" destId="{1CE9DAFA-1335-4E29-ABA3-55C3557F1054}" srcOrd="0" destOrd="0" presId="urn:microsoft.com/office/officeart/2005/8/layout/cycle2"/>
+    <dgm:cxn modelId="{AF6C44AE-1B11-4C05-A908-CA8F5AEC5994}" type="presOf" srcId="{8656068D-C277-473B-99B0-FABDC8797BDC}" destId="{B36C6181-3F9C-4CBD-8CCE-C8211C490C0F}" srcOrd="0" destOrd="0" presId="urn:microsoft.com/office/officeart/2005/8/layout/cycle2"/>
+    <dgm:cxn modelId="{8CFFB8E4-BEEF-41E0-80F6-E1B88158F6F3}" type="presOf" srcId="{D5621349-5567-4856-8BED-DAEF3C1679DE}" destId="{BCE23A88-C56A-4E01-B123-B35E923F7CF0}" srcOrd="0" destOrd="0" presId="urn:microsoft.com/office/officeart/2005/8/layout/cycle2"/>
+    <dgm:cxn modelId="{F5A95FF8-7DDE-40BF-AAA4-D5D065BCC28D}" type="presOf" srcId="{9B55E3AB-D2C5-4244-A191-027550800238}" destId="{1E9A022D-BA35-4D37-803E-5A04385BBF46}" srcOrd="1" destOrd="0" presId="urn:microsoft.com/office/officeart/2005/8/layout/cycle2"/>
+    <dgm:cxn modelId="{8C9590BF-DD77-49C0-AEA3-DACD5A979530}" type="presOf" srcId="{9B55E3AB-D2C5-4244-A191-027550800238}" destId="{37FE0927-F5E5-4668-8DBE-D255CE13CBE4}" srcOrd="0" destOrd="0" presId="urn:microsoft.com/office/officeart/2005/8/layout/cycle2"/>
+    <dgm:cxn modelId="{A0C09B76-95DE-4EBB-8382-E448E254F61C}" type="presOf" srcId="{79F93BA4-A6A9-49D1-B152-9618EB1F1F92}" destId="{CBD245A0-E455-4CAF-B3BA-7BCCF5F0D9DF}" srcOrd="0" destOrd="0" presId="urn:microsoft.com/office/officeart/2005/8/layout/cycle2"/>
+    <dgm:cxn modelId="{93730949-70ED-4C88-8A3F-EA0ADE37B9C1}" type="presOf" srcId="{81F24EC1-2872-4B1E-8440-F37DCC5BDBA6}" destId="{8964AD52-68D2-4375-A2F0-243890E07089}" srcOrd="0" destOrd="0" presId="urn:microsoft.com/office/officeart/2005/8/layout/cycle2"/>
+    <dgm:cxn modelId="{90717D4C-DDE5-4DDA-ABCB-9CBC0660CEC5}" srcId="{190770C8-8D4C-470D-9E32-B04ADE689A12}" destId="{D03DD5B3-8AC9-4EBA-B91D-F57C4DABA3B5}" srcOrd="4" destOrd="0" parTransId="{434DD8DA-19F9-4D08-8CD3-9B0283FF9214}" sibTransId="{998EA877-5833-416B-8092-5E5F6EA1382D}"/>
+    <dgm:cxn modelId="{9534A309-A1DE-4405-AD2A-A0835E19351A}" type="presOf" srcId="{57959D22-4694-4A0F-A80C-C063633094B9}" destId="{3A5AF1D0-5380-4962-907C-6199C0B092C7}" srcOrd="0" destOrd="0" presId="urn:microsoft.com/office/officeart/2005/8/layout/cycle2"/>
+    <dgm:cxn modelId="{1746AE9C-3B1A-4B8A-9618-D6B1B90DCF8F}" type="presOf" srcId="{190770C8-8D4C-470D-9E32-B04ADE689A12}" destId="{EDD48AB6-364A-4C74-9E06-8AFE6D2719BC}" srcOrd="0" destOrd="0" presId="urn:microsoft.com/office/officeart/2005/8/layout/cycle2"/>
+    <dgm:cxn modelId="{3FAD186D-29BB-42E1-9379-8BB0D07A83E6}" type="presOf" srcId="{8656068D-C277-473B-99B0-FABDC8797BDC}" destId="{C10F0AE3-85FF-41A9-A2BF-B46681896931}" srcOrd="1" destOrd="0" presId="urn:microsoft.com/office/officeart/2005/8/layout/cycle2"/>
+    <dgm:cxn modelId="{31860579-0927-484A-ACA8-8278413AADA3}" type="presOf" srcId="{D5621349-5567-4856-8BED-DAEF3C1679DE}" destId="{A73C70E8-219B-4A47-96E4-BF723E3EE74D}" srcOrd="1" destOrd="0" presId="urn:microsoft.com/office/officeart/2005/8/layout/cycle2"/>
+    <dgm:cxn modelId="{AB8CE6BF-8DFA-4727-AA22-A0E98E07F4D6}" type="presOf" srcId="{998EA877-5833-416B-8092-5E5F6EA1382D}" destId="{BEEED8EC-05AC-4DB9-AED8-14E6F9C313DB}" srcOrd="0" destOrd="0" presId="urn:microsoft.com/office/officeart/2005/8/layout/cycle2"/>
+    <dgm:cxn modelId="{534AF049-9A60-4473-9996-C9B535802D9D}" type="presOf" srcId="{FC46C9E2-068C-4EC7-88FD-1C91F8A7130A}" destId="{1A7E8F07-5996-4315-98AD-745A327BFC6D}" srcOrd="0" destOrd="0" presId="urn:microsoft.com/office/officeart/2005/8/layout/cycle2"/>
+    <dgm:cxn modelId="{A4C137C0-4FD8-402B-A798-0C5AB998A0FF}" type="presParOf" srcId="{EDD48AB6-364A-4C74-9E06-8AFE6D2719BC}" destId="{CBD245A0-E455-4CAF-B3BA-7BCCF5F0D9DF}" srcOrd="0" destOrd="0" presId="urn:microsoft.com/office/officeart/2005/8/layout/cycle2"/>
+    <dgm:cxn modelId="{ADBE1A0A-31B6-4F98-B152-6125440C74E4}" type="presParOf" srcId="{EDD48AB6-364A-4C74-9E06-8AFE6D2719BC}" destId="{37FE0927-F5E5-4668-8DBE-D255CE13CBE4}" srcOrd="1" destOrd="0" presId="urn:microsoft.com/office/officeart/2005/8/layout/cycle2"/>
+    <dgm:cxn modelId="{2F8A6B4F-71D7-4499-BEE9-37DC149F253A}" type="presParOf" srcId="{37FE0927-F5E5-4668-8DBE-D255CE13CBE4}" destId="{1E9A022D-BA35-4D37-803E-5A04385BBF46}" srcOrd="0" destOrd="0" presId="urn:microsoft.com/office/officeart/2005/8/layout/cycle2"/>
+    <dgm:cxn modelId="{93D8F898-7A07-4022-9AD6-78CAEBFFE248}" type="presParOf" srcId="{EDD48AB6-364A-4C74-9E06-8AFE6D2719BC}" destId="{3A5AF1D0-5380-4962-907C-6199C0B092C7}" srcOrd="2" destOrd="0" presId="urn:microsoft.com/office/officeart/2005/8/layout/cycle2"/>
+    <dgm:cxn modelId="{6A6C294B-CA81-415A-B20F-D23569607AEE}" type="presParOf" srcId="{EDD48AB6-364A-4C74-9E06-8AFE6D2719BC}" destId="{86F8274C-CF59-4850-AFAB-F529049B9AAC}" srcOrd="3" destOrd="0" presId="urn:microsoft.com/office/officeart/2005/8/layout/cycle2"/>
+    <dgm:cxn modelId="{5F1981C0-892F-485E-ABE0-780254EC38F6}" type="presParOf" srcId="{86F8274C-CF59-4850-AFAB-F529049B9AAC}" destId="{91032604-1D39-4D7A-BE23-6380444B0E01}" srcOrd="0" destOrd="0" presId="urn:microsoft.com/office/officeart/2005/8/layout/cycle2"/>
+    <dgm:cxn modelId="{BA2C9CE7-B79F-4259-8236-BDC4F394B54B}" type="presParOf" srcId="{EDD48AB6-364A-4C74-9E06-8AFE6D2719BC}" destId="{8964AD52-68D2-4375-A2F0-243890E07089}" srcOrd="4" destOrd="0" presId="urn:microsoft.com/office/officeart/2005/8/layout/cycle2"/>
+    <dgm:cxn modelId="{D0A2659C-4C4F-4D67-A742-9ADA97DBCC9A}" type="presParOf" srcId="{EDD48AB6-364A-4C74-9E06-8AFE6D2719BC}" destId="{B36C6181-3F9C-4CBD-8CCE-C8211C490C0F}" srcOrd="5" destOrd="0" presId="urn:microsoft.com/office/officeart/2005/8/layout/cycle2"/>
+    <dgm:cxn modelId="{16B233D7-7155-4CE8-ABAF-C6FA2E153F9A}" type="presParOf" srcId="{B36C6181-3F9C-4CBD-8CCE-C8211C490C0F}" destId="{C10F0AE3-85FF-41A9-A2BF-B46681896931}" srcOrd="0" destOrd="0" presId="urn:microsoft.com/office/officeart/2005/8/layout/cycle2"/>
+    <dgm:cxn modelId="{D268E767-2978-47B4-AE66-FC37C7B3A99B}" type="presParOf" srcId="{EDD48AB6-364A-4C74-9E06-8AFE6D2719BC}" destId="{1A7E8F07-5996-4315-98AD-745A327BFC6D}" srcOrd="6" destOrd="0" presId="urn:microsoft.com/office/officeart/2005/8/layout/cycle2"/>
+    <dgm:cxn modelId="{248A7486-FFF2-477E-B251-15A59D63EBB1}" type="presParOf" srcId="{EDD48AB6-364A-4C74-9E06-8AFE6D2719BC}" destId="{BCE23A88-C56A-4E01-B123-B35E923F7CF0}" srcOrd="7" destOrd="0" presId="urn:microsoft.com/office/officeart/2005/8/layout/cycle2"/>
+    <dgm:cxn modelId="{6F318597-E978-4891-8F1D-6D82D1175512}" type="presParOf" srcId="{BCE23A88-C56A-4E01-B123-B35E923F7CF0}" destId="{A73C70E8-219B-4A47-96E4-BF723E3EE74D}" srcOrd="0" destOrd="0" presId="urn:microsoft.com/office/officeart/2005/8/layout/cycle2"/>
+    <dgm:cxn modelId="{DD4E601E-0CF8-49F4-A535-0F3DD8ABF54B}" type="presParOf" srcId="{EDD48AB6-364A-4C74-9E06-8AFE6D2719BC}" destId="{1CE9DAFA-1335-4E29-ABA3-55C3557F1054}" srcOrd="8" destOrd="0" presId="urn:microsoft.com/office/officeart/2005/8/layout/cycle2"/>
+    <dgm:cxn modelId="{583ADA08-B532-4FF8-8015-0429E62A6683}" type="presParOf" srcId="{EDD48AB6-364A-4C74-9E06-8AFE6D2719BC}" destId="{BEEED8EC-05AC-4DB9-AED8-14E6F9C313DB}" srcOrd="9" destOrd="0" presId="urn:microsoft.com/office/officeart/2005/8/layout/cycle2"/>
+    <dgm:cxn modelId="{6A2E26F0-DEF0-49D1-9BDA-E157BBD81FE7}" type="presParOf" srcId="{BEEED8EC-05AC-4DB9-AED8-14E6F9C313DB}" destId="{253E196B-7891-47A6-BB92-085ACE7563D8}" srcOrd="0" destOrd="0" presId="urn:microsoft.com/office/officeart/2005/8/layout/cycle2"/>
+  </dgm:cxnLst>
+  <dgm:bg/>
+  <dgm:whole/>
+  <dgm:extLst>
+    <a:ext uri="http://schemas.microsoft.com/office/drawing/2008/diagram">
+      <dsp:dataModelExt xmlns:dsp="http://schemas.microsoft.com/office/drawing/2008/diagram" relId="rId7" minVer="http://schemas.openxmlformats.org/drawingml/2006/diagram"/>
+    </a:ext>
+  </dgm:extLst>
+</dgm:dataModel>
+</file>
+
+<file path=ppt/diagrams/drawing1.xml><?xml version="1.0" encoding="utf-8"?>
+<dsp:drawing xmlns:dgm="http://schemas.openxmlformats.org/drawingml/2006/diagram" xmlns:dsp="http://schemas.microsoft.com/office/drawing/2008/diagram" xmlns:a="http://schemas.openxmlformats.org/drawingml/2006/main">
+  <dsp:spTree>
+    <dsp:nvGrpSpPr>
+      <dsp:cNvPr id="0" name=""/>
+      <dsp:cNvGrpSpPr/>
+    </dsp:nvGrpSpPr>
+    <dsp:grpSpPr/>
+    <dsp:sp modelId="{CBD245A0-E455-4CAF-B3BA-7BCCF5F0D9DF}">
+      <dsp:nvSpPr>
+        <dsp:cNvPr id="0" name=""/>
+        <dsp:cNvSpPr/>
+      </dsp:nvSpPr>
+      <dsp:spPr>
+        <a:xfrm>
+          <a:off x="2971803" y="8"/>
+          <a:ext cx="1449399" cy="1449399"/>
+        </a:xfrm>
+        <a:prstGeom prst="ellipse">
+          <a:avLst/>
+        </a:prstGeom>
+        <a:gradFill rotWithShape="0">
+          <a:gsLst>
+            <a:gs pos="0">
+              <a:schemeClr val="accent1">
+                <a:hueOff val="0"/>
+                <a:satOff val="0"/>
+                <a:lumOff val="0"/>
+                <a:alphaOff val="0"/>
+                <a:shade val="51000"/>
+                <a:satMod val="130000"/>
+              </a:schemeClr>
+            </a:gs>
+            <a:gs pos="80000">
+              <a:schemeClr val="accent1">
+                <a:hueOff val="0"/>
+                <a:satOff val="0"/>
+                <a:lumOff val="0"/>
+                <a:alphaOff val="0"/>
+                <a:shade val="93000"/>
+                <a:satMod val="130000"/>
+              </a:schemeClr>
+            </a:gs>
+            <a:gs pos="100000">
+              <a:schemeClr val="accent1">
+                <a:hueOff val="0"/>
+                <a:satOff val="0"/>
+                <a:lumOff val="0"/>
+                <a:alphaOff val="0"/>
+                <a:shade val="94000"/>
+                <a:satMod val="135000"/>
+              </a:schemeClr>
+            </a:gs>
+          </a:gsLst>
+          <a:lin ang="16200000" scaled="0"/>
+        </a:gradFill>
+        <a:ln>
+          <a:noFill/>
+        </a:ln>
+        <a:effectLst>
+          <a:outerShdw blurRad="40000" dist="23000" dir="5400000" rotWithShape="0">
+            <a:srgbClr val="000000">
+              <a:alpha val="35000"/>
+            </a:srgbClr>
+          </a:outerShdw>
+        </a:effectLst>
+      </dsp:spPr>
+      <dsp:style>
+        <a:lnRef idx="0">
+          <a:scrgbClr r="0" g="0" b="0"/>
+        </a:lnRef>
+        <a:fillRef idx="3">
+          <a:scrgbClr r="0" g="0" b="0"/>
+        </a:fillRef>
+        <a:effectRef idx="2">
+          <a:scrgbClr r="0" g="0" b="0"/>
+        </a:effectRef>
+        <a:fontRef idx="minor">
+          <a:schemeClr val="lt1"/>
+        </a:fontRef>
+      </dsp:style>
+      <dsp:txBody>
+        <a:bodyPr spcFirstLastPara="0" vert="horz" wrap="square" lIns="24130" tIns="24130" rIns="24130" bIns="24130" numCol="1" spcCol="1270" anchor="ctr" anchorCtr="0">
+          <a:noAutofit/>
+        </a:bodyPr>
+        <a:lstStyle/>
+        <a:p>
+          <a:pPr lvl="0" algn="ctr" defTabSz="844550">
+            <a:lnSpc>
+              <a:spcPct val="90000"/>
+            </a:lnSpc>
+            <a:spcBef>
+              <a:spcPct val="0"/>
+            </a:spcBef>
+            <a:spcAft>
+              <a:spcPct val="35000"/>
+            </a:spcAft>
+          </a:pPr>
+          <a:r>
+            <a:rPr lang="en-US" sz="1900" kern="1200" dirty="0" smtClean="0"/>
+            <a:t>Write Tests</a:t>
+          </a:r>
+          <a:endParaRPr lang="en-US" sz="1900" kern="1200" dirty="0"/>
+        </a:p>
+      </dsp:txBody>
+      <dsp:txXfrm>
+        <a:off x="3184063" y="212268"/>
+        <a:ext cx="1024879" cy="1024879"/>
+      </dsp:txXfrm>
+    </dsp:sp>
+    <dsp:sp modelId="{37FE0927-F5E5-4668-8DBE-D255CE13CBE4}">
+      <dsp:nvSpPr>
+        <dsp:cNvPr id="0" name=""/>
+        <dsp:cNvSpPr/>
+      </dsp:nvSpPr>
+      <dsp:spPr>
+        <a:xfrm rot="2126971">
+          <a:off x="4385472" y="1113651"/>
+          <a:ext cx="401727" cy="489172"/>
+        </a:xfrm>
+        <a:prstGeom prst="rightArrow">
+          <a:avLst>
+            <a:gd name="adj1" fmla="val 60000"/>
+            <a:gd name="adj2" fmla="val 50000"/>
+          </a:avLst>
+        </a:prstGeom>
+        <a:gradFill rotWithShape="0">
+          <a:gsLst>
+            <a:gs pos="0">
+              <a:schemeClr val="accent1">
+                <a:tint val="60000"/>
+                <a:hueOff val="0"/>
+                <a:satOff val="0"/>
+                <a:lumOff val="0"/>
+                <a:alphaOff val="0"/>
+                <a:shade val="51000"/>
+                <a:satMod val="130000"/>
+              </a:schemeClr>
+            </a:gs>
+            <a:gs pos="80000">
+              <a:schemeClr val="accent1">
+                <a:tint val="60000"/>
+                <a:hueOff val="0"/>
+                <a:satOff val="0"/>
+                <a:lumOff val="0"/>
+                <a:alphaOff val="0"/>
+                <a:shade val="93000"/>
+                <a:satMod val="130000"/>
+              </a:schemeClr>
+            </a:gs>
+            <a:gs pos="100000">
+              <a:schemeClr val="accent1">
+                <a:tint val="60000"/>
+                <a:hueOff val="0"/>
+                <a:satOff val="0"/>
+                <a:lumOff val="0"/>
+                <a:alphaOff val="0"/>
+                <a:shade val="94000"/>
+                <a:satMod val="135000"/>
+              </a:schemeClr>
+            </a:gs>
+          </a:gsLst>
+          <a:lin ang="16200000" scaled="0"/>
+        </a:gradFill>
+        <a:ln>
+          <a:noFill/>
+        </a:ln>
+        <a:effectLst>
+          <a:outerShdw blurRad="40000" dist="23000" dir="5400000" rotWithShape="0">
+            <a:srgbClr val="000000">
+              <a:alpha val="35000"/>
+            </a:srgbClr>
+          </a:outerShdw>
+        </a:effectLst>
+      </dsp:spPr>
+      <dsp:style>
+        <a:lnRef idx="0">
+          <a:scrgbClr r="0" g="0" b="0"/>
+        </a:lnRef>
+        <a:fillRef idx="3">
+          <a:scrgbClr r="0" g="0" b="0"/>
+        </a:fillRef>
+        <a:effectRef idx="2">
+          <a:scrgbClr r="0" g="0" b="0"/>
+        </a:effectRef>
+        <a:fontRef idx="minor">
+          <a:schemeClr val="lt1"/>
+        </a:fontRef>
+      </dsp:style>
+      <dsp:txBody>
+        <a:bodyPr spcFirstLastPara="0" vert="horz" wrap="square" lIns="0" tIns="0" rIns="0" bIns="0" numCol="1" spcCol="1270" anchor="ctr" anchorCtr="0">
+          <a:noAutofit/>
+        </a:bodyPr>
+        <a:lstStyle/>
+        <a:p>
+          <a:pPr lvl="0" algn="ctr" defTabSz="666750">
+            <a:lnSpc>
+              <a:spcPct val="90000"/>
+            </a:lnSpc>
+            <a:spcBef>
+              <a:spcPct val="0"/>
+            </a:spcBef>
+            <a:spcAft>
+              <a:spcPct val="35000"/>
+            </a:spcAft>
+          </a:pPr>
+          <a:endParaRPr lang="en-US" sz="1500" kern="1200"/>
+        </a:p>
+      </dsp:txBody>
+      <dsp:txXfrm>
+        <a:off x="4396642" y="1176536"/>
+        <a:ext cx="281209" cy="293504"/>
+      </dsp:txXfrm>
+    </dsp:sp>
+    <dsp:sp modelId="{3A5AF1D0-5380-4962-907C-6199C0B092C7}">
+      <dsp:nvSpPr>
+        <dsp:cNvPr id="0" name=""/>
+        <dsp:cNvSpPr/>
+      </dsp:nvSpPr>
+      <dsp:spPr>
+        <a:xfrm>
+          <a:off x="4769992" y="1280255"/>
+          <a:ext cx="1449399" cy="1449399"/>
+        </a:xfrm>
+        <a:prstGeom prst="ellipse">
+          <a:avLst/>
+        </a:prstGeom>
+        <a:gradFill rotWithShape="0">
+          <a:gsLst>
+            <a:gs pos="0">
+              <a:schemeClr val="accent1">
+                <a:hueOff val="0"/>
+                <a:satOff val="0"/>
+                <a:lumOff val="0"/>
+                <a:alphaOff val="0"/>
+                <a:shade val="51000"/>
+                <a:satMod val="130000"/>
+              </a:schemeClr>
+            </a:gs>
+            <a:gs pos="80000">
+              <a:schemeClr val="accent1">
+                <a:hueOff val="0"/>
+                <a:satOff val="0"/>
+                <a:lumOff val="0"/>
+                <a:alphaOff val="0"/>
+                <a:shade val="93000"/>
+                <a:satMod val="130000"/>
+              </a:schemeClr>
+            </a:gs>
+            <a:gs pos="100000">
+              <a:schemeClr val="accent1">
+                <a:hueOff val="0"/>
+                <a:satOff val="0"/>
+                <a:lumOff val="0"/>
+                <a:alphaOff val="0"/>
+                <a:shade val="94000"/>
+                <a:satMod val="135000"/>
+              </a:schemeClr>
+            </a:gs>
+          </a:gsLst>
+          <a:lin ang="16200000" scaled="0"/>
+        </a:gradFill>
+        <a:ln>
+          <a:noFill/>
+        </a:ln>
+        <a:effectLst>
+          <a:outerShdw blurRad="40000" dist="23000" dir="5400000" rotWithShape="0">
+            <a:srgbClr val="000000">
+              <a:alpha val="35000"/>
+            </a:srgbClr>
+          </a:outerShdw>
+        </a:effectLst>
+      </dsp:spPr>
+      <dsp:style>
+        <a:lnRef idx="0">
+          <a:scrgbClr r="0" g="0" b="0"/>
+        </a:lnRef>
+        <a:fillRef idx="3">
+          <a:scrgbClr r="0" g="0" b="0"/>
+        </a:fillRef>
+        <a:effectRef idx="2">
+          <a:scrgbClr r="0" g="0" b="0"/>
+        </a:effectRef>
+        <a:fontRef idx="minor">
+          <a:schemeClr val="lt1"/>
+        </a:fontRef>
+      </dsp:style>
+      <dsp:txBody>
+        <a:bodyPr spcFirstLastPara="0" vert="horz" wrap="square" lIns="24130" tIns="24130" rIns="24130" bIns="24130" numCol="1" spcCol="1270" anchor="ctr" anchorCtr="0">
+          <a:noAutofit/>
+        </a:bodyPr>
+        <a:lstStyle/>
+        <a:p>
+          <a:pPr lvl="0" algn="ctr" defTabSz="844550">
+            <a:lnSpc>
+              <a:spcPct val="90000"/>
+            </a:lnSpc>
+            <a:spcBef>
+              <a:spcPct val="0"/>
+            </a:spcBef>
+            <a:spcAft>
+              <a:spcPct val="35000"/>
+            </a:spcAft>
+          </a:pPr>
+          <a:r>
+            <a:rPr lang="en-US" sz="1900" kern="1200" dirty="0" smtClean="0"/>
+            <a:t>Add Function</a:t>
+          </a:r>
+          <a:endParaRPr lang="en-US" sz="1900" kern="1200" dirty="0"/>
+        </a:p>
+      </dsp:txBody>
+      <dsp:txXfrm>
+        <a:off x="4982252" y="1492515"/>
+        <a:ext cx="1024879" cy="1024879"/>
+      </dsp:txXfrm>
+    </dsp:sp>
+    <dsp:sp modelId="{86F8274C-CF59-4850-AFAB-F529049B9AAC}">
+      <dsp:nvSpPr>
+        <dsp:cNvPr id="0" name=""/>
+        <dsp:cNvSpPr/>
+      </dsp:nvSpPr>
+      <dsp:spPr>
+        <a:xfrm rot="6480000">
+          <a:off x="4969058" y="2785021"/>
+          <a:ext cx="385406" cy="489172"/>
+        </a:xfrm>
+        <a:prstGeom prst="rightArrow">
+          <a:avLst>
+            <a:gd name="adj1" fmla="val 60000"/>
+            <a:gd name="adj2" fmla="val 50000"/>
+          </a:avLst>
+        </a:prstGeom>
+        <a:gradFill rotWithShape="0">
+          <a:gsLst>
+            <a:gs pos="0">
+              <a:schemeClr val="accent1">
+                <a:tint val="60000"/>
+                <a:hueOff val="0"/>
+                <a:satOff val="0"/>
+                <a:lumOff val="0"/>
+                <a:alphaOff val="0"/>
+                <a:shade val="51000"/>
+                <a:satMod val="130000"/>
+              </a:schemeClr>
+            </a:gs>
+            <a:gs pos="80000">
+              <a:schemeClr val="accent1">
+                <a:tint val="60000"/>
+                <a:hueOff val="0"/>
+                <a:satOff val="0"/>
+                <a:lumOff val="0"/>
+                <a:alphaOff val="0"/>
+                <a:shade val="93000"/>
+                <a:satMod val="130000"/>
+              </a:schemeClr>
+            </a:gs>
+            <a:gs pos="100000">
+              <a:schemeClr val="accent1">
+                <a:tint val="60000"/>
+                <a:hueOff val="0"/>
+                <a:satOff val="0"/>
+                <a:lumOff val="0"/>
+                <a:alphaOff val="0"/>
+                <a:shade val="94000"/>
+                <a:satMod val="135000"/>
+              </a:schemeClr>
+            </a:gs>
+          </a:gsLst>
+          <a:lin ang="16200000" scaled="0"/>
+        </a:gradFill>
+        <a:ln>
+          <a:noFill/>
+        </a:ln>
+        <a:effectLst>
+          <a:outerShdw blurRad="40000" dist="23000" dir="5400000" rotWithShape="0">
+            <a:srgbClr val="000000">
+              <a:alpha val="35000"/>
+            </a:srgbClr>
+          </a:outerShdw>
+        </a:effectLst>
+      </dsp:spPr>
+      <dsp:style>
+        <a:lnRef idx="0">
+          <a:scrgbClr r="0" g="0" b="0"/>
+        </a:lnRef>
+        <a:fillRef idx="3">
+          <a:scrgbClr r="0" g="0" b="0"/>
+        </a:fillRef>
+        <a:effectRef idx="2">
+          <a:scrgbClr r="0" g="0" b="0"/>
+        </a:effectRef>
+        <a:fontRef idx="minor">
+          <a:schemeClr val="lt1"/>
+        </a:fontRef>
+      </dsp:style>
+      <dsp:txBody>
+        <a:bodyPr spcFirstLastPara="0" vert="horz" wrap="square" lIns="0" tIns="0" rIns="0" bIns="0" numCol="1" spcCol="1270" anchor="ctr" anchorCtr="0">
+          <a:noAutofit/>
+        </a:bodyPr>
+        <a:lstStyle/>
+        <a:p>
+          <a:pPr lvl="0" algn="ctr" defTabSz="666750">
+            <a:lnSpc>
+              <a:spcPct val="90000"/>
+            </a:lnSpc>
+            <a:spcBef>
+              <a:spcPct val="0"/>
+            </a:spcBef>
+            <a:spcAft>
+              <a:spcPct val="35000"/>
+            </a:spcAft>
+          </a:pPr>
+          <a:endParaRPr lang="en-US" sz="1500" kern="1200"/>
+        </a:p>
+      </dsp:txBody>
+      <dsp:txXfrm rot="10800000">
+        <a:off x="5044734" y="2827873"/>
+        <a:ext cx="269784" cy="293504"/>
+      </dsp:txXfrm>
+    </dsp:sp>
+    <dsp:sp modelId="{8964AD52-68D2-4375-A2F0-243890E07089}">
+      <dsp:nvSpPr>
+        <dsp:cNvPr id="0" name=""/>
+        <dsp:cNvSpPr/>
+      </dsp:nvSpPr>
+      <dsp:spPr>
+        <a:xfrm>
+          <a:off x="4097391" y="3350308"/>
+          <a:ext cx="1449399" cy="1449399"/>
+        </a:xfrm>
+        <a:prstGeom prst="ellipse">
+          <a:avLst/>
+        </a:prstGeom>
+        <a:gradFill rotWithShape="0">
+          <a:gsLst>
+            <a:gs pos="0">
+              <a:schemeClr val="accent1">
+                <a:hueOff val="0"/>
+                <a:satOff val="0"/>
+                <a:lumOff val="0"/>
+                <a:alphaOff val="0"/>
+                <a:shade val="51000"/>
+                <a:satMod val="130000"/>
+              </a:schemeClr>
+            </a:gs>
+            <a:gs pos="80000">
+              <a:schemeClr val="accent1">
+                <a:hueOff val="0"/>
+                <a:satOff val="0"/>
+                <a:lumOff val="0"/>
+                <a:alphaOff val="0"/>
+                <a:shade val="93000"/>
+                <a:satMod val="130000"/>
+              </a:schemeClr>
+            </a:gs>
+            <a:gs pos="100000">
+              <a:schemeClr val="accent1">
+                <a:hueOff val="0"/>
+                <a:satOff val="0"/>
+                <a:lumOff val="0"/>
+                <a:alphaOff val="0"/>
+                <a:shade val="94000"/>
+                <a:satMod val="135000"/>
+              </a:schemeClr>
+            </a:gs>
+          </a:gsLst>
+          <a:lin ang="16200000" scaled="0"/>
+        </a:gradFill>
+        <a:ln>
+          <a:noFill/>
+        </a:ln>
+        <a:effectLst>
+          <a:outerShdw blurRad="40000" dist="23000" dir="5400000" rotWithShape="0">
+            <a:srgbClr val="000000">
+              <a:alpha val="35000"/>
+            </a:srgbClr>
+          </a:outerShdw>
+        </a:effectLst>
+      </dsp:spPr>
+      <dsp:style>
+        <a:lnRef idx="0">
+          <a:scrgbClr r="0" g="0" b="0"/>
+        </a:lnRef>
+        <a:fillRef idx="3">
+          <a:scrgbClr r="0" g="0" b="0"/>
+        </a:fillRef>
+        <a:effectRef idx="2">
+          <a:scrgbClr r="0" g="0" b="0"/>
+        </a:effectRef>
+        <a:fontRef idx="minor">
+          <a:schemeClr val="lt1"/>
+        </a:fontRef>
+      </dsp:style>
+      <dsp:txBody>
+        <a:bodyPr spcFirstLastPara="0" vert="horz" wrap="square" lIns="24130" tIns="24130" rIns="24130" bIns="24130" numCol="1" spcCol="1270" anchor="ctr" anchorCtr="0">
+          <a:noAutofit/>
+        </a:bodyPr>
+        <a:lstStyle/>
+        <a:p>
+          <a:pPr lvl="0" algn="ctr" defTabSz="844550">
+            <a:lnSpc>
+              <a:spcPct val="90000"/>
+            </a:lnSpc>
+            <a:spcBef>
+              <a:spcPct val="0"/>
+            </a:spcBef>
+            <a:spcAft>
+              <a:spcPct val="35000"/>
+            </a:spcAft>
+          </a:pPr>
+          <a:r>
+            <a:rPr lang="en-US" sz="1900" kern="1200" dirty="0" smtClean="0"/>
+            <a:t>Revise Past Tests</a:t>
+          </a:r>
+          <a:endParaRPr lang="en-US" sz="1900" kern="1200" dirty="0"/>
+        </a:p>
+      </dsp:txBody>
+      <dsp:txXfrm>
+        <a:off x="4309651" y="3562568"/>
+        <a:ext cx="1024879" cy="1024879"/>
+      </dsp:txXfrm>
+    </dsp:sp>
+    <dsp:sp modelId="{B36C6181-3F9C-4CBD-8CCE-C8211C490C0F}">
+      <dsp:nvSpPr>
+        <dsp:cNvPr id="0" name=""/>
+        <dsp:cNvSpPr/>
+      </dsp:nvSpPr>
+      <dsp:spPr>
+        <a:xfrm rot="10800000">
+          <a:off x="3552004" y="3830421"/>
+          <a:ext cx="385406" cy="489172"/>
+        </a:xfrm>
+        <a:prstGeom prst="rightArrow">
+          <a:avLst>
+            <a:gd name="adj1" fmla="val 60000"/>
+            <a:gd name="adj2" fmla="val 50000"/>
+          </a:avLst>
+        </a:prstGeom>
+        <a:gradFill rotWithShape="0">
+          <a:gsLst>
+            <a:gs pos="0">
+              <a:schemeClr val="accent1">
+                <a:tint val="60000"/>
+                <a:hueOff val="0"/>
+                <a:satOff val="0"/>
+                <a:lumOff val="0"/>
+                <a:alphaOff val="0"/>
+                <a:shade val="51000"/>
+                <a:satMod val="130000"/>
+              </a:schemeClr>
+            </a:gs>
+            <a:gs pos="80000">
+              <a:schemeClr val="accent1">
+                <a:tint val="60000"/>
+                <a:hueOff val="0"/>
+                <a:satOff val="0"/>
+                <a:lumOff val="0"/>
+                <a:alphaOff val="0"/>
+                <a:shade val="93000"/>
+                <a:satMod val="130000"/>
+              </a:schemeClr>
+            </a:gs>
+            <a:gs pos="100000">
+              <a:schemeClr val="accent1">
+                <a:tint val="60000"/>
+                <a:hueOff val="0"/>
+                <a:satOff val="0"/>
+                <a:lumOff val="0"/>
+                <a:alphaOff val="0"/>
+                <a:shade val="94000"/>
+                <a:satMod val="135000"/>
+              </a:schemeClr>
+            </a:gs>
+          </a:gsLst>
+          <a:lin ang="16200000" scaled="0"/>
+        </a:gradFill>
+        <a:ln>
+          <a:noFill/>
+        </a:ln>
+        <a:effectLst>
+          <a:outerShdw blurRad="40000" dist="23000" dir="5400000" rotWithShape="0">
+            <a:srgbClr val="000000">
+              <a:alpha val="35000"/>
+            </a:srgbClr>
+          </a:outerShdw>
+        </a:effectLst>
+      </dsp:spPr>
+      <dsp:style>
+        <a:lnRef idx="0">
+          <a:scrgbClr r="0" g="0" b="0"/>
+        </a:lnRef>
+        <a:fillRef idx="3">
+          <a:scrgbClr r="0" g="0" b="0"/>
+        </a:fillRef>
+        <a:effectRef idx="2">
+          <a:scrgbClr r="0" g="0" b="0"/>
+        </a:effectRef>
+        <a:fontRef idx="minor">
+          <a:schemeClr val="lt1"/>
+        </a:fontRef>
+      </dsp:style>
+      <dsp:txBody>
+        <a:bodyPr spcFirstLastPara="0" vert="horz" wrap="square" lIns="0" tIns="0" rIns="0" bIns="0" numCol="1" spcCol="1270" anchor="ctr" anchorCtr="0">
+          <a:noAutofit/>
+        </a:bodyPr>
+        <a:lstStyle/>
+        <a:p>
+          <a:pPr lvl="0" algn="ctr" defTabSz="666750">
+            <a:lnSpc>
+              <a:spcPct val="90000"/>
+            </a:lnSpc>
+            <a:spcBef>
+              <a:spcPct val="0"/>
+            </a:spcBef>
+            <a:spcAft>
+              <a:spcPct val="35000"/>
+            </a:spcAft>
+          </a:pPr>
+          <a:endParaRPr lang="en-US" sz="1500" kern="1200"/>
+        </a:p>
+      </dsp:txBody>
+      <dsp:txXfrm rot="10800000">
+        <a:off x="3667626" y="3928255"/>
+        <a:ext cx="269784" cy="293504"/>
+      </dsp:txXfrm>
+    </dsp:sp>
+    <dsp:sp modelId="{1A7E8F07-5996-4315-98AD-745A327BFC6D}">
+      <dsp:nvSpPr>
+        <dsp:cNvPr id="0" name=""/>
+        <dsp:cNvSpPr/>
+      </dsp:nvSpPr>
+      <dsp:spPr>
+        <a:xfrm>
+          <a:off x="1920808" y="3350308"/>
+          <a:ext cx="1449399" cy="1449399"/>
+        </a:xfrm>
+        <a:prstGeom prst="ellipse">
+          <a:avLst/>
+        </a:prstGeom>
+        <a:gradFill rotWithShape="0">
+          <a:gsLst>
+            <a:gs pos="0">
+              <a:schemeClr val="accent1">
+                <a:hueOff val="0"/>
+                <a:satOff val="0"/>
+                <a:lumOff val="0"/>
+                <a:alphaOff val="0"/>
+                <a:shade val="51000"/>
+                <a:satMod val="130000"/>
+              </a:schemeClr>
+            </a:gs>
+            <a:gs pos="80000">
+              <a:schemeClr val="accent1">
+                <a:hueOff val="0"/>
+                <a:satOff val="0"/>
+                <a:lumOff val="0"/>
+                <a:alphaOff val="0"/>
+                <a:shade val="93000"/>
+                <a:satMod val="130000"/>
+              </a:schemeClr>
+            </a:gs>
+            <a:gs pos="100000">
+              <a:schemeClr val="accent1">
+                <a:hueOff val="0"/>
+                <a:satOff val="0"/>
+                <a:lumOff val="0"/>
+                <a:alphaOff val="0"/>
+                <a:shade val="94000"/>
+                <a:satMod val="135000"/>
+              </a:schemeClr>
+            </a:gs>
+          </a:gsLst>
+          <a:lin ang="16200000" scaled="0"/>
+        </a:gradFill>
+        <a:ln>
+          <a:noFill/>
+        </a:ln>
+        <a:effectLst>
+          <a:outerShdw blurRad="40000" dist="23000" dir="5400000" rotWithShape="0">
+            <a:srgbClr val="000000">
+              <a:alpha val="35000"/>
+            </a:srgbClr>
+          </a:outerShdw>
+        </a:effectLst>
+      </dsp:spPr>
+      <dsp:style>
+        <a:lnRef idx="0">
+          <a:scrgbClr r="0" g="0" b="0"/>
+        </a:lnRef>
+        <a:fillRef idx="3">
+          <a:scrgbClr r="0" g="0" b="0"/>
+        </a:fillRef>
+        <a:effectRef idx="2">
+          <a:scrgbClr r="0" g="0" b="0"/>
+        </a:effectRef>
+        <a:fontRef idx="minor">
+          <a:schemeClr val="lt1"/>
+        </a:fontRef>
+      </dsp:style>
+      <dsp:txBody>
+        <a:bodyPr spcFirstLastPara="0" vert="horz" wrap="square" lIns="24130" tIns="24130" rIns="24130" bIns="24130" numCol="1" spcCol="1270" anchor="ctr" anchorCtr="0">
+          <a:noAutofit/>
+        </a:bodyPr>
+        <a:lstStyle/>
+        <a:p>
+          <a:pPr lvl="0" algn="ctr" defTabSz="844550">
+            <a:lnSpc>
+              <a:spcPct val="90000"/>
+            </a:lnSpc>
+            <a:spcBef>
+              <a:spcPct val="0"/>
+            </a:spcBef>
+            <a:spcAft>
+              <a:spcPct val="35000"/>
+            </a:spcAft>
+          </a:pPr>
+          <a:r>
+            <a:rPr lang="en-US" sz="1900" kern="1200" dirty="0" smtClean="0"/>
+            <a:t>Run Tests</a:t>
+          </a:r>
+          <a:endParaRPr lang="en-US" sz="1900" kern="1200" dirty="0"/>
+        </a:p>
+      </dsp:txBody>
+      <dsp:txXfrm>
+        <a:off x="2133068" y="3562568"/>
+        <a:ext cx="1024879" cy="1024879"/>
+      </dsp:txXfrm>
+    </dsp:sp>
+    <dsp:sp modelId="{BCE23A88-C56A-4E01-B123-B35E923F7CF0}">
+      <dsp:nvSpPr>
+        <dsp:cNvPr id="0" name=""/>
+        <dsp:cNvSpPr/>
+      </dsp:nvSpPr>
+      <dsp:spPr>
+        <a:xfrm rot="15120000">
+          <a:off x="2119875" y="2805769"/>
+          <a:ext cx="385406" cy="489172"/>
+        </a:xfrm>
+        <a:prstGeom prst="rightArrow">
+          <a:avLst>
+            <a:gd name="adj1" fmla="val 60000"/>
+            <a:gd name="adj2" fmla="val 50000"/>
+          </a:avLst>
+        </a:prstGeom>
+        <a:gradFill rotWithShape="0">
+          <a:gsLst>
+            <a:gs pos="0">
+              <a:schemeClr val="accent1">
+                <a:tint val="60000"/>
+                <a:hueOff val="0"/>
+                <a:satOff val="0"/>
+                <a:lumOff val="0"/>
+                <a:alphaOff val="0"/>
+                <a:shade val="51000"/>
+                <a:satMod val="130000"/>
+              </a:schemeClr>
+            </a:gs>
+            <a:gs pos="80000">
+              <a:schemeClr val="accent1">
+                <a:tint val="60000"/>
+                <a:hueOff val="0"/>
+                <a:satOff val="0"/>
+                <a:lumOff val="0"/>
+                <a:alphaOff val="0"/>
+                <a:shade val="93000"/>
+                <a:satMod val="130000"/>
+              </a:schemeClr>
+            </a:gs>
+            <a:gs pos="100000">
+              <a:schemeClr val="accent1">
+                <a:tint val="60000"/>
+                <a:hueOff val="0"/>
+                <a:satOff val="0"/>
+                <a:lumOff val="0"/>
+                <a:alphaOff val="0"/>
+                <a:shade val="94000"/>
+                <a:satMod val="135000"/>
+              </a:schemeClr>
+            </a:gs>
+          </a:gsLst>
+          <a:lin ang="16200000" scaled="0"/>
+        </a:gradFill>
+        <a:ln>
+          <a:noFill/>
+        </a:ln>
+        <a:effectLst>
+          <a:outerShdw blurRad="40000" dist="23000" dir="5400000" rotWithShape="0">
+            <a:srgbClr val="000000">
+              <a:alpha val="35000"/>
+            </a:srgbClr>
+          </a:outerShdw>
+        </a:effectLst>
+      </dsp:spPr>
+      <dsp:style>
+        <a:lnRef idx="0">
+          <a:scrgbClr r="0" g="0" b="0"/>
+        </a:lnRef>
+        <a:fillRef idx="3">
+          <a:scrgbClr r="0" g="0" b="0"/>
+        </a:fillRef>
+        <a:effectRef idx="2">
+          <a:scrgbClr r="0" g="0" b="0"/>
+        </a:effectRef>
+        <a:fontRef idx="minor">
+          <a:schemeClr val="lt1"/>
+        </a:fontRef>
+      </dsp:style>
+      <dsp:txBody>
+        <a:bodyPr spcFirstLastPara="0" vert="horz" wrap="square" lIns="0" tIns="0" rIns="0" bIns="0" numCol="1" spcCol="1270" anchor="ctr" anchorCtr="0">
+          <a:noAutofit/>
+        </a:bodyPr>
+        <a:lstStyle/>
+        <a:p>
+          <a:pPr lvl="0" algn="ctr" defTabSz="666750">
+            <a:lnSpc>
+              <a:spcPct val="90000"/>
+            </a:lnSpc>
+            <a:spcBef>
+              <a:spcPct val="0"/>
+            </a:spcBef>
+            <a:spcAft>
+              <a:spcPct val="35000"/>
+            </a:spcAft>
+          </a:pPr>
+          <a:endParaRPr lang="en-US" sz="1500" kern="1200"/>
+        </a:p>
+      </dsp:txBody>
+      <dsp:txXfrm rot="10800000">
+        <a:off x="2195551" y="2958585"/>
+        <a:ext cx="269784" cy="293504"/>
+      </dsp:txXfrm>
+    </dsp:sp>
+    <dsp:sp modelId="{1CE9DAFA-1335-4E29-ABA3-55C3557F1054}">
+      <dsp:nvSpPr>
+        <dsp:cNvPr id="0" name=""/>
+        <dsp:cNvSpPr/>
+      </dsp:nvSpPr>
+      <dsp:spPr>
+        <a:xfrm>
+          <a:off x="1248207" y="1280255"/>
+          <a:ext cx="1449399" cy="1449399"/>
+        </a:xfrm>
+        <a:prstGeom prst="ellipse">
+          <a:avLst/>
+        </a:prstGeom>
+        <a:gradFill rotWithShape="0">
+          <a:gsLst>
+            <a:gs pos="0">
+              <a:schemeClr val="accent1">
+                <a:hueOff val="0"/>
+                <a:satOff val="0"/>
+                <a:lumOff val="0"/>
+                <a:alphaOff val="0"/>
+                <a:shade val="51000"/>
+                <a:satMod val="130000"/>
+              </a:schemeClr>
+            </a:gs>
+            <a:gs pos="80000">
+              <a:schemeClr val="accent1">
+                <a:hueOff val="0"/>
+                <a:satOff val="0"/>
+                <a:lumOff val="0"/>
+                <a:alphaOff val="0"/>
+                <a:shade val="93000"/>
+                <a:satMod val="130000"/>
+              </a:schemeClr>
+            </a:gs>
+            <a:gs pos="100000">
+              <a:schemeClr val="accent1">
+                <a:hueOff val="0"/>
+                <a:satOff val="0"/>
+                <a:lumOff val="0"/>
+                <a:alphaOff val="0"/>
+                <a:shade val="94000"/>
+                <a:satMod val="135000"/>
+              </a:schemeClr>
+            </a:gs>
+          </a:gsLst>
+          <a:lin ang="16200000" scaled="0"/>
+        </a:gradFill>
+        <a:ln>
+          <a:noFill/>
+        </a:ln>
+        <a:effectLst>
+          <a:outerShdw blurRad="40000" dist="23000" dir="5400000" rotWithShape="0">
+            <a:srgbClr val="000000">
+              <a:alpha val="35000"/>
+            </a:srgbClr>
+          </a:outerShdw>
+        </a:effectLst>
+      </dsp:spPr>
+      <dsp:style>
+        <a:lnRef idx="0">
+          <a:scrgbClr r="0" g="0" b="0"/>
+        </a:lnRef>
+        <a:fillRef idx="3">
+          <a:scrgbClr r="0" g="0" b="0"/>
+        </a:fillRef>
+        <a:effectRef idx="2">
+          <a:scrgbClr r="0" g="0" b="0"/>
+        </a:effectRef>
+        <a:fontRef idx="minor">
+          <a:schemeClr val="lt1"/>
+        </a:fontRef>
+      </dsp:style>
+      <dsp:txBody>
+        <a:bodyPr spcFirstLastPara="0" vert="horz" wrap="square" lIns="24130" tIns="24130" rIns="24130" bIns="24130" numCol="1" spcCol="1270" anchor="ctr" anchorCtr="0">
+          <a:noAutofit/>
+        </a:bodyPr>
+        <a:lstStyle/>
+        <a:p>
+          <a:pPr lvl="0" algn="ctr" defTabSz="844550">
+            <a:lnSpc>
+              <a:spcPct val="90000"/>
+            </a:lnSpc>
+            <a:spcBef>
+              <a:spcPct val="0"/>
+            </a:spcBef>
+            <a:spcAft>
+              <a:spcPct val="35000"/>
+            </a:spcAft>
+          </a:pPr>
+          <a:r>
+            <a:rPr lang="en-US" sz="1900" kern="1200" dirty="0" smtClean="0"/>
+            <a:t>Interpret Result</a:t>
+          </a:r>
+          <a:endParaRPr lang="en-US" sz="1900" kern="1200" dirty="0"/>
+        </a:p>
+      </dsp:txBody>
+      <dsp:txXfrm>
+        <a:off x="1460467" y="1492515"/>
+        <a:ext cx="1024879" cy="1024879"/>
+      </dsp:txXfrm>
+    </dsp:sp>
+    <dsp:sp modelId="{BEEED8EC-05AC-4DB9-AED8-14E6F9C313DB}">
+      <dsp:nvSpPr>
+        <dsp:cNvPr id="0" name=""/>
+        <dsp:cNvSpPr/>
+      </dsp:nvSpPr>
+      <dsp:spPr>
+        <a:xfrm rot="19403754">
+          <a:off x="2641428" y="1126485"/>
+          <a:ext cx="369753" cy="489172"/>
+        </a:xfrm>
+        <a:prstGeom prst="rightArrow">
+          <a:avLst>
+            <a:gd name="adj1" fmla="val 60000"/>
+            <a:gd name="adj2" fmla="val 50000"/>
+          </a:avLst>
+        </a:prstGeom>
+        <a:gradFill rotWithShape="0">
+          <a:gsLst>
+            <a:gs pos="0">
+              <a:schemeClr val="accent1">
+                <a:tint val="60000"/>
+                <a:hueOff val="0"/>
+                <a:satOff val="0"/>
+                <a:lumOff val="0"/>
+                <a:alphaOff val="0"/>
+                <a:shade val="51000"/>
+                <a:satMod val="130000"/>
+              </a:schemeClr>
+            </a:gs>
+            <a:gs pos="80000">
+              <a:schemeClr val="accent1">
+                <a:tint val="60000"/>
+                <a:hueOff val="0"/>
+                <a:satOff val="0"/>
+                <a:lumOff val="0"/>
+                <a:alphaOff val="0"/>
+                <a:shade val="93000"/>
+                <a:satMod val="130000"/>
+              </a:schemeClr>
+            </a:gs>
+            <a:gs pos="100000">
+              <a:schemeClr val="accent1">
+                <a:tint val="60000"/>
+                <a:hueOff val="0"/>
+                <a:satOff val="0"/>
+                <a:lumOff val="0"/>
+                <a:alphaOff val="0"/>
+                <a:shade val="94000"/>
+                <a:satMod val="135000"/>
+              </a:schemeClr>
+            </a:gs>
+          </a:gsLst>
+          <a:lin ang="16200000" scaled="0"/>
+        </a:gradFill>
+        <a:ln>
+          <a:noFill/>
+        </a:ln>
+        <a:effectLst>
+          <a:outerShdw blurRad="40000" dist="23000" dir="5400000" rotWithShape="0">
+            <a:srgbClr val="000000">
+              <a:alpha val="35000"/>
+            </a:srgbClr>
+          </a:outerShdw>
+        </a:effectLst>
+      </dsp:spPr>
+      <dsp:style>
+        <a:lnRef idx="0">
+          <a:scrgbClr r="0" g="0" b="0"/>
+        </a:lnRef>
+        <a:fillRef idx="3">
+          <a:scrgbClr r="0" g="0" b="0"/>
+        </a:fillRef>
+        <a:effectRef idx="2">
+          <a:scrgbClr r="0" g="0" b="0"/>
+        </a:effectRef>
+        <a:fontRef idx="minor">
+          <a:schemeClr val="lt1"/>
+        </a:fontRef>
+      </dsp:style>
+      <dsp:txBody>
+        <a:bodyPr spcFirstLastPara="0" vert="horz" wrap="square" lIns="0" tIns="0" rIns="0" bIns="0" numCol="1" spcCol="1270" anchor="ctr" anchorCtr="0">
+          <a:noAutofit/>
+        </a:bodyPr>
+        <a:lstStyle/>
+        <a:p>
+          <a:pPr lvl="0" algn="ctr" defTabSz="666750">
+            <a:lnSpc>
+              <a:spcPct val="90000"/>
+            </a:lnSpc>
+            <a:spcBef>
+              <a:spcPct val="0"/>
+            </a:spcBef>
+            <a:spcAft>
+              <a:spcPct val="35000"/>
+            </a:spcAft>
+          </a:pPr>
+          <a:endParaRPr lang="en-US" sz="1500" kern="1200"/>
+        </a:p>
+      </dsp:txBody>
+      <dsp:txXfrm>
+        <a:off x="2652367" y="1257391"/>
+        <a:ext cx="258827" cy="293504"/>
+      </dsp:txXfrm>
+    </dsp:sp>
+  </dsp:spTree>
+</dsp:drawing>
+</file>
+
+<file path=ppt/diagrams/layout1.xml><?xml version="1.0" encoding="utf-8"?>
+<dgm:layoutDef xmlns:dgm="http://schemas.openxmlformats.org/drawingml/2006/diagram" xmlns:a="http://schemas.openxmlformats.org/drawingml/2006/main" uniqueId="urn:microsoft.com/office/officeart/2005/8/layout/cycle2">
+  <dgm:title val=""/>
+  <dgm:desc val=""/>
+  <dgm:catLst>
+    <dgm:cat type="cycle" pri="1000"/>
+    <dgm:cat type="convert" pri="10000"/>
+  </dgm:catLst>
+  <dgm:sampData>
+    <dgm:dataModel>
+      <dgm:ptLst>
+        <dgm:pt modelId="0" type="doc"/>
+        <dgm:pt modelId="1">
+          <dgm:prSet phldr="1"/>
+        </dgm:pt>
+        <dgm:pt modelId="2">
+          <dgm:prSet phldr="1"/>
+        </dgm:pt>
+        <dgm:pt modelId="3">
+          <dgm:prSet phldr="1"/>
+        </dgm:pt>
+        <dgm:pt modelId="4">
+          <dgm:prSet phldr="1"/>
+        </dgm:pt>
+        <dgm:pt modelId="5">
+          <dgm:prSet phldr="1"/>
+        </dgm:pt>
+      </dgm:ptLst>
+      <dgm:cxnLst>
+        <dgm:cxn modelId="6" srcId="0" destId="1" srcOrd="0" destOrd="0"/>
+        <dgm:cxn modelId="7" srcId="0" destId="2" srcOrd="1" destOrd="0"/>
+        <dgm:cxn modelId="8" srcId="0" destId="3" srcOrd="2" destOrd="0"/>
+        <dgm:cxn modelId="9" srcId="0" destId="4" srcOrd="3" destOrd="0"/>
+        <dgm:cxn modelId="10" srcId="0" destId="5" srcOrd="4" destOrd="0"/>
+      </dgm:cxnLst>
+      <dgm:bg/>
+      <dgm:whole/>
+    </dgm:dataModel>
+  </dgm:sampData>
+  <dgm:styleData>
+    <dgm:dataModel>
+      <dgm:ptLst>
+        <dgm:pt modelId="0" type="doc"/>
+        <dgm:pt modelId="1"/>
+        <dgm:pt modelId="2"/>
+        <dgm:pt modelId="3"/>
+      </dgm:ptLst>
+      <dgm:cxnLst>
+        <dgm:cxn modelId="4" srcId="0" destId="1" srcOrd="0" destOrd="0"/>
+        <dgm:cxn modelId="5" srcId="0" destId="2" srcOrd="1" destOrd="0"/>
+        <dgm:cxn modelId="6" srcId="0" destId="3" srcOrd="2" destOrd="0"/>
+      </dgm:cxnLst>
+      <dgm:bg/>
+      <dgm:whole/>
+    </dgm:dataModel>
+  </dgm:styleData>
+  <dgm:clrData>
+    <dgm:dataModel>
+      <dgm:ptLst>
+        <dgm:pt modelId="0" type="doc"/>
+        <dgm:pt modelId="1"/>
+        <dgm:pt modelId="2"/>
+        <dgm:pt modelId="3"/>
+        <dgm:pt modelId="4"/>
+        <dgm:pt modelId="5"/>
+        <dgm:pt modelId="6"/>
+      </dgm:ptLst>
+      <dgm:cxnLst>
+        <dgm:cxn modelId="7" srcId="0" destId="1" srcOrd="0" destOrd="0"/>
+        <dgm:cxn modelId="8" srcId="0" destId="2" srcOrd="1" destOrd="0"/>
+        <dgm:cxn modelId="9" srcId="0" destId="3" srcOrd="2" destOrd="0"/>
+        <dgm:cxn modelId="10" srcId="0" destId="4" srcOrd="3" destOrd="0"/>
+        <dgm:cxn modelId="11" srcId="0" destId="5" srcOrd="4" destOrd="0"/>
+        <dgm:cxn modelId="12" srcId="0" destId="6" srcOrd="5" destOrd="0"/>
+      </dgm:cxnLst>
+      <dgm:bg/>
+      <dgm:whole/>
+    </dgm:dataModel>
+  </dgm:clrData>
+  <dgm:layoutNode name="cycle">
+    <dgm:varLst>
+      <dgm:dir/>
+      <dgm:resizeHandles val="exact"/>
+    </dgm:varLst>
+    <dgm:choose name="Name0">
+      <dgm:if name="Name1" func="var" arg="dir" op="equ" val="norm">
+        <dgm:choose name="Name2">
+          <dgm:if name="Name3" axis="ch" ptType="node" func="cnt" op="gt" val="2">
+            <dgm:alg type="cycle">
+              <dgm:param type="stAng" val="0"/>
+              <dgm:param type="spanAng" val="360"/>
+            </dgm:alg>
+          </dgm:if>
+          <dgm:else name="Name4">
+            <dgm:alg type="cycle">
+              <dgm:param type="stAng" val="-90"/>
+              <dgm:param type="spanAng" val="360"/>
+            </dgm:alg>
+          </dgm:else>
+        </dgm:choose>
+      </dgm:if>
+      <dgm:else name="Name5">
+        <dgm:choose name="Name6">
+          <dgm:if name="Name7" axis="ch" ptType="node" func="cnt" op="gt" val="2">
+            <dgm:alg type="cycle">
+              <dgm:param type="stAng" val="0"/>
+              <dgm:param type="spanAng" val="-360"/>
+            </dgm:alg>
+          </dgm:if>
+          <dgm:else name="Name8">
+            <dgm:alg type="cycle">
+              <dgm:param type="stAng" val="90"/>
+              <dgm:param type="spanAng" val="-360"/>
+            </dgm:alg>
+          </dgm:else>
+        </dgm:choose>
+      </dgm:else>
+    </dgm:choose>
+    <dgm:shape xmlns:r="http://schemas.openxmlformats.org/officeDocument/2006/relationships" r:blip="">
+      <dgm:adjLst/>
+    </dgm:shape>
+    <dgm:presOf/>
+    <dgm:constrLst>
+      <dgm:constr type="w" for="ch" ptType="node" refType="w"/>
+      <dgm:constr type="w" for="ch" ptType="sibTrans" refType="w" refFor="ch" refPtType="node" op="equ" fact="0.25"/>
+      <dgm:constr type="sibSp" refType="w" refFor="ch" refPtType="node" fact="0.5"/>
+      <dgm:constr type="primFontSz" for="ch" ptType="node" op="equ" val="65"/>
+      <dgm:constr type="primFontSz" for="des" forName="connectorText" op="equ" val="55"/>
+      <dgm:constr type="primFontSz" for="des" forName="connectorText" refType="primFontSz" refFor="ch" refPtType="node" op="lte" fact="0.8"/>
+    </dgm:constrLst>
+    <dgm:ruleLst/>
+    <dgm:forEach name="nodesForEach" axis="ch" ptType="node">
+      <dgm:layoutNode name="node">
+        <dgm:varLst>
+          <dgm:bulletEnabled val="1"/>
+        </dgm:varLst>
+        <dgm:alg type="tx">
+          <dgm:param type="txAnchorVertCh" val="mid"/>
+        </dgm:alg>
+        <dgm:shape xmlns:r="http://schemas.openxmlformats.org/officeDocument/2006/relationships" type="ellipse" r:blip="">
+          <dgm:adjLst/>
+        </dgm:shape>
+        <dgm:presOf axis="desOrSelf" ptType="node"/>
+        <dgm:constrLst>
+          <dgm:constr type="h" refType="w"/>
+          <dgm:constr type="lMarg" refType="primFontSz" fact="0.1"/>
+          <dgm:constr type="rMarg" refType="primFontSz" fact="0.1"/>
+          <dgm:constr type="tMarg" refType="primFontSz" fact="0.1"/>
+          <dgm:constr type="bMarg" refType="primFontSz" fact="0.1"/>
+        </dgm:constrLst>
+        <dgm:ruleLst>
+          <dgm:rule type="primFontSz" val="5" fact="NaN" max="NaN"/>
+        </dgm:ruleLst>
+      </dgm:layoutNode>
+      <dgm:choose name="Name9">
+        <dgm:if name="Name10" axis="par ch" ptType="doc node" func="cnt" op="gt" val="1">
+          <dgm:forEach name="sibTransForEach" axis="followSib" ptType="sibTrans" hideLastTrans="0" cnt="1">
+            <dgm:layoutNode name="sibTrans">
+              <dgm:choose name="Name11">
+                <dgm:if name="Name12" axis="par ch" ptType="doc node" func="cnt" op="lt" val="3">
+                  <dgm:alg type="conn">
+                    <dgm:param type="begPts" val="radial"/>
+                    <dgm:param type="endPts" val="radial"/>
+                  </dgm:alg>
+                </dgm:if>
+                <dgm:else name="Name13">
+                  <dgm:alg type="conn">
+                    <dgm:param type="begPts" val="auto"/>
+                    <dgm:param type="endPts" val="auto"/>
+                  </dgm:alg>
+                </dgm:else>
+              </dgm:choose>
+              <dgm:shape xmlns:r="http://schemas.openxmlformats.org/officeDocument/2006/relationships" type="conn" r:blip="">
+                <dgm:adjLst/>
+              </dgm:shape>
+              <dgm:presOf axis="self"/>
+              <dgm:constrLst>
+                <dgm:constr type="h" refType="w" fact="1.35"/>
+                <dgm:constr type="connDist"/>
+                <dgm:constr type="w" for="ch" refType="connDist" fact="0.45"/>
+                <dgm:constr type="h" for="ch" refType="h"/>
+              </dgm:constrLst>
+              <dgm:ruleLst/>
+              <dgm:layoutNode name="connectorText">
+                <dgm:alg type="tx">
+                  <dgm:param type="autoTxRot" val="grav"/>
+                </dgm:alg>
+                <dgm:shape xmlns:r="http://schemas.openxmlformats.org/officeDocument/2006/relationships" type="conn" r:blip="" hideGeom="1">
+                  <dgm:adjLst/>
+                </dgm:shape>
+                <dgm:presOf axis="self"/>
+                <dgm:constrLst>
+                  <dgm:constr type="lMarg"/>
+                  <dgm:constr type="rMarg"/>
+                  <dgm:constr type="tMarg"/>
+                  <dgm:constr type="bMarg"/>
+                </dgm:constrLst>
+                <dgm:ruleLst>
+                  <dgm:rule type="primFontSz" val="5" fact="NaN" max="NaN"/>
+                </dgm:ruleLst>
+              </dgm:layoutNode>
+            </dgm:layoutNode>
+          </dgm:forEach>
+        </dgm:if>
+        <dgm:else name="Name14"/>
+      </dgm:choose>
+    </dgm:forEach>
+  </dgm:layoutNode>
+</dgm:layoutDef>
+</file>
+
+<file path=ppt/diagrams/quickStyle1.xml><?xml version="1.0" encoding="utf-8"?>
+<dgm:styleDef xmlns:dgm="http://schemas.openxmlformats.org/drawingml/2006/diagram" xmlns:a="http://schemas.openxmlformats.org/drawingml/2006/main" uniqueId="urn:microsoft.com/office/officeart/2005/8/quickstyle/simple4">
+  <dgm:title val=""/>
+  <dgm:desc val=""/>
+  <dgm:catLst>
+    <dgm:cat type="simple" pri="10400"/>
+  </dgm:catLst>
+  <dgm:scene3d>
+    <a:camera prst="orthographicFront"/>
+    <a:lightRig rig="threePt" dir="t"/>
+  </dgm:scene3d>
+  <dgm:styleLbl name="node0">
+    <dgm:scene3d>
+      <a:camera prst="orthographicFront"/>
+      <a:lightRig rig="threePt" dir="t"/>
+    </dgm:scene3d>
+    <dgm:sp3d/>
+    <dgm:txPr/>
+    <dgm:style>
+      <a:lnRef idx="0">
+        <a:scrgbClr r="0" g="0" b="0"/>
+      </a:lnRef>
+      <a:fillRef idx="3">
+        <a:scrgbClr r="0" g="0" b="0"/>
+      </a:fillRef>
+      <a:effectRef idx="2">
+        <a:scrgbClr r="0" g="0" b="0"/>
+      </a:effectRef>
+      <a:fontRef idx="minor">
+        <a:schemeClr val="lt1"/>
+      </a:fontRef>
+    </dgm:style>
+  </dgm:styleLbl>
+  <dgm:styleLbl name="lnNode1">
+    <dgm:scene3d>
+      <a:camera prst="orthographicFront"/>
+      <a:lightRig rig="threePt" dir="t"/>
+    </dgm:scene3d>
+    <dgm:sp3d/>
+    <dgm:txPr/>
+    <dgm:style>
+      <a:lnRef idx="1">
+        <a:scrgbClr r="0" g="0" b="0"/>
+      </a:lnRef>
+      <a:fillRef idx="3">
+        <a:scrgbClr r="0" g="0" b="0"/>
+      </a:fillRef>
+      <a:effectRef idx="2">
+        <a:scrgbClr r="0" g="0" b="0"/>
+      </a:effectRef>
+      <a:fontRef idx="minor">
+        <a:schemeClr val="lt1"/>
+      </a:fontRef>
+    </dgm:style>
+  </dgm:styleLbl>
+  <dgm:styleLbl name="vennNode1">
+    <dgm:scene3d>
+      <a:camera prst="orthographicFront"/>
+      <a:lightRig rig="threePt" dir="t"/>
+    </dgm:scene3d>
+    <dgm:sp3d/>
+    <dgm:txPr/>
+    <dgm:style>
+      <a:lnRef idx="0">
+        <a:scrgbClr r="0" g="0" b="0"/>
+      </a:lnRef>
+      <a:fillRef idx="3">
+        <a:scrgbClr r="0" g="0" b="0"/>
+      </a:fillRef>
+      <a:effectRef idx="0">
+        <a:scrgbClr r="0" g="0" b="0"/>
+      </a:effectRef>
+      <a:fontRef idx="minor">
+        <a:schemeClr val="tx1"/>
+      </a:fontRef>
+    </dgm:style>
+  </dgm:styleLbl>
+  <dgm:styleLbl name="alignNode1">
+    <dgm:scene3d>
+      <a:camera prst="orthographicFront"/>
+      <a:lightRig rig="threePt" dir="t"/>
+    </dgm:scene3d>
+    <dgm:sp3d/>
+    <dgm:txPr/>
+    <dgm:style>
+      <a:lnRef idx="1">
+        <a:scrgbClr r="0" g="0" b="0"/>
+      </a:lnRef>
+      <a:fillRef idx="3">
+        <a:scrgbClr r="0" g="0" b="0"/>
+      </a:fillRef>
+      <a:effectRef idx="2">
+        <a:scrgbClr r="0" g="0" b="0"/>
+      </a:effectRef>
+      <a:fontRef idx="minor">
+        <a:schemeClr val="lt1"/>
+      </a:fontRef>
+    </dgm:style>
+  </dgm:styleLbl>
+  <dgm:styleLbl name="node1">
+    <dgm:scene3d>
+      <a:camera prst="orthographicFront"/>
+      <a:lightRig rig="threePt" dir="t"/>
+    </dgm:scene3d>
+    <dgm:sp3d/>
+    <dgm:txPr/>
+    <dgm:style>
+      <a:lnRef idx="0">
+        <a:scrgbClr r="0" g="0" b="0"/>
+      </a:lnRef>
+      <a:fillRef idx="3">
+        <a:scrgbClr r="0" g="0" b="0"/>
+      </a:fillRef>
+      <a:effectRef idx="2">
+        <a:scrgbClr r="0" g="0" b="0"/>
+      </a:effectRef>
+      <a:fontRef idx="minor">
+        <a:schemeClr val="lt1"/>
+      </a:fontRef>
+    </dgm:style>
+  </dgm:styleLbl>
+  <dgm:styleLbl name="node2">
+    <dgm:scene3d>
+      <a:camera prst="orthographicFront"/>
+      <a:lightRig rig="threePt" dir="t"/>
+    </dgm:scene3d>
+    <dgm:sp3d/>
+    <dgm:txPr/>
+    <dgm:style>
+      <a:lnRef idx="0">
+        <a:scrgbClr r="0" g="0" b="0"/>
+      </a:lnRef>
+      <a:fillRef idx="3">
+        <a:scrgbClr r="0" g="0" b="0"/>
+      </a:fillRef>
+      <a:effectRef idx="2">
+        <a:scrgbClr r="0" g="0" b="0"/>
+      </a:effectRef>
+      <a:fontRef idx="minor">
+        <a:schemeClr val="lt1"/>
+      </a:fontRef>
+    </dgm:style>
+  </dgm:styleLbl>
+  <dgm:styleLbl name="node3">
+    <dgm:scene3d>
+      <a:camera prst="orthographicFront"/>
+      <a:lightRig rig="threePt" dir="t"/>
+    </dgm:scene3d>
+    <dgm:sp3d/>
+    <dgm:txPr/>
+    <dgm:style>
+      <a:lnRef idx="0">
+        <a:scrgbClr r="0" g="0" b="0"/>
+      </a:lnRef>
+      <a:fillRef idx="3">
+        <a:scrgbClr r="0" g="0" b="0"/>
+      </a:fillRef>
+      <a:effectRef idx="2">
+        <a:scrgbClr r="0" g="0" b="0"/>
+      </a:effectRef>
+      <a:fontRef idx="minor">
+        <a:schemeClr val="lt1"/>
+      </a:fontRef>
+    </dgm:style>
+  </dgm:styleLbl>
+  <dgm:styleLbl name="node4">
+    <dgm:scene3d>
+      <a:camera prst="orthographicFront"/>
+      <a:lightRig rig="threePt" dir="t"/>
+    </dgm:scene3d>
+    <dgm:sp3d/>
+    <dgm:txPr/>
+    <dgm:style>
+      <a:lnRef idx="0">
+        <a:scrgbClr r="0" g="0" b="0"/>
+      </a:lnRef>
+      <a:fillRef idx="3">
+        <a:scrgbClr r="0" g="0" b="0"/>
+      </a:fillRef>
+      <a:effectRef idx="2">
+        <a:scrgbClr r="0" g="0" b="0"/>
+      </a:effectRef>
+      <a:fontRef idx="minor">
+        <a:schemeClr val="lt1"/>
+      </a:fontRef>
+    </dgm:style>
+  </dgm:styleLbl>
+  <dgm:styleLbl name="fgImgPlace1">
+    <dgm:scene3d>
+      <a:camera prst="orthographicFront"/>
+      <a:lightRig rig="threePt" dir="t"/>
+    </dgm:scene3d>
+    <dgm:sp3d/>
+    <dgm:txPr/>
+    <dgm:style>
+      <a:lnRef idx="0">
+        <a:scrgbClr r="0" g="0" b="0"/>
+      </a:lnRef>
+      <a:fillRef idx="1">
+        <a:scrgbClr r="0" g="0" b="0"/>
+      </a:fillRef>
+      <a:effectRef idx="2">
+        <a:scrgbClr r="0" g="0" b="0"/>
+      </a:effectRef>
+      <a:fontRef idx="minor"/>
+    </dgm:style>
+  </dgm:styleLbl>
+  <dgm:styleLbl name="alignImgPlace1">
+    <dgm:scene3d>
+      <a:camera prst="orthographicFront"/>
+      <a:lightRig rig="threePt" dir="t"/>
+    </dgm:scene3d>
+    <dgm:sp3d/>
+    <dgm:txPr/>
+    <dgm:style>
+      <a:lnRef idx="0">
+        <a:scrgbClr r="0" g="0" b="0"/>
+      </a:lnRef>
+      <a:fillRef idx="1">
+        <a:scrgbClr r="0" g="0" b="0"/>
+      </a:fillRef>
+      <a:effectRef idx="2">
+        <a:scrgbClr r="0" g="0" b="0"/>
+      </a:effectRef>
+      <a:fontRef idx="minor"/>
+    </dgm:style>
+  </dgm:styleLbl>
+  <dgm:styleLbl name="bgImgPlace1">
+    <dgm:scene3d>
+      <a:camera prst="orthographicFront"/>
+      <a:lightRig rig="threePt" dir="t"/>
+    </dgm:scene3d>
+    <dgm:sp3d/>
+    <dgm:txPr/>
+    <dgm:style>
+      <a:lnRef idx="0">
+        <a:scrgbClr r="0" g="0" b="0"/>
+      </a:lnRef>
+      <a:fillRef idx="1">
+        <a:scrgbClr r="0" g="0" b="0"/>
+      </a:fillRef>
+      <a:effectRef idx="2">
+        <a:scrgbClr r="0" g="0" b="0"/>
+      </a:effectRef>
+      <a:fontRef idx="minor"/>
+    </dgm:style>
+  </dgm:styleLbl>
+  <dgm:styleLbl name="sibTrans2D1">
+    <dgm:scene3d>
+      <a:camera prst="orthographicFront"/>
+      <a:lightRig rig="threePt" dir="t"/>
+    </dgm:scene3d>
+    <dgm:sp3d/>
+    <dgm:txPr/>
+    <dgm:style>
+      <a:lnRef idx="0">
+        <a:scrgbClr r="0" g="0" b="0"/>
+      </a:lnRef>
+      <a:fillRef idx="3">
+        <a:scrgbClr r="0" g="0" b="0"/>
+      </a:fillRef>
+      <a:effectRef idx="2">
+        <a:scrgbClr r="0" g="0" b="0"/>
+      </a:effectRef>
+      <a:fontRef idx="minor">
+        <a:schemeClr val="lt1"/>
+      </a:fontRef>
+    </dgm:style>
+  </dgm:styleLbl>
+  <dgm:styleLbl name="fgSibTrans2D1">
+    <dgm:scene3d>
+      <a:camera prst="orthographicFront"/>
+      <a:lightRig rig="threePt" dir="t"/>
+    </dgm:scene3d>
+    <dgm:sp3d/>
+    <dgm:txPr/>
+    <dgm:style>
+      <a:lnRef idx="0">
+        <a:scrgbClr r="0" g="0" b="0"/>
+      </a:lnRef>
+      <a:fillRef idx="3">
+        <a:scrgbClr r="0" g="0" b="0"/>
+      </a:fillRef>
+      <a:effectRef idx="2">
+        <a:scrgbClr r="0" g="0" b="0"/>
+      </a:effectRef>
+      <a:fontRef idx="minor">
+        <a:schemeClr val="lt1"/>
+      </a:fontRef>
+    </dgm:style>
+  </dgm:styleLbl>
+  <dgm:styleLbl name="bgSibTrans2D1">
+    <dgm:scene3d>
+      <a:camera prst="orthographicFront"/>
+      <a:lightRig rig="threePt" dir="t"/>
+    </dgm:scene3d>
+    <dgm:sp3d/>
+    <dgm:txPr/>
+    <dgm:style>
+      <a:lnRef idx="0">
+        <a:scrgbClr r="0" g="0" b="0"/>
+      </a:lnRef>
+      <a:fillRef idx="3">
+        <a:scrgbClr r="0" g="0" b="0"/>
+      </a:fillRef>
+      <a:effectRef idx="2">
+        <a:scrgbClr r="0" g="0" b="0"/>
+      </a:effectRef>
+      <a:fontRef idx="minor">
+        <a:schemeClr val="lt1"/>
+      </a:fontRef>
+    </dgm:style>
+  </dgm:styleLbl>
+  <dgm:styleLbl name="sibTrans1D1">
+    <dgm:scene3d>
+      <a:camera prst="orthographicFront"/>
+      <a:lightRig rig="threePt" dir="t"/>
+    </dgm:scene3d>
+    <dgm:sp3d/>
+    <dgm:txPr/>
+    <dgm:style>
+      <a:lnRef idx="1">
+        <a:scrgbClr r="0" g="0" b="0"/>
+      </a:lnRef>
+      <a:fillRef idx="0">
+        <a:scrgbClr r="0" g="0" b="0"/>
+      </a:fillRef>
+      <a:effectRef idx="0">
+        <a:scrgbClr r="0" g="0" b="0"/>
+      </a:effectRef>
+      <a:fontRef idx="minor"/>
+    </dgm:style>
+  </dgm:styleLbl>
+  <dgm:styleLbl name="callout">
+    <dgm:scene3d>
+      <a:camera prst="orthographicFront"/>
+      <a:lightRig rig="threePt" dir="t"/>
+    </dgm:scene3d>
+    <dgm:sp3d/>
+    <dgm:txPr/>
+    <dgm:style>
+      <a:lnRef idx="2">
+        <a:scrgbClr r="0" g="0" b="0"/>
+      </a:lnRef>
+      <a:fillRef idx="1">
+        <a:scrgbClr r="0" g="0" b="0"/>
+      </a:fillRef>
+      <a:effectRef idx="1">
+        <a:scrgbClr r="0" g="0" b="0"/>
+      </a:effectRef>
+      <a:fontRef idx="minor"/>
+    </dgm:style>
+  </dgm:styleLbl>
+  <dgm:styleLbl name="asst0">
+    <dgm:scene3d>
+      <a:camera prst="orthographicFront"/>
+      <a:lightRig rig="threePt" dir="t"/>
+    </dgm:scene3d>
+    <dgm:sp3d/>
+    <dgm:txPr/>
+    <dgm:style>
+      <a:lnRef idx="0">
+        <a:scrgbClr r="0" g="0" b="0"/>
+      </a:lnRef>
+      <a:fillRef idx="3">
+        <a:scrgbClr r="0" g="0" b="0"/>
+      </a:fillRef>
+      <a:effectRef idx="2">
+        <a:scrgbClr r="0" g="0" b="0"/>
+      </a:effectRef>
+      <a:fontRef idx="minor">
+        <a:schemeClr val="lt1"/>
+      </a:fontRef>
+    </dgm:style>
+  </dgm:styleLbl>
+  <dgm:styleLbl name="asst1">
+    <dgm:scene3d>
+      <a:camera prst="orthographicFront"/>
+      <a:lightRig rig="threePt" dir="t"/>
+    </dgm:scene3d>
+    <dgm:sp3d/>
+    <dgm:txPr/>
+    <dgm:style>
+      <a:lnRef idx="0">
+        <a:scrgbClr r="0" g="0" b="0"/>
+      </a:lnRef>
+      <a:fillRef idx="3">
+        <a:scrgbClr r="0" g="0" b="0"/>
+      </a:fillRef>
+      <a:effectRef idx="2">
+        <a:scrgbClr r="0" g="0" b="0"/>
+      </a:effectRef>
+      <a:fontRef idx="minor">
+        <a:schemeClr val="lt1"/>
+      </a:fontRef>
+    </dgm:style>
+  </dgm:styleLbl>
+  <dgm:styleLbl name="asst2">
+    <dgm:scene3d>
+      <a:camera prst="orthographicFront"/>
+      <a:lightRig rig="threePt" dir="t"/>
+    </dgm:scene3d>
+    <dgm:sp3d/>
+    <dgm:txPr/>
+    <dgm:style>
+      <a:lnRef idx="0">
+        <a:scrgbClr r="0" g="0" b="0"/>
+      </a:lnRef>
+      <a:fillRef idx="3">
+        <a:scrgbClr r="0" g="0" b="0"/>
+      </a:fillRef>
+      <a:effectRef idx="2">
+        <a:scrgbClr r="0" g="0" b="0"/>
+      </a:effectRef>
+      <a:fontRef idx="minor">
+        <a:schemeClr val="lt1"/>
+      </a:fontRef>
+    </dgm:style>
+  </dgm:styleLbl>
+  <dgm:styleLbl name="asst3">
+    <dgm:scene3d>
+      <a:camera prst="orthographicFront"/>
+      <a:lightRig rig="threePt" dir="t"/>
+    </dgm:scene3d>
+    <dgm:sp3d/>
+    <dgm:txPr/>
+    <dgm:style>
+      <a:lnRef idx="0">
+        <a:scrgbClr r="0" g="0" b="0"/>
+      </a:lnRef>
+      <a:fillRef idx="3">
+        <a:scrgbClr r="0" g="0" b="0"/>
+      </a:fillRef>
+      <a:effectRef idx="2">
+        <a:scrgbClr r="0" g="0" b="0"/>
+      </a:effectRef>
+      <a:fontRef idx="minor">
+        <a:schemeClr val="lt1"/>
+      </a:fontRef>
+    </dgm:style>
+  </dgm:styleLbl>
+  <dgm:styleLbl name="asst4">
+    <dgm:scene3d>
+      <a:camera prst="orthographicFront"/>
+      <a:lightRig rig="threePt" dir="t"/>
+    </dgm:scene3d>
+    <dgm:sp3d/>
+    <dgm:txPr/>
+    <dgm:style>
+      <a:lnRef idx="0">
+        <a:scrgbClr r="0" g="0" b="0"/>
+      </a:lnRef>
+      <a:fillRef idx="3">
+        <a:scrgbClr r="0" g="0" b="0"/>
+      </a:fillRef>
+      <a:effectRef idx="2">
+        <a:scrgbClr r="0" g="0" b="0"/>
+      </a:effectRef>
+      <a:fontRef idx="minor">
+        <a:schemeClr val="lt1"/>
+      </a:fontRef>
+    </dgm:style>
+  </dgm:styleLbl>
+  <dgm:styleLbl name="parChTrans2D1">
+    <dgm:scene3d>
+      <a:camera prst="orthographicFront"/>
+      <a:lightRig rig="threePt" dir="t"/>
+    </dgm:scene3d>
+    <dgm:sp3d/>
+    <dgm:txPr/>
+    <dgm:style>
+      <a:lnRef idx="0">
+        <a:scrgbClr r="0" g="0" b="0"/>
+      </a:lnRef>
+      <a:fillRef idx="3">
+        <a:scrgbClr r="0" g="0" b="0"/>
+      </a:fillRef>
+      <a:effectRef idx="2">
+        <a:scrgbClr r="0" g="0" b="0"/>
+      </a:effectRef>
+      <a:fontRef idx="minor">
+        <a:schemeClr val="lt1"/>
+      </a:fontRef>
+    </dgm:style>
+  </dgm:styleLbl>
+  <dgm:styleLbl name="parChTrans2D2">
+    <dgm:scene3d>
+      <a:camera prst="orthographicFront"/>
+      <a:lightRig rig="threePt" dir="t"/>
+    </dgm:scene3d>
+    <dgm:sp3d/>
+    <dgm:txPr/>
+    <dgm:style>
+      <a:lnRef idx="0">
+        <a:scrgbClr r="0" g="0" b="0"/>
+      </a:lnRef>
+      <a:fillRef idx="3">
+        <a:scrgbClr r="0" g="0" b="0"/>
+      </a:fillRef>
+      <a:effectRef idx="2">
+        <a:scrgbClr r="0" g="0" b="0"/>
+      </a:effectRef>
+      <a:fontRef idx="minor">
+        <a:schemeClr val="lt1"/>
+      </a:fontRef>
+    </dgm:style>
+  </dgm:styleLbl>
+  <dgm:styleLbl name="parChTrans2D3">
+    <dgm:scene3d>
+      <a:camera prst="orthographicFront"/>
+      <a:lightRig rig="threePt" dir="t"/>
+    </dgm:scene3d>
+    <dgm:sp3d/>
+    <dgm:txPr/>
+    <dgm:style>
+      <a:lnRef idx="1">
+        <a:scrgbClr r="0" g="0" b="0"/>
+      </a:lnRef>
+      <a:fillRef idx="3">
+        <a:scrgbClr r="0" g="0" b="0"/>
+      </a:fillRef>
+      <a:effectRef idx="2">
+        <a:scrgbClr r="0" g="0" b="0"/>
+      </a:effectRef>
+      <a:fontRef idx="minor">
+        <a:schemeClr val="lt1"/>
+      </a:fontRef>
+    </dgm:style>
+  </dgm:styleLbl>
+  <dgm:styleLbl name="parChTrans2D4">
+    <dgm:scene3d>
+      <a:camera prst="orthographicFront"/>
+      <a:lightRig rig="threePt" dir="t"/>
+    </dgm:scene3d>
+    <dgm:sp3d/>
+    <dgm:txPr/>
+    <dgm:style>
+      <a:lnRef idx="1">
+        <a:scrgbClr r="0" g="0" b="0"/>
+      </a:lnRef>
+      <a:fillRef idx="3">
+        <a:scrgbClr r="0" g="0" b="0"/>
+      </a:fillRef>
+      <a:effectRef idx="2">
+        <a:scrgbClr r="0" g="0" b="0"/>
+      </a:effectRef>
+      <a:fontRef idx="minor">
+        <a:schemeClr val="lt1"/>
+      </a:fontRef>
+    </dgm:style>
+  </dgm:styleLbl>
+  <dgm:styleLbl name="parChTrans1D1">
+    <dgm:scene3d>
+      <a:camera prst="orthographicFront"/>
+      <a:lightRig rig="threePt" dir="t"/>
+    </dgm:scene3d>
+    <dgm:sp3d/>
+    <dgm:txPr/>
+    <dgm:style>
+      <a:lnRef idx="1">
+        <a:scrgbClr r="0" g="0" b="0"/>
+      </a:lnRef>
+      <a:fillRef idx="0">
+        <a:scrgbClr r="0" g="0" b="0"/>
+      </a:fillRef>
+      <a:effectRef idx="0">
+        <a:scrgbClr r="0" g="0" b="0"/>
+      </a:effectRef>
+      <a:fontRef idx="minor"/>
+    </dgm:style>
+  </dgm:styleLbl>
+  <dgm:styleLbl name="parChTrans1D2">
+    <dgm:scene3d>
+      <a:camera prst="orthographicFront"/>
+      <a:lightRig rig="threePt" dir="t"/>
+    </dgm:scene3d>
+    <dgm:sp3d/>
+    <dgm:txPr/>
+    <dgm:style>
+      <a:lnRef idx="1">
+        <a:scrgbClr r="0" g="0" b="0"/>
+      </a:lnRef>
+      <a:fillRef idx="0">
+        <a:scrgbClr r="0" g="0" b="0"/>
+      </a:fillRef>
+      <a:effectRef idx="0">
+        <a:scrgbClr r="0" g="0" b="0"/>
+      </a:effectRef>
+      <a:fontRef idx="minor"/>
+    </dgm:style>
+  </dgm:styleLbl>
+  <dgm:styleLbl name="parChTrans1D3">
+    <dgm:scene3d>
+      <a:camera prst="orthographicFront"/>
+      <a:lightRig rig="threePt" dir="t"/>
+    </dgm:scene3d>
+    <dgm:sp3d/>
+    <dgm:txPr/>
+    <dgm:style>
+      <a:lnRef idx="1">
+        <a:scrgbClr r="0" g="0" b="0"/>
+      </a:lnRef>
+      <a:fillRef idx="0">
+        <a:scrgbClr r="0" g="0" b="0"/>
+      </a:fillRef>
+      <a:effectRef idx="0">
+        <a:scrgbClr r="0" g="0" b="0"/>
+      </a:effectRef>
+      <a:fontRef idx="minor"/>
+    </dgm:style>
+  </dgm:styleLbl>
+  <dgm:styleLbl name="parChTrans1D4">
+    <dgm:scene3d>
+      <a:camera prst="orthographicFront"/>
+      <a:lightRig rig="threePt" dir="t"/>
+    </dgm:scene3d>
+    <dgm:sp3d/>
+    <dgm:txPr/>
+    <dgm:style>
+      <a:lnRef idx="1">
+        <a:scrgbClr r="0" g="0" b="0"/>
+      </a:lnRef>
+      <a:fillRef idx="0">
+        <a:scrgbClr r="0" g="0" b="0"/>
+      </a:fillRef>
+      <a:effectRef idx="0">
+        <a:scrgbClr r="0" g="0" b="0"/>
+      </a:effectRef>
+      <a:fontRef idx="minor"/>
+    </dgm:style>
+  </dgm:styleLbl>
+  <dgm:styleLbl name="fgAcc1">
+    <dgm:scene3d>
+      <a:camera prst="orthographicFront"/>
+      <a:lightRig rig="threePt" dir="t"/>
+    </dgm:scene3d>
+    <dgm:sp3d/>
+    <dgm:txPr/>
+    <dgm:style>
+      <a:lnRef idx="1">
+        <a:scrgbClr r="0" g="0" b="0"/>
+      </a:lnRef>
+      <a:fillRef idx="1">
+        <a:scrgbClr r="0" g="0" b="0"/>
+      </a:fillRef>
+      <a:effectRef idx="0">
+        <a:scrgbClr r="0" g="0" b="0"/>
+      </a:effectRef>
+      <a:fontRef idx="minor"/>
+    </dgm:style>
+  </dgm:styleLbl>
+  <dgm:styleLbl name="conFgAcc1">
+    <dgm:scene3d>
+      <a:camera prst="orthographicFront"/>
+      <a:lightRig rig="threePt" dir="t"/>
+    </dgm:scene3d>
+    <dgm:sp3d/>
+    <dgm:txPr/>
+    <dgm:style>
+      <a:lnRef idx="1">
+        <a:scrgbClr r="0" g="0" b="0"/>
+      </a:lnRef>
+      <a:fillRef idx="1">
+        <a:scrgbClr r="0" g="0" b="0"/>
+      </a:fillRef>
+      <a:effectRef idx="0">
+        <a:scrgbClr r="0" g="0" b="0"/>
+      </a:effectRef>
+      <a:fontRef idx="minor"/>
+    </dgm:style>
+  </dgm:styleLbl>
+  <dgm:styleLbl name="alignAcc1">
+    <dgm:scene3d>
+      <a:camera prst="orthographicFront"/>
+      <a:lightRig rig="threePt" dir="t"/>
+    </dgm:scene3d>
+    <dgm:sp3d/>
+    <dgm:txPr/>
+    <dgm:style>
+      <a:lnRef idx="1">
+        <a:scrgbClr r="0" g="0" b="0"/>
+      </a:lnRef>
+      <a:fillRef idx="1">
+        <a:scrgbClr r="0" g="0" b="0"/>
+      </a:fillRef>
+      <a:effectRef idx="0">
+        <a:scrgbClr r="0" g="0" b="0"/>
+      </a:effectRef>
+      <a:fontRef idx="minor"/>
+    </dgm:style>
+  </dgm:styleLbl>
+  <dgm:styleLbl name="trAlignAcc1">
+    <dgm:scene3d>
+      <a:camera prst="orthographicFront"/>
+      <a:lightRig rig="threePt" dir="t"/>
+    </dgm:scene3d>
+    <dgm:sp3d/>
+    <dgm:txPr/>
+    <dgm:style>
+      <a:lnRef idx="1">
+        <a:scrgbClr r="0" g="0" b="0"/>
+      </a:lnRef>
+      <a:fillRef idx="1">
+        <a:scrgbClr r="0" g="0" b="0"/>
+      </a:fillRef>
+      <a:effectRef idx="0">
+        <a:scrgbClr r="0" g="0" b="0"/>
+      </a:effectRef>
+      <a:fontRef idx="minor"/>
+    </dgm:style>
+  </dgm:styleLbl>
+  <dgm:styleLbl name="bgAcc1">
+    <dgm:scene3d>
+      <a:camera prst="orthographicFront"/>
+      <a:lightRig rig="threePt" dir="t"/>
+    </dgm:scene3d>
+    <dgm:sp3d/>
+    <dgm:txPr/>
+    <dgm:style>
+      <a:lnRef idx="1">
+        <a:scrgbClr r="0" g="0" b="0"/>
+      </a:lnRef>
+      <a:fillRef idx="1">
+        <a:scrgbClr r="0" g="0" b="0"/>
+      </a:fillRef>
+      <a:effectRef idx="0">
+        <a:scrgbClr r="0" g="0" b="0"/>
+      </a:effectRef>
+      <a:fontRef idx="minor"/>
+    </dgm:style>
+  </dgm:styleLbl>
+  <dgm:styleLbl name="solidFgAcc1">
+    <dgm:scene3d>
+      <a:camera prst="orthographicFront"/>
+      <a:lightRig rig="threePt" dir="t"/>
+    </dgm:scene3d>
+    <dgm:sp3d/>
+    <dgm:txPr/>
+    <dgm:style>
+      <a:lnRef idx="1">
+        <a:scrgbClr r="0" g="0" b="0"/>
+      </a:lnRef>
+      <a:fillRef idx="1">
+        <a:scrgbClr r="0" g="0" b="0"/>
+      </a:fillRef>
+      <a:effectRef idx="0">
+        <a:scrgbClr r="0" g="0" b="0"/>
+      </a:effectRef>
+      <a:fontRef idx="minor"/>
+    </dgm:style>
+  </dgm:styleLbl>
+  <dgm:styleLbl name="solidAlignAcc1">
+    <dgm:scene3d>
+      <a:camera prst="orthographicFront"/>
+      <a:lightRig rig="threePt" dir="t"/>
+    </dgm:scene3d>
+    <dgm:sp3d/>
+    <dgm:txPr/>
+    <dgm:style>
+      <a:lnRef idx="1">
+        <a:scrgbClr r="0" g="0" b="0"/>
+      </a:lnRef>
+      <a:fillRef idx="1">
+        <a:scrgbClr r="0" g="0" b="0"/>
+      </a:fillRef>
+      <a:effectRef idx="0">
+        <a:scrgbClr r="0" g="0" b="0"/>
+      </a:effectRef>
+      <a:fontRef idx="minor"/>
+    </dgm:style>
+  </dgm:styleLbl>
+  <dgm:styleLbl name="solidBgAcc1">
+    <dgm:scene3d>
+      <a:camera prst="orthographicFront"/>
+      <a:lightRig rig="threePt" dir="t"/>
+    </dgm:scene3d>
+    <dgm:sp3d/>
+    <dgm:txPr/>
+    <dgm:style>
+      <a:lnRef idx="1">
+        <a:scrgbClr r="0" g="0" b="0"/>
+      </a:lnRef>
+      <a:fillRef idx="1">
+        <a:scrgbClr r="0" g="0" b="0"/>
+      </a:fillRef>
+      <a:effectRef idx="0">
+        <a:scrgbClr r="0" g="0" b="0"/>
+      </a:effectRef>
+      <a:fontRef idx="minor"/>
+    </dgm:style>
+  </dgm:styleLbl>
+  <dgm:styleLbl name="fgAccFollowNode1">
+    <dgm:scene3d>
+      <a:camera prst="orthographicFront"/>
+      <a:lightRig rig="threePt" dir="t"/>
+    </dgm:scene3d>
+    <dgm:sp3d/>
+    <dgm:txPr/>
+    <dgm:style>
+      <a:lnRef idx="1">
+        <a:scrgbClr r="0" g="0" b="0"/>
+      </a:lnRef>
+      <a:fillRef idx="1">
+        <a:scrgbClr r="0" g="0" b="0"/>
+      </a:fillRef>
+      <a:effectRef idx="0">
+        <a:scrgbClr r="0" g="0" b="0"/>
+      </a:effectRef>
+      <a:fontRef idx="minor"/>
+    </dgm:style>
+  </dgm:styleLbl>
+  <dgm:styleLbl name="alignAccFollowNode1">
+    <dgm:scene3d>
+      <a:camera prst="orthographicFront"/>
+      <a:lightRig rig="threePt" dir="t"/>
+    </dgm:scene3d>
+    <dgm:sp3d/>
+    <dgm:txPr/>
+    <dgm:style>
+      <a:lnRef idx="1">
+        <a:scrgbClr r="0" g="0" b="0"/>
+      </a:lnRef>
+      <a:fillRef idx="1">
+        <a:scrgbClr r="0" g="0" b="0"/>
+      </a:fillRef>
+      <a:effectRef idx="0">
+        <a:scrgbClr r="0" g="0" b="0"/>
+      </a:effectRef>
+      <a:fontRef idx="minor"/>
+    </dgm:style>
+  </dgm:styleLbl>
+  <dgm:styleLbl name="bgAccFollowNode1">
+    <dgm:scene3d>
+      <a:camera prst="orthographicFront"/>
+      <a:lightRig rig="threePt" dir="t"/>
+    </dgm:scene3d>
+    <dgm:sp3d/>
+    <dgm:txPr/>
+    <dgm:style>
+      <a:lnRef idx="1">
+        <a:scrgbClr r="0" g="0" b="0"/>
+      </a:lnRef>
+      <a:fillRef idx="1">
+        <a:scrgbClr r="0" g="0" b="0"/>
+      </a:fillRef>
+      <a:effectRef idx="0">
+        <a:scrgbClr r="0" g="0" b="0"/>
+      </a:effectRef>
+      <a:fontRef idx="minor"/>
+    </dgm:style>
+  </dgm:styleLbl>
+  <dgm:styleLbl name="fgAcc0">
+    <dgm:scene3d>
+      <a:camera prst="orthographicFront"/>
+      <a:lightRig rig="threePt" dir="t"/>
+    </dgm:scene3d>
+    <dgm:sp3d/>
+    <dgm:txPr/>
+    <dgm:style>
+      <a:lnRef idx="1">
+        <a:scrgbClr r="0" g="0" b="0"/>
+      </a:lnRef>
+      <a:fillRef idx="1">
+        <a:scrgbClr r="0" g="0" b="0"/>
+      </a:fillRef>
+      <a:effectRef idx="0">
+        <a:scrgbClr r="0" g="0" b="0"/>
+      </a:effectRef>
+      <a:fontRef idx="minor"/>
+    </dgm:style>
+  </dgm:styleLbl>
+  <dgm:styleLbl name="fgAcc2">
+    <dgm:scene3d>
+      <a:camera prst="orthographicFront"/>
+      <a:lightRig rig="threePt" dir="t"/>
+    </dgm:scene3d>
+    <dgm:sp3d/>
+    <dgm:txPr/>
+    <dgm:style>
+      <a:lnRef idx="1">
+        <a:scrgbClr r="0" g="0" b="0"/>
+      </a:lnRef>
+      <a:fillRef idx="1">
+        <a:scrgbClr r="0" g="0" b="0"/>
+      </a:fillRef>
+      <a:effectRef idx="0">
+        <a:scrgbClr r="0" g="0" b="0"/>
+      </a:effectRef>
+      <a:fontRef idx="minor"/>
+    </dgm:style>
+  </dgm:styleLbl>
+  <dgm:styleLbl name="fgAcc3">
+    <dgm:scene3d>
+      <a:camera prst="orthographicFront"/>
+      <a:lightRig rig="threePt" dir="t"/>
+    </dgm:scene3d>
+    <dgm:sp3d/>
+    <dgm:txPr/>
+    <dgm:style>
+      <a:lnRef idx="1">
+        <a:scrgbClr r="0" g="0" b="0"/>
+      </a:lnRef>
+      <a:fillRef idx="1">
+        <a:scrgbClr r="0" g="0" b="0"/>
+      </a:fillRef>
+      <a:effectRef idx="0">
+        <a:scrgbClr r="0" g="0" b="0"/>
+      </a:effectRef>
+      <a:fontRef idx="minor"/>
+    </dgm:style>
+  </dgm:styleLbl>
+  <dgm:styleLbl name="fgAcc4">
+    <dgm:scene3d>
+      <a:camera prst="orthographicFront"/>
+      <a:lightRig rig="threePt" dir="t"/>
+    </dgm:scene3d>
+    <dgm:sp3d/>
+    <dgm:txPr/>
+    <dgm:style>
+      <a:lnRef idx="1">
+        <a:scrgbClr r="0" g="0" b="0"/>
+      </a:lnRef>
+      <a:fillRef idx="1">
+        <a:scrgbClr r="0" g="0" b="0"/>
+      </a:fillRef>
+      <a:effectRef idx="0">
+        <a:scrgbClr r="0" g="0" b="0"/>
+      </a:effectRef>
+      <a:fontRef idx="minor"/>
+    </dgm:style>
+  </dgm:styleLbl>
+  <dgm:styleLbl name="bgShp">
+    <dgm:scene3d>
+      <a:camera prst="orthographicFront"/>
+      <a:lightRig rig="threePt" dir="t"/>
+    </dgm:scene3d>
+    <dgm:sp3d/>
+    <dgm:txPr/>
+    <dgm:style>
+      <a:lnRef idx="0">
+        <a:scrgbClr r="0" g="0" b="0"/>
+      </a:lnRef>
+      <a:fillRef idx="1">
+        <a:scrgbClr r="0" g="0" b="0"/>
+      </a:fillRef>
+      <a:effectRef idx="2">
+        <a:scrgbClr r="0" g="0" b="0"/>
+      </a:effectRef>
+      <a:fontRef idx="minor"/>
+    </dgm:style>
+  </dgm:styleLbl>
+  <dgm:styleLbl name="dkBgShp">
+    <dgm:scene3d>
+      <a:camera prst="orthographicFront"/>
+      <a:lightRig rig="threePt" dir="t"/>
+    </dgm:scene3d>
+    <dgm:sp3d/>
+    <dgm:txPr/>
+    <dgm:style>
+      <a:lnRef idx="0">
+        <a:scrgbClr r="0" g="0" b="0"/>
+      </a:lnRef>
+      <a:fillRef idx="1">
+        <a:scrgbClr r="0" g="0" b="0"/>
+      </a:fillRef>
+      <a:effectRef idx="2">
+        <a:scrgbClr r="0" g="0" b="0"/>
+      </a:effectRef>
+      <a:fontRef idx="minor"/>
+    </dgm:style>
+  </dgm:styleLbl>
+  <dgm:styleLbl name="trBgShp">
+    <dgm:scene3d>
+      <a:camera prst="orthographicFront"/>
+      <a:lightRig rig="threePt" dir="t"/>
+    </dgm:scene3d>
+    <dgm:sp3d/>
+    <dgm:txPr/>
+    <dgm:style>
+      <a:lnRef idx="0">
+        <a:scrgbClr r="0" g="0" b="0"/>
+      </a:lnRef>
+      <a:fillRef idx="1">
+        <a:scrgbClr r="0" g="0" b="0"/>
+      </a:fillRef>
+      <a:effectRef idx="0">
+        <a:scrgbClr r="0" g="0" b="0"/>
+      </a:effectRef>
+      <a:fontRef idx="minor"/>
+    </dgm:style>
+  </dgm:styleLbl>
+  <dgm:styleLbl name="fgShp">
+    <dgm:scene3d>
+      <a:camera prst="orthographicFront"/>
+      <a:lightRig rig="threePt" dir="t"/>
+    </dgm:scene3d>
+    <dgm:sp3d/>
+    <dgm:txPr/>
+    <dgm:style>
+      <a:lnRef idx="0">
+        <a:scrgbClr r="0" g="0" b="0"/>
+      </a:lnRef>
+      <a:fillRef idx="3">
+        <a:scrgbClr r="0" g="0" b="0"/>
+      </a:fillRef>
+      <a:effectRef idx="2">
+        <a:scrgbClr r="0" g="0" b="0"/>
+      </a:effectRef>
+      <a:fontRef idx="minor"/>
+    </dgm:style>
+  </dgm:styleLbl>
+  <dgm:styleLbl name="revTx">
+    <dgm:scene3d>
+      <a:camera prst="orthographicFront"/>
+      <a:lightRig rig="threePt" dir="t"/>
+    </dgm:scene3d>
+    <dgm:sp3d/>
+    <dgm:txPr/>
+    <dgm:style>
+      <a:lnRef idx="0">
+        <a:scrgbClr r="0" g="0" b="0"/>
+      </a:lnRef>
+      <a:fillRef idx="0">
+        <a:scrgbClr r="0" g="0" b="0"/>
+      </a:fillRef>
+      <a:effectRef idx="0">
+        <a:scrgbClr r="0" g="0" b="0"/>
+      </a:effectRef>
+      <a:fontRef idx="minor"/>
+    </dgm:style>
+  </dgm:styleLbl>
+</dgm:styleDef>
 </file>
 
 <file path=ppt/notesMasters/notesMaster1.xml><?xml version="1.0" encoding="utf-8"?>
@@ -4541,12 +7933,21 @@
           <a:bodyPr/>
           <a:lstStyle/>
           <a:p>
-            <a:pPr marL="0" indent="0">
-              <a:buNone/>
-            </a:pPr>
             <a:r>
               <a:rPr lang="en-US" dirty="0" smtClean="0"/>
-              <a:t>Outline of Battleship</a:t>
+              <a:t>Classic board game</a:t>
+            </a:r>
+          </a:p>
+          <a:p>
+            <a:r>
+              <a:rPr lang="en-US" dirty="0" smtClean="0"/>
+              <a:t>Wanted to add functionality not available in original board game</a:t>
+            </a:r>
+          </a:p>
+          <a:p>
+            <a:r>
+              <a:rPr lang="en-US" dirty="0" smtClean="0"/>
+              <a:t>Develop better understand of TDD</a:t>
             </a:r>
           </a:p>
         </p:txBody>
@@ -4621,7 +8022,81 @@
           <a:p>
             <a:r>
               <a:rPr lang="en-US" dirty="0" smtClean="0"/>
-              <a:t>Take from problem statement</a:t>
+              <a:t>User has choices to expand original gameplay</a:t>
+            </a:r>
+          </a:p>
+          <a:p>
+            <a:pPr lvl="1"/>
+            <a:r>
+              <a:rPr lang="en-US" dirty="0" smtClean="0"/>
+              <a:t>Size of board</a:t>
+            </a:r>
+          </a:p>
+          <a:p>
+            <a:pPr lvl="1"/>
+            <a:r>
+              <a:rPr lang="en-US" dirty="0" smtClean="0"/>
+              <a:t>Number of ships</a:t>
+            </a:r>
+          </a:p>
+          <a:p>
+            <a:pPr lvl="1"/>
+            <a:r>
+              <a:rPr lang="en-US" dirty="0" smtClean="0"/>
+              <a:t>Size of each ship</a:t>
+            </a:r>
+          </a:p>
+          <a:p>
+            <a:r>
+              <a:rPr lang="en-US" dirty="0" smtClean="0"/>
+              <a:t>Player plays against a smart AI</a:t>
+            </a:r>
+          </a:p>
+          <a:p>
+            <a:pPr lvl="1"/>
+            <a:r>
+              <a:rPr lang="en-US" dirty="0" smtClean="0"/>
+              <a:t>AI will randomly shoot until it makes a hit</a:t>
+            </a:r>
+          </a:p>
+          <a:p>
+            <a:pPr lvl="1"/>
+            <a:r>
+              <a:rPr lang="en-US" dirty="0" smtClean="0"/>
+              <a:t>Once it finds a ship, it continues to shoot at it until the ship is sunk</a:t>
+            </a:r>
+          </a:p>
+          <a:p>
+            <a:r>
+              <a:rPr lang="en-US" dirty="0" smtClean="0"/>
+              <a:t>Easy to understand  and use</a:t>
+            </a:r>
+          </a:p>
+          <a:p>
+            <a:pPr lvl="1"/>
+            <a:r>
+              <a:rPr lang="en-US" dirty="0" smtClean="0"/>
+              <a:t>Well laid out user interface</a:t>
+            </a:r>
+          </a:p>
+          <a:p>
+            <a:pPr lvl="1"/>
+            <a:r>
+              <a:rPr lang="en-US" dirty="0" smtClean="0"/>
+              <a:t>Useful help menus</a:t>
+            </a:r>
+          </a:p>
+          <a:p>
+            <a:r>
+              <a:rPr lang="en-US" dirty="0" smtClean="0"/>
+              <a:t>Ability to use in English or German</a:t>
+            </a:r>
+          </a:p>
+          <a:p>
+            <a:pPr lvl="1"/>
+            <a:r>
+              <a:rPr lang="en-US" dirty="0" smtClean="0"/>
+              <a:t>Can change throughout game setup</a:t>
             </a:r>
             <a:endParaRPr lang="en-US" dirty="0"/>
           </a:p>
@@ -4680,41 +8155,35 @@
           </a:p>
         </p:txBody>
       </p:sp>
-      <p:sp>
-        <p:nvSpPr>
-          <p:cNvPr id="3" name="Content Placeholder 2"/>
-          <p:cNvSpPr>
-            <a:spLocks noGrp="1"/>
-          </p:cNvSpPr>
+      <p:pic>
+        <p:nvPicPr>
+          <p:cNvPr id="4" name="Content Placeholder 3"/>
+          <p:cNvPicPr>
+            <a:picLocks noGrp="1" noChangeAspect="1"/>
+          </p:cNvPicPr>
           <p:nvPr>
             <p:ph idx="1"/>
           </p:nvPr>
-        </p:nvSpPr>
-        <p:spPr/>
-        <p:txBody>
-          <a:bodyPr/>
-          <a:lstStyle/>
-          <a:p>
-            <a:r>
-              <a:rPr lang="en-US" dirty="0" smtClean="0"/>
-              <a:t>&lt;Class Diagram&gt;</a:t>
-            </a:r>
-          </a:p>
-          <a:p>
-            <a:endParaRPr lang="en-US" dirty="0"/>
-          </a:p>
-          <a:p>
-            <a:endParaRPr lang="en-US" dirty="0" smtClean="0"/>
-          </a:p>
-          <a:p>
-            <a:r>
-              <a:rPr lang="en-US" dirty="0" smtClean="0"/>
-              <a:t>Talk about how it works</a:t>
-            </a:r>
-            <a:endParaRPr lang="en-US" dirty="0"/>
-          </a:p>
-        </p:txBody>
-      </p:sp>
+        </p:nvPicPr>
+        <p:blipFill>
+          <a:blip r:embed="rId3">
+            <a:extLst>
+              <a:ext uri="{28A0092B-C50C-407E-A947-70E740481C1C}">
+                <a14:useLocalDpi xmlns:a14="http://schemas.microsoft.com/office/drawing/2010/main" val="0"/>
+              </a:ext>
+            </a:extLst>
+          </a:blip>
+          <a:stretch>
+            <a:fillRect/>
+          </a:stretch>
+        </p:blipFill>
+        <p:spPr>
+          <a:xfrm>
+            <a:off x="1464622" y="1600200"/>
+            <a:ext cx="6214755" cy="4525963"/>
+          </a:xfrm>
+        </p:spPr>
+      </p:pic>
     </p:spTree>
     <p:extLst>
       <p:ext uri="{BB962C8B-B14F-4D97-AF65-F5344CB8AC3E}">
@@ -4783,10 +8252,12 @@
           <a:bodyPr/>
           <a:lstStyle/>
           <a:p>
-            <a:r>
-              <a:rPr lang="en-US" dirty="0" smtClean="0"/>
-              <a:t>Show it</a:t>
-            </a:r>
+            <a:endParaRPr lang="en-US" dirty="0"/>
+          </a:p>
+          <a:p>
+            <a:pPr marL="0" indent="0">
+              <a:buNone/>
+            </a:pPr>
             <a:endParaRPr lang="en-US" dirty="0"/>
           </a:p>
         </p:txBody>
@@ -4861,30 +8332,102 @@
           <a:p>
             <a:r>
               <a:rPr lang="en-US" dirty="0" smtClean="0"/>
-              <a:t>Test cases</a:t>
+              <a:t>Test </a:t>
             </a:r>
-          </a:p>
-          <a:p>
-            <a:endParaRPr lang="en-US" dirty="0"/>
-          </a:p>
-          <a:p>
             <a:r>
               <a:rPr lang="en-US" dirty="0" smtClean="0"/>
-              <a:t>Changes throughout project</a:t>
+              <a:t>cases</a:t>
             </a:r>
-          </a:p>
-          <a:p>
-            <a:endParaRPr lang="en-US" dirty="0"/>
-          </a:p>
-          <a:p>
             <a:endParaRPr lang="en-US" dirty="0" smtClean="0"/>
           </a:p>
           <a:p>
             <a:r>
               <a:rPr lang="en-US" dirty="0" smtClean="0"/>
-              <a:t>GUI user scenarios</a:t>
+              <a:t>GUI user </a:t>
             </a:r>
+            <a:r>
+              <a:rPr lang="en-US" dirty="0" smtClean="0"/>
+              <a:t>scenarios</a:t>
+            </a:r>
+          </a:p>
+          <a:p>
             <a:endParaRPr lang="en-US" dirty="0"/>
+          </a:p>
+        </p:txBody>
+      </p:sp>
+      <p:graphicFrame>
+        <p:nvGraphicFramePr>
+          <p:cNvPr id="4" name="Diagram 3"/>
+          <p:cNvGraphicFramePr/>
+          <p:nvPr>
+            <p:extLst>
+              <p:ext uri="{D42A27DB-BD31-4B8C-83A1-F6EECF244321}">
+                <p14:modId xmlns:p14="http://schemas.microsoft.com/office/powerpoint/2010/main" val="328718629"/>
+              </p:ext>
+            </p:extLst>
+          </p:nvPr>
+        </p:nvGraphicFramePr>
+        <p:xfrm>
+          <a:off x="1705510" y="1828800"/>
+          <a:ext cx="7467600" cy="4800600"/>
+        </p:xfrm>
+        <a:graphic>
+          <a:graphicData uri="http://schemas.openxmlformats.org/drawingml/2006/diagram">
+            <dgm:relIds xmlns:dgm="http://schemas.openxmlformats.org/drawingml/2006/diagram" xmlns:r="http://schemas.openxmlformats.org/officeDocument/2006/relationships" r:dm="rId3" r:lo="rId4" r:qs="rId5" r:cs="rId6"/>
+          </a:graphicData>
+        </a:graphic>
+      </p:graphicFrame>
+      <p:sp>
+        <p:nvSpPr>
+          <p:cNvPr id="5" name="Right Arrow 4"/>
+          <p:cNvSpPr/>
+          <p:nvPr/>
+        </p:nvSpPr>
+        <p:spPr>
+          <a:xfrm>
+            <a:off x="4572000" y="3733800"/>
+            <a:ext cx="1752600" cy="381000"/>
+          </a:xfrm>
+          <a:prstGeom prst="rightArrow">
+            <a:avLst/>
+          </a:prstGeom>
+          <a:solidFill>
+            <a:schemeClr val="accent1">
+              <a:lumMod val="60000"/>
+              <a:lumOff val="40000"/>
+            </a:schemeClr>
+          </a:solidFill>
+          <a:ln>
+            <a:solidFill>
+              <a:schemeClr val="accent1">
+                <a:lumMod val="60000"/>
+                <a:lumOff val="40000"/>
+              </a:schemeClr>
+            </a:solidFill>
+          </a:ln>
+        </p:spPr>
+        <p:style>
+          <a:lnRef idx="2">
+            <a:schemeClr val="accent1">
+              <a:shade val="50000"/>
+            </a:schemeClr>
+          </a:lnRef>
+          <a:fillRef idx="1">
+            <a:schemeClr val="accent1"/>
+          </a:fillRef>
+          <a:effectRef idx="0">
+            <a:schemeClr val="accent1"/>
+          </a:effectRef>
+          <a:fontRef idx="minor">
+            <a:schemeClr val="lt1"/>
+          </a:fontRef>
+        </p:style>
+        <p:txBody>
+          <a:bodyPr rtlCol="0" anchor="ctr"/>
+          <a:lstStyle/>
+          <a:p>
+            <a:pPr algn="ctr"/>
+            <a:endParaRPr lang="en-US"/>
           </a:p>
         </p:txBody>
       </p:sp>
@@ -4958,7 +8501,7 @@
         </p:nvGraphicFramePr>
         <p:xfrm>
           <a:off x="1531620" y="2233263"/>
-          <a:ext cx="6080760" cy="3541968"/>
+          <a:ext cx="6080760" cy="3575304"/>
         </p:xfrm>
         <a:graphic>
           <a:graphicData uri="http://schemas.openxmlformats.org/drawingml/2006/table">
@@ -6055,7 +9598,7 @@
         </p:nvGraphicFramePr>
         <p:xfrm>
           <a:off x="1537335" y="2233263"/>
-          <a:ext cx="6069330" cy="3248724"/>
+          <a:ext cx="6069330" cy="3259836"/>
         </p:xfrm>
         <a:graphic>
           <a:graphicData uri="http://schemas.openxmlformats.org/drawingml/2006/table">

</xml_diff>